<commit_message>
second version of ppt
</commit_message>
<xml_diff>
--- a/presentations/DSClickPrediction_Pramod_DataExploration.pptx
+++ b/presentations/DSClickPrediction_Pramod_DataExploration.pptx
@@ -5,15 +5,18 @@
     <p:sldMasterId id="2147483684" r:id="rId1"/>
   </p:sldMasterIdLst>
   <p:notesMasterIdLst>
-    <p:notesMasterId r:id="rId8"/>
+    <p:notesMasterId r:id="rId11"/>
   </p:notesMasterIdLst>
   <p:sldIdLst>
     <p:sldId id="256" r:id="rId2"/>
     <p:sldId id="257" r:id="rId3"/>
     <p:sldId id="258" r:id="rId4"/>
     <p:sldId id="262" r:id="rId5"/>
-    <p:sldId id="259" r:id="rId6"/>
-    <p:sldId id="261" r:id="rId7"/>
+    <p:sldId id="266" r:id="rId6"/>
+    <p:sldId id="259" r:id="rId7"/>
+    <p:sldId id="261" r:id="rId8"/>
+    <p:sldId id="267" r:id="rId9"/>
+    <p:sldId id="264" r:id="rId10"/>
   </p:sldIdLst>
   <p:sldSz cx="12192000" cy="6858000"/>
   <p:notesSz cx="6858000" cy="9144000"/>
@@ -112,6 +115,11 @@
       </a:defRPr>
     </a:lvl9pPr>
   </p:defaultTextStyle>
+  <p:extLst>
+    <p:ext uri="{EFAFB233-063F-42B5-8137-9DF3F51BA10A}">
+      <p15:sldGuideLst xmlns:p15="http://schemas.microsoft.com/office/powerpoint/2012/main"/>
+    </p:ext>
+  </p:extLst>
 </p:presentation>
 </file>
 
@@ -1017,6 +1025,416 @@
     <p:extLst>
       <p:ext uri="{BB962C8B-B14F-4D97-AF65-F5344CB8AC3E}">
         <p14:creationId xmlns:p14="http://schemas.microsoft.com/office/powerpoint/2010/main" val="142533819"/>
+      </p:ext>
+    </p:extLst>
+  </p:cSld>
+  <p:clrMapOvr>
+    <a:masterClrMapping/>
+  </p:clrMapOvr>
+</p:notes>
+</file>
+
+<file path=ppt/notesSlides/notesSlide5.xml><?xml version="1.0" encoding="utf-8"?>
+<p:notes xmlns:a="http://schemas.openxmlformats.org/drawingml/2006/main" xmlns:r="http://schemas.openxmlformats.org/officeDocument/2006/relationships" xmlns:p="http://schemas.openxmlformats.org/presentationml/2006/main">
+  <p:cSld>
+    <p:spTree>
+      <p:nvGrpSpPr>
+        <p:cNvPr id="1" name=""/>
+        <p:cNvGrpSpPr/>
+        <p:nvPr/>
+      </p:nvGrpSpPr>
+      <p:grpSpPr>
+        <a:xfrm>
+          <a:off x="0" y="0"/>
+          <a:ext cx="0" cy="0"/>
+          <a:chOff x="0" y="0"/>
+          <a:chExt cx="0" cy="0"/>
+        </a:xfrm>
+      </p:grpSpPr>
+      <p:sp>
+        <p:nvSpPr>
+          <p:cNvPr id="2" name="Slide Image Placeholder 1"/>
+          <p:cNvSpPr>
+            <a:spLocks noGrp="1" noRot="1" noChangeAspect="1"/>
+          </p:cNvSpPr>
+          <p:nvPr>
+            <p:ph type="sldImg"/>
+          </p:nvPr>
+        </p:nvSpPr>
+        <p:spPr/>
+      </p:sp>
+      <p:sp>
+        <p:nvSpPr>
+          <p:cNvPr id="3" name="Notes Placeholder 2"/>
+          <p:cNvSpPr>
+            <a:spLocks noGrp="1"/>
+          </p:cNvSpPr>
+          <p:nvPr>
+            <p:ph type="body" idx="1"/>
+          </p:nvPr>
+        </p:nvSpPr>
+        <p:spPr/>
+        <p:txBody>
+          <a:bodyPr/>
+          <a:lstStyle/>
+          <a:p>
+            <a:endParaRPr lang="en-US" dirty="0"/>
+          </a:p>
+        </p:txBody>
+      </p:sp>
+      <p:sp>
+        <p:nvSpPr>
+          <p:cNvPr id="4" name="Slide Number Placeholder 3"/>
+          <p:cNvSpPr>
+            <a:spLocks noGrp="1"/>
+          </p:cNvSpPr>
+          <p:nvPr>
+            <p:ph type="sldNum" sz="quarter" idx="10"/>
+          </p:nvPr>
+        </p:nvSpPr>
+        <p:spPr/>
+        <p:txBody>
+          <a:bodyPr/>
+          <a:lstStyle/>
+          <a:p>
+            <a:fld id="{B942DD7C-DF0A-314E-B225-27CBA0EF8444}" type="slidenum">
+              <a:rPr lang="en-US" smtClean="0"/>
+              <a:t>8</a:t>
+            </a:fld>
+            <a:endParaRPr lang="en-US"/>
+          </a:p>
+        </p:txBody>
+      </p:sp>
+    </p:spTree>
+    <p:extLst>
+      <p:ext uri="{BB962C8B-B14F-4D97-AF65-F5344CB8AC3E}">
+        <p14:creationId xmlns:p14="http://schemas.microsoft.com/office/powerpoint/2010/main" val="123282419"/>
+      </p:ext>
+    </p:extLst>
+  </p:cSld>
+  <p:clrMapOvr>
+    <a:masterClrMapping/>
+  </p:clrMapOvr>
+</p:notes>
+</file>
+
+<file path=ppt/notesSlides/notesSlide6.xml><?xml version="1.0" encoding="utf-8"?>
+<p:notes xmlns:a="http://schemas.openxmlformats.org/drawingml/2006/main" xmlns:r="http://schemas.openxmlformats.org/officeDocument/2006/relationships" xmlns:p="http://schemas.openxmlformats.org/presentationml/2006/main">
+  <p:cSld>
+    <p:spTree>
+      <p:nvGrpSpPr>
+        <p:cNvPr id="1" name=""/>
+        <p:cNvGrpSpPr/>
+        <p:nvPr/>
+      </p:nvGrpSpPr>
+      <p:grpSpPr>
+        <a:xfrm>
+          <a:off x="0" y="0"/>
+          <a:ext cx="0" cy="0"/>
+          <a:chOff x="0" y="0"/>
+          <a:chExt cx="0" cy="0"/>
+        </a:xfrm>
+      </p:grpSpPr>
+      <p:sp>
+        <p:nvSpPr>
+          <p:cNvPr id="2" name="Slide Image Placeholder 1"/>
+          <p:cNvSpPr>
+            <a:spLocks noGrp="1" noRot="1" noChangeAspect="1"/>
+          </p:cNvSpPr>
+          <p:nvPr>
+            <p:ph type="sldImg"/>
+          </p:nvPr>
+        </p:nvSpPr>
+        <p:spPr/>
+      </p:sp>
+      <p:sp>
+        <p:nvSpPr>
+          <p:cNvPr id="3" name="Notes Placeholder 2"/>
+          <p:cNvSpPr>
+            <a:spLocks noGrp="1"/>
+          </p:cNvSpPr>
+          <p:nvPr>
+            <p:ph type="body" idx="1"/>
+          </p:nvPr>
+        </p:nvSpPr>
+        <p:spPr/>
+        <p:txBody>
+          <a:bodyPr/>
+          <a:lstStyle/>
+          <a:p>
+            <a:r>
+              <a:rPr lang="en-US" sz="1200" kern="1200" dirty="0" smtClean="0">
+                <a:solidFill>
+                  <a:schemeClr val="tx1"/>
+                </a:solidFill>
+                <a:effectLst/>
+                <a:latin typeface="+mn-lt"/>
+                <a:ea typeface="+mn-ea"/>
+                <a:cs typeface="+mn-cs"/>
+              </a:rPr>
+              <a:t>Features</a:t>
+            </a:r>
+          </a:p>
+          <a:p>
+            <a:r>
+              <a:rPr lang="en-US" sz="1200" kern="1200" dirty="0" smtClean="0">
+                <a:solidFill>
+                  <a:schemeClr val="tx1"/>
+                </a:solidFill>
+                <a:effectLst/>
+                <a:latin typeface="+mn-lt"/>
+                <a:ea typeface="+mn-ea"/>
+                <a:cs typeface="+mn-cs"/>
+              </a:rPr>
+              <a:t>Topic id:</a:t>
+            </a:r>
+            <a:r>
+              <a:rPr lang="en-US" sz="1200" kern="1200" baseline="0" dirty="0" smtClean="0">
+                <a:solidFill>
+                  <a:schemeClr val="tx1"/>
+                </a:solidFill>
+                <a:effectLst/>
+                <a:latin typeface="+mn-lt"/>
+                <a:ea typeface="+mn-ea"/>
+                <a:cs typeface="+mn-cs"/>
+              </a:rPr>
+              <a:t> </a:t>
+            </a:r>
+            <a:r>
+              <a:rPr lang="en-US" sz="1200" kern="1200" dirty="0" smtClean="0">
+                <a:solidFill>
+                  <a:schemeClr val="tx1"/>
+                </a:solidFill>
+                <a:effectLst/>
+                <a:latin typeface="+mn-lt"/>
+                <a:ea typeface="+mn-ea"/>
+                <a:cs typeface="+mn-cs"/>
+              </a:rPr>
+              <a:t>Topic of webpage</a:t>
+            </a:r>
+          </a:p>
+          <a:p>
+            <a:r>
+              <a:rPr lang="en-US" sz="1200" kern="1200" dirty="0" smtClean="0">
+                <a:solidFill>
+                  <a:schemeClr val="tx1"/>
+                </a:solidFill>
+                <a:effectLst/>
+                <a:latin typeface="+mn-lt"/>
+                <a:ea typeface="+mn-ea"/>
+                <a:cs typeface="+mn-cs"/>
+              </a:rPr>
+              <a:t>Category id:</a:t>
+            </a:r>
+            <a:r>
+              <a:rPr lang="en-US" sz="1200" kern="1200" baseline="0" dirty="0" smtClean="0">
+                <a:solidFill>
+                  <a:schemeClr val="tx1"/>
+                </a:solidFill>
+                <a:effectLst/>
+                <a:latin typeface="+mn-lt"/>
+                <a:ea typeface="+mn-ea"/>
+                <a:cs typeface="+mn-cs"/>
+              </a:rPr>
+              <a:t> </a:t>
+            </a:r>
+            <a:r>
+              <a:rPr lang="en-US" sz="1200" kern="1200" dirty="0" smtClean="0">
+                <a:solidFill>
+                  <a:schemeClr val="tx1"/>
+                </a:solidFill>
+                <a:effectLst/>
+                <a:latin typeface="+mn-lt"/>
+                <a:ea typeface="+mn-ea"/>
+                <a:cs typeface="+mn-cs"/>
+              </a:rPr>
+              <a:t>Category of </a:t>
+            </a:r>
+          </a:p>
+          <a:p>
+            <a:r>
+              <a:rPr lang="en-US" sz="1200" kern="1200" dirty="0" smtClean="0">
+                <a:solidFill>
+                  <a:schemeClr val="tx1"/>
+                </a:solidFill>
+                <a:effectLst/>
+                <a:latin typeface="+mn-lt"/>
+                <a:ea typeface="+mn-ea"/>
+                <a:cs typeface="+mn-cs"/>
+              </a:rPr>
+              <a:t>webpage</a:t>
+            </a:r>
+          </a:p>
+          <a:p>
+            <a:r>
+              <a:rPr lang="en-US" sz="1200" kern="1200" dirty="0" smtClean="0">
+                <a:solidFill>
+                  <a:schemeClr val="tx1"/>
+                </a:solidFill>
+                <a:effectLst/>
+                <a:latin typeface="+mn-lt"/>
+                <a:ea typeface="+mn-ea"/>
+                <a:cs typeface="+mn-cs"/>
+              </a:rPr>
+              <a:t>Source id:</a:t>
+            </a:r>
+            <a:r>
+              <a:rPr lang="en-US" sz="1200" kern="1200" baseline="0" dirty="0" smtClean="0">
+                <a:solidFill>
+                  <a:schemeClr val="tx1"/>
+                </a:solidFill>
+                <a:effectLst/>
+                <a:latin typeface="+mn-lt"/>
+                <a:ea typeface="+mn-ea"/>
+                <a:cs typeface="+mn-cs"/>
+              </a:rPr>
+              <a:t> </a:t>
+            </a:r>
+            <a:r>
+              <a:rPr lang="en-US" sz="1200" kern="1200" dirty="0" smtClean="0">
+                <a:solidFill>
+                  <a:schemeClr val="tx1"/>
+                </a:solidFill>
+                <a:effectLst/>
+                <a:latin typeface="+mn-lt"/>
+                <a:ea typeface="+mn-ea"/>
+                <a:cs typeface="+mn-cs"/>
+              </a:rPr>
+              <a:t>source that </a:t>
+            </a:r>
+            <a:r>
+              <a:rPr lang="en-US" sz="1200" kern="1200" baseline="0" dirty="0" smtClean="0">
+                <a:solidFill>
+                  <a:schemeClr val="tx1"/>
+                </a:solidFill>
+                <a:effectLst/>
+                <a:latin typeface="+mn-lt"/>
+                <a:ea typeface="+mn-ea"/>
+                <a:cs typeface="+mn-cs"/>
+              </a:rPr>
+              <a:t> </a:t>
+            </a:r>
+            <a:r>
+              <a:rPr lang="en-US" sz="1200" kern="1200" dirty="0" smtClean="0">
+                <a:solidFill>
+                  <a:schemeClr val="tx1"/>
+                </a:solidFill>
+                <a:effectLst/>
+                <a:latin typeface="+mn-lt"/>
+                <a:ea typeface="+mn-ea"/>
+                <a:cs typeface="+mn-cs"/>
+              </a:rPr>
+              <a:t>webpage is from</a:t>
+            </a:r>
+          </a:p>
+          <a:p>
+            <a:r>
+              <a:rPr lang="en-US" sz="1200" kern="1200" dirty="0" smtClean="0">
+                <a:solidFill>
+                  <a:schemeClr val="tx1"/>
+                </a:solidFill>
+                <a:effectLst/>
+                <a:latin typeface="+mn-lt"/>
+                <a:ea typeface="+mn-ea"/>
+                <a:cs typeface="+mn-cs"/>
+              </a:rPr>
+              <a:t>Advertiser id:</a:t>
+            </a:r>
+            <a:r>
+              <a:rPr lang="en-US" sz="1200" kern="1200" baseline="0" dirty="0" smtClean="0">
+                <a:solidFill>
+                  <a:schemeClr val="tx1"/>
+                </a:solidFill>
+                <a:effectLst/>
+                <a:latin typeface="+mn-lt"/>
+                <a:ea typeface="+mn-ea"/>
+                <a:cs typeface="+mn-cs"/>
+              </a:rPr>
+              <a:t> </a:t>
+            </a:r>
+            <a:r>
+              <a:rPr lang="en-US" sz="1200" kern="1200" dirty="0" smtClean="0">
+                <a:solidFill>
+                  <a:schemeClr val="tx1"/>
+                </a:solidFill>
+                <a:effectLst/>
+                <a:latin typeface="+mn-lt"/>
+                <a:ea typeface="+mn-ea"/>
+                <a:cs typeface="+mn-cs"/>
+              </a:rPr>
+              <a:t>Advertiser of ad</a:t>
+            </a:r>
+          </a:p>
+          <a:p>
+            <a:r>
+              <a:rPr lang="en-US" sz="1200" kern="1200" dirty="0" smtClean="0">
+                <a:solidFill>
+                  <a:schemeClr val="tx1"/>
+                </a:solidFill>
+                <a:effectLst/>
+                <a:latin typeface="+mn-lt"/>
+                <a:ea typeface="+mn-ea"/>
+                <a:cs typeface="+mn-cs"/>
+              </a:rPr>
+              <a:t>Campaign id:</a:t>
+            </a:r>
+            <a:r>
+              <a:rPr lang="en-US" sz="1200" kern="1200" baseline="0" dirty="0" smtClean="0">
+                <a:solidFill>
+                  <a:schemeClr val="tx1"/>
+                </a:solidFill>
+                <a:effectLst/>
+                <a:latin typeface="+mn-lt"/>
+                <a:ea typeface="+mn-ea"/>
+                <a:cs typeface="+mn-cs"/>
+              </a:rPr>
+              <a:t> </a:t>
+            </a:r>
+            <a:r>
+              <a:rPr lang="en-US" sz="1200" kern="1200" dirty="0" smtClean="0">
+                <a:solidFill>
+                  <a:schemeClr val="tx1"/>
+                </a:solidFill>
+                <a:effectLst/>
+                <a:latin typeface="+mn-lt"/>
+                <a:ea typeface="+mn-ea"/>
+                <a:cs typeface="+mn-cs"/>
+              </a:rPr>
+              <a:t>Campaign of ad</a:t>
+            </a:r>
+          </a:p>
+          <a:p>
+            <a:endParaRPr lang="en-US" dirty="0"/>
+          </a:p>
+        </p:txBody>
+      </p:sp>
+      <p:sp>
+        <p:nvSpPr>
+          <p:cNvPr id="4" name="Slide Number Placeholder 3"/>
+          <p:cNvSpPr>
+            <a:spLocks noGrp="1"/>
+          </p:cNvSpPr>
+          <p:nvPr>
+            <p:ph type="sldNum" sz="quarter" idx="10"/>
+          </p:nvPr>
+        </p:nvSpPr>
+        <p:spPr/>
+        <p:txBody>
+          <a:bodyPr/>
+          <a:lstStyle/>
+          <a:p>
+            <a:fld id="{B942DD7C-DF0A-314E-B225-27CBA0EF8444}" type="slidenum">
+              <a:rPr lang="en-US" smtClean="0"/>
+              <a:t>9</a:t>
+            </a:fld>
+            <a:endParaRPr lang="en-US"/>
+          </a:p>
+        </p:txBody>
+      </p:sp>
+    </p:spTree>
+    <p:extLst>
+      <p:ext uri="{BB962C8B-B14F-4D97-AF65-F5344CB8AC3E}">
+        <p14:creationId xmlns:p14="http://schemas.microsoft.com/office/powerpoint/2010/main" val="1693597122"/>
       </p:ext>
     </p:extLst>
   </p:cSld>
@@ -5628,8 +6046,19 @@
           <a:p>
             <a:r>
               <a:rPr lang="en-US" dirty="0" smtClean="0"/>
-              <a:t>This is a very large relational set where one of the log file is ( 2B rows and 100GB uncompressed).</a:t>
-            </a:r>
+              <a:t>This is a very large relational set where one of the log file is ( 2B rows and 100GB uncompressed</a:t>
+            </a:r>
+            <a:r>
+              <a:rPr lang="en-US" dirty="0" smtClean="0"/>
+              <a:t>).</a:t>
+            </a:r>
+          </a:p>
+          <a:p>
+            <a:r>
+              <a:rPr lang="en-US" dirty="0"/>
+              <a:t>2 Billion page views and 16,900,000 clicks of 700 Million unique users, across 560 sites.</a:t>
+            </a:r>
+            <a:endParaRPr lang="en-US" dirty="0" smtClean="0"/>
           </a:p>
           <a:p>
             <a:r>
@@ -5720,7 +6149,7 @@
           <a:p>
             <a:r>
               <a:rPr lang="en-US" dirty="0" smtClean="0"/>
-              <a:t>Pre-Processing of data</a:t>
+              <a:t>data</a:t>
             </a:r>
             <a:endParaRPr lang="en-US" dirty="0"/>
           </a:p>
@@ -5745,15 +6174,35 @@
           <a:p>
             <a:r>
               <a:rPr lang="en-US" dirty="0" smtClean="0"/>
-              <a:t>Collected Data from multiple CSV files</a:t>
-            </a:r>
-          </a:p>
-          <a:p>
+              <a:t>Collected Data from multiple CSV </a:t>
+            </a:r>
             <a:r>
               <a:rPr lang="en-US" dirty="0" smtClean="0"/>
-              <a:t>Graphical Representation of the data</a:t>
-            </a:r>
-            <a:endParaRPr lang="en-US" dirty="0"/>
+              <a:t>files</a:t>
+            </a:r>
+          </a:p>
+          <a:p>
+            <a:r>
+              <a:rPr lang="en-US" dirty="0"/>
+              <a:t>Database Size - ~9GB</a:t>
+            </a:r>
+          </a:p>
+          <a:p>
+            <a:r>
+              <a:rPr lang="en-US" dirty="0"/>
+              <a:t>Did not even load the PAGE_VIEW </a:t>
+            </a:r>
+            <a:r>
+              <a:rPr lang="en-US" dirty="0" err="1"/>
+              <a:t>enire</a:t>
+            </a:r>
+            <a:r>
+              <a:rPr lang="en-US" dirty="0"/>
+              <a:t> table!!</a:t>
+            </a:r>
+          </a:p>
+          <a:p>
+            <a:endParaRPr lang="en-US" dirty="0" smtClean="0"/>
           </a:p>
         </p:txBody>
       </p:sp>
@@ -5777,6 +6226,185 @@
               <a:t>4</a:t>
             </a:fld>
             <a:endParaRPr lang="en-US"/>
+          </a:p>
+        </p:txBody>
+      </p:sp>
+      <p:sp>
+        <p:nvSpPr>
+          <p:cNvPr id="6" name="Rectangle 5"/>
+          <p:cNvSpPr/>
+          <p:nvPr/>
+        </p:nvSpPr>
+        <p:spPr>
+          <a:xfrm>
+            <a:off x="540328" y="3408358"/>
+            <a:ext cx="13404273" cy="3046988"/>
+          </a:xfrm>
+          <a:prstGeom prst="rect">
+            <a:avLst/>
+          </a:prstGeom>
+        </p:spPr>
+        <p:txBody>
+          <a:bodyPr wrap="square">
+            <a:spAutoFit/>
+          </a:bodyPr>
+          <a:lstStyle/>
+          <a:p>
+            <a:r>
+              <a:rPr lang="is-IS" sz="1600" dirty="0">
+                <a:solidFill>
+                  <a:srgbClr val="000000"/>
+                </a:solidFill>
+                <a:latin typeface="Menlo" charset="0"/>
+              </a:rPr>
+              <a:t> table         </a:t>
+            </a:r>
+            <a:r>
+              <a:rPr lang="is-IS" sz="1600" dirty="0" smtClean="0">
+                <a:solidFill>
+                  <a:srgbClr val="000000"/>
+                </a:solidFill>
+                <a:latin typeface="Menlo" charset="0"/>
+              </a:rPr>
+              <a:t>       | </a:t>
+            </a:r>
+            <a:r>
+              <a:rPr lang="is-IS" sz="1600" dirty="0">
+                <a:solidFill>
+                  <a:srgbClr val="000000"/>
+                </a:solidFill>
+                <a:latin typeface="Menlo" charset="0"/>
+              </a:rPr>
+              <a:t>table_size | related_objects_size | total_table_size | live_rows </a:t>
+            </a:r>
+          </a:p>
+          <a:p>
+            <a:r>
+              <a:rPr lang="is-IS" sz="1600" dirty="0">
+                <a:solidFill>
+                  <a:srgbClr val="000000"/>
+                </a:solidFill>
+                <a:latin typeface="Menlo" charset="0"/>
+              </a:rPr>
+              <a:t>----------------------+------------+----------------------+------------------+-----------</a:t>
+            </a:r>
+          </a:p>
+          <a:p>
+            <a:r>
+              <a:rPr lang="is-IS" sz="1600" dirty="0">
+                <a:solidFill>
+                  <a:srgbClr val="000000"/>
+                </a:solidFill>
+                <a:latin typeface="Menlo" charset="0"/>
+              </a:rPr>
+              <a:t> promoted_content     | 32 MB      | 32 kB                | 32 MB            |    559583</a:t>
+            </a:r>
+          </a:p>
+          <a:p>
+            <a:r>
+              <a:rPr lang="is-IS" sz="1600" dirty="0">
+                <a:solidFill>
+                  <a:srgbClr val="000000"/>
+                </a:solidFill>
+                <a:latin typeface="Menlo" charset="0"/>
+              </a:rPr>
+              <a:t> documents_meta       | 164 MB     | 64 kB                | 164 MB           |   2999334</a:t>
+            </a:r>
+          </a:p>
+          <a:p>
+            <a:r>
+              <a:rPr lang="is-IS" sz="1600" dirty="0">
+                <a:solidFill>
+                  <a:srgbClr val="000000"/>
+                </a:solidFill>
+                <a:latin typeface="Menlo" charset="0"/>
+              </a:rPr>
+              <a:t> documents_categories | 273 MB     | 88 kB                | 273 MB           |   5481471</a:t>
+            </a:r>
+          </a:p>
+          <a:p>
+            <a:r>
+              <a:rPr lang="is-IS" sz="1600" dirty="0">
+                <a:solidFill>
+                  <a:srgbClr val="000000"/>
+                </a:solidFill>
+                <a:latin typeface="Menlo" charset="0"/>
+              </a:rPr>
+              <a:t> documents_entities   | 446 MB     | 136 kB               | 446 MB           |   5537633</a:t>
+            </a:r>
+          </a:p>
+          <a:p>
+            <a:r>
+              <a:rPr lang="is-IS" sz="1600" dirty="0">
+                <a:solidFill>
+                  <a:srgbClr val="000000"/>
+                </a:solidFill>
+                <a:latin typeface="Menlo" charset="0"/>
+              </a:rPr>
+              <a:t> page_views_sample    | 726 MB     | 200 kB               | 726 MB           |  10000008</a:t>
+            </a:r>
+          </a:p>
+          <a:p>
+            <a:r>
+              <a:rPr lang="is-IS" sz="1600" dirty="0">
+                <a:solidFill>
+                  <a:srgbClr val="000000"/>
+                </a:solidFill>
+                <a:latin typeface="Menlo" charset="0"/>
+              </a:rPr>
+              <a:t> documents_topics     | 564 MB     | 160 kB               | 564 MB           |  11325980</a:t>
+            </a:r>
+          </a:p>
+          <a:p>
+            <a:r>
+              <a:rPr lang="is-IS" sz="1600" dirty="0">
+                <a:solidFill>
+                  <a:srgbClr val="000000"/>
+                </a:solidFill>
+                <a:latin typeface="Menlo" charset="0"/>
+              </a:rPr>
+              <a:t> events               | 1822 MB    | 480 kB               | 1822 MB          |  23121858</a:t>
+            </a:r>
+          </a:p>
+          <a:p>
+            <a:r>
+              <a:rPr lang="is-IS" sz="1600" dirty="0">
+                <a:solidFill>
+                  <a:srgbClr val="000000"/>
+                </a:solidFill>
+                <a:latin typeface="Menlo" charset="0"/>
+              </a:rPr>
+              <a:t> clicks_test          | 1361 MB    | 360 kB               | 1361 MB          |  32225335</a:t>
+            </a:r>
+          </a:p>
+          <a:p>
+            <a:r>
+              <a:rPr lang="is-IS" sz="1600" dirty="0">
+                <a:solidFill>
+                  <a:srgbClr val="000000"/>
+                </a:solidFill>
+                <a:latin typeface="Menlo" charset="0"/>
+              </a:rPr>
+              <a:t> clicks_train         | 4336 MB    | 1112 kB              | 4337 MB          |  87141751</a:t>
+            </a:r>
+          </a:p>
+          <a:p>
+            <a:r>
+              <a:rPr lang="is-IS" sz="1600" dirty="0">
+                <a:solidFill>
+                  <a:srgbClr val="000000"/>
+                </a:solidFill>
+                <a:latin typeface="Menlo" charset="0"/>
+              </a:rPr>
+              <a:t> TOTAL                | 9724 MB    | 2632 kB              | 9726 MB          | 178392953</a:t>
+            </a:r>
+            <a:endParaRPr lang="is-IS" sz="1600" dirty="0">
+              <a:solidFill>
+                <a:srgbClr val="000000"/>
+              </a:solidFill>
+              <a:effectLst/>
+              <a:latin typeface="Menlo" charset="0"/>
+            </a:endParaRPr>
           </a:p>
         </p:txBody>
       </p:sp>
@@ -5827,7 +6455,7 @@
           <a:p>
             <a:r>
               <a:rPr lang="en-US" dirty="0" smtClean="0"/>
-              <a:t>Data Cleaning and Munging </a:t>
+              <a:t>DATA </a:t>
             </a:r>
             <a:r>
               <a:rPr lang="mr-IN" dirty="0" smtClean="0"/>
@@ -5835,7 +6463,7 @@
             </a:r>
             <a:r>
               <a:rPr lang="en-US" dirty="0" smtClean="0"/>
-              <a:t> Current Status</a:t>
+              <a:t> What is Page Views ?</a:t>
             </a:r>
             <a:endParaRPr lang="en-US" dirty="0"/>
           </a:p>
@@ -5843,124 +6471,7 @@
       </p:sp>
       <p:sp>
         <p:nvSpPr>
-          <p:cNvPr id="3" name="Content Placeholder 2"/>
-          <p:cNvSpPr>
-            <a:spLocks noGrp="1"/>
-          </p:cNvSpPr>
-          <p:nvPr>
-            <p:ph idx="1"/>
-          </p:nvPr>
-        </p:nvSpPr>
-        <p:spPr/>
-        <p:txBody>
-          <a:bodyPr>
-            <a:normAutofit/>
-          </a:bodyPr>
-          <a:lstStyle/>
-          <a:p>
-            <a:r>
-              <a:rPr lang="en-US" dirty="0" smtClean="0"/>
-              <a:t>Current Status</a:t>
-            </a:r>
-          </a:p>
-          <a:p>
-            <a:pPr lvl="1"/>
-            <a:r>
-              <a:rPr lang="en-US" dirty="0" smtClean="0"/>
-              <a:t>Analyzed data set using following notebook</a:t>
-            </a:r>
-          </a:p>
-          <a:p>
-            <a:pPr lvl="2"/>
-            <a:r>
-              <a:rPr lang="en-US" dirty="0" smtClean="0">
-                <a:hlinkClick r:id="rId2"/>
-              </a:rPr>
-              <a:t>DSClickPrediction</a:t>
-            </a:r>
-            <a:r>
-              <a:rPr lang="en-US" dirty="0" smtClean="0"/>
-              <a:t>/</a:t>
-            </a:r>
-            <a:r>
-              <a:rPr lang="en-US" dirty="0" smtClean="0">
-                <a:hlinkClick r:id="rId3"/>
-              </a:rPr>
-              <a:t>notebooks</a:t>
-            </a:r>
-            <a:r>
-              <a:rPr lang="en-US" dirty="0" smtClean="0"/>
-              <a:t>/</a:t>
-            </a:r>
-            <a:r>
-              <a:rPr lang="en-US" b="1" dirty="0" err="1" smtClean="0"/>
-              <a:t>OutbrainDataAnalysis.ipynb</a:t>
-            </a:r>
-            <a:endParaRPr lang="en-US" b="1" dirty="0" smtClean="0"/>
-          </a:p>
-          <a:p>
-            <a:pPr lvl="1"/>
-            <a:r>
-              <a:rPr lang="en-US" dirty="0" smtClean="0"/>
-              <a:t>Creating  a relational database locally</a:t>
-            </a:r>
-          </a:p>
-          <a:p>
-            <a:r>
-              <a:rPr lang="en-US" dirty="0" smtClean="0"/>
-              <a:t>Next Step</a:t>
-            </a:r>
-          </a:p>
-          <a:p>
-            <a:pPr lvl="1"/>
-            <a:r>
-              <a:rPr lang="en-US" dirty="0" smtClean="0"/>
-              <a:t>Create a de-normalized fact table to get all the features</a:t>
-            </a:r>
-          </a:p>
-          <a:p>
-            <a:pPr lvl="1"/>
-            <a:r>
-              <a:rPr lang="en-US" dirty="0" smtClean="0"/>
-              <a:t>Convert categorical variables into dummy variables</a:t>
-            </a:r>
-          </a:p>
-          <a:p>
-            <a:pPr lvl="1"/>
-            <a:r>
-              <a:rPr lang="en-US" dirty="0" smtClean="0"/>
-              <a:t>Lots of missing values </a:t>
-            </a:r>
-            <a:r>
-              <a:rPr lang="mr-IN" dirty="0" smtClean="0"/>
-              <a:t>–</a:t>
-            </a:r>
-            <a:r>
-              <a:rPr lang="en-US" dirty="0" smtClean="0"/>
-              <a:t> Need to decide how to handle them</a:t>
-            </a:r>
-          </a:p>
-          <a:p>
-            <a:pPr lvl="1"/>
-            <a:r>
-              <a:rPr lang="en-US" dirty="0" smtClean="0"/>
-              <a:t>Create Feature and Response vector</a:t>
-            </a:r>
-            <a:endParaRPr lang="en-US" dirty="0" smtClean="0"/>
-          </a:p>
-          <a:p>
-            <a:pPr lvl="1"/>
-            <a:endParaRPr lang="en-US" dirty="0" smtClean="0"/>
-          </a:p>
-          <a:p>
-            <a:pPr lvl="1"/>
-            <a:endParaRPr lang="en-US" dirty="0" smtClean="0"/>
-          </a:p>
-        </p:txBody>
-      </p:sp>
-      <p:sp>
-        <p:nvSpPr>
-          <p:cNvPr id="5" name="Slide Number Placeholder 4"/>
+          <p:cNvPr id="4" name="Slide Number Placeholder 3"/>
           <p:cNvSpPr>
             <a:spLocks noGrp="1"/>
           </p:cNvSpPr>
@@ -5981,16 +6492,52 @@
           </a:p>
         </p:txBody>
       </p:sp>
+      <p:pic>
+        <p:nvPicPr>
+          <p:cNvPr id="6" name="Content Placeholder 5"/>
+          <p:cNvPicPr>
+            <a:picLocks noGrp="1" noChangeAspect="1"/>
+          </p:cNvPicPr>
+          <p:nvPr>
+            <p:ph idx="1"/>
+          </p:nvPr>
+        </p:nvPicPr>
+        <p:blipFill>
+          <a:blip r:embed="rId2">
+            <a:extLst>
+              <a:ext uri="{28A0092B-C50C-407E-A947-70E740481C1C}">
+                <a14:useLocalDpi xmlns:a14="http://schemas.microsoft.com/office/drawing/2010/main" val="0"/>
+              </a:ext>
+            </a:extLst>
+          </a:blip>
+          <a:stretch>
+            <a:fillRect/>
+          </a:stretch>
+        </p:blipFill>
+        <p:spPr>
+          <a:xfrm>
+            <a:off x="1800657" y="1511380"/>
+            <a:ext cx="7758979" cy="5126529"/>
+          </a:xfrm>
+        </p:spPr>
+      </p:pic>
     </p:spTree>
     <p:extLst>
       <p:ext uri="{BB962C8B-B14F-4D97-AF65-F5344CB8AC3E}">
-        <p14:creationId xmlns:p14="http://schemas.microsoft.com/office/powerpoint/2010/main" val="1120634943"/>
+        <p14:creationId xmlns:p14="http://schemas.microsoft.com/office/powerpoint/2010/main" val="1508989838"/>
       </p:ext>
     </p:extLst>
   </p:cSld>
   <p:clrMapOvr>
     <a:masterClrMapping/>
   </p:clrMapOvr>
+  <p:timing>
+    <p:tnLst>
+      <p:par>
+        <p:cTn id="1" dur="indefinite" restart="never" nodeType="tmRoot"/>
+      </p:par>
+    </p:tnLst>
+  </p:timing>
 </p:sld>
 </file>
 
@@ -6028,7 +6575,223 @@
           <a:p>
             <a:r>
               <a:rPr lang="en-US" dirty="0" smtClean="0"/>
-              <a:t>Project -  Next Steps</a:t>
+              <a:t>Data </a:t>
+            </a:r>
+            <a:r>
+              <a:rPr lang="en-US" dirty="0" smtClean="0"/>
+              <a:t>- Cleaning </a:t>
+            </a:r>
+            <a:r>
+              <a:rPr lang="en-US" dirty="0" smtClean="0"/>
+              <a:t>and </a:t>
+            </a:r>
+            <a:r>
+              <a:rPr lang="en-US" dirty="0" smtClean="0"/>
+              <a:t>Munging</a:t>
+            </a:r>
+            <a:endParaRPr lang="en-US" dirty="0"/>
+          </a:p>
+        </p:txBody>
+      </p:sp>
+      <p:sp>
+        <p:nvSpPr>
+          <p:cNvPr id="3" name="Content Placeholder 2"/>
+          <p:cNvSpPr>
+            <a:spLocks noGrp="1"/>
+          </p:cNvSpPr>
+          <p:nvPr>
+            <p:ph idx="1"/>
+          </p:nvPr>
+        </p:nvSpPr>
+        <p:spPr/>
+        <p:txBody>
+          <a:bodyPr>
+            <a:normAutofit/>
+          </a:bodyPr>
+          <a:lstStyle/>
+          <a:p>
+            <a:r>
+              <a:rPr lang="en-US" dirty="0" smtClean="0"/>
+              <a:t>Current Status</a:t>
+            </a:r>
+          </a:p>
+          <a:p>
+            <a:pPr lvl="1"/>
+            <a:r>
+              <a:rPr lang="en-US" dirty="0" smtClean="0"/>
+              <a:t>Analysis is in progress using </a:t>
+            </a:r>
+            <a:r>
+              <a:rPr lang="en-US" dirty="0" smtClean="0"/>
+              <a:t>following notebook</a:t>
+            </a:r>
+          </a:p>
+          <a:p>
+            <a:pPr lvl="2"/>
+            <a:r>
+              <a:rPr lang="en-US" dirty="0" smtClean="0">
+                <a:hlinkClick r:id="rId2"/>
+              </a:rPr>
+              <a:t>DSClickPrediction/notebooks/</a:t>
+            </a:r>
+            <a:r>
+              <a:rPr lang="en-US" b="1" dirty="0" err="1" smtClean="0">
+                <a:hlinkClick r:id="rId2"/>
+              </a:rPr>
+              <a:t>OutbrainDataAnalysis.ipynb</a:t>
+            </a:r>
+            <a:endParaRPr lang="en-US" b="1" dirty="0" smtClean="0"/>
+          </a:p>
+          <a:p>
+            <a:pPr lvl="1"/>
+            <a:r>
+              <a:rPr lang="en-US" dirty="0" smtClean="0"/>
+              <a:t>Created  </a:t>
+            </a:r>
+            <a:r>
+              <a:rPr lang="en-US" dirty="0" smtClean="0"/>
+              <a:t>a relational database </a:t>
+            </a:r>
+            <a:r>
+              <a:rPr lang="en-US" dirty="0" smtClean="0"/>
+              <a:t>locally for each data set</a:t>
+            </a:r>
+            <a:endParaRPr lang="en-US" dirty="0" smtClean="0"/>
+          </a:p>
+          <a:p>
+            <a:r>
+              <a:rPr lang="en-US" dirty="0" smtClean="0"/>
+              <a:t>Next Step</a:t>
+            </a:r>
+          </a:p>
+          <a:p>
+            <a:pPr lvl="1"/>
+            <a:r>
+              <a:rPr lang="en-US" dirty="0" smtClean="0"/>
+              <a:t>Create a de-normalized fact table to get all the features</a:t>
+            </a:r>
+          </a:p>
+          <a:p>
+            <a:pPr lvl="1"/>
+            <a:r>
+              <a:rPr lang="en-US" dirty="0" smtClean="0"/>
+              <a:t>Convert categorical variables into dummy variables</a:t>
+            </a:r>
+          </a:p>
+          <a:p>
+            <a:pPr lvl="1"/>
+            <a:r>
+              <a:rPr lang="en-US" dirty="0" smtClean="0"/>
+              <a:t>Lots of missing values </a:t>
+            </a:r>
+            <a:r>
+              <a:rPr lang="mr-IN" dirty="0" smtClean="0"/>
+              <a:t>–</a:t>
+            </a:r>
+            <a:r>
+              <a:rPr lang="en-US" dirty="0" smtClean="0"/>
+              <a:t> Need to decide how to handle them</a:t>
+            </a:r>
+          </a:p>
+          <a:p>
+            <a:pPr lvl="1"/>
+            <a:r>
+              <a:rPr lang="en-US" dirty="0" smtClean="0"/>
+              <a:t>Create Feature and Response vector</a:t>
+            </a:r>
+          </a:p>
+          <a:p>
+            <a:pPr lvl="1"/>
+            <a:endParaRPr lang="en-US" dirty="0" smtClean="0"/>
+          </a:p>
+          <a:p>
+            <a:pPr lvl="1"/>
+            <a:endParaRPr lang="en-US" dirty="0" smtClean="0"/>
+          </a:p>
+        </p:txBody>
+      </p:sp>
+      <p:sp>
+        <p:nvSpPr>
+          <p:cNvPr id="5" name="Slide Number Placeholder 4"/>
+          <p:cNvSpPr>
+            <a:spLocks noGrp="1"/>
+          </p:cNvSpPr>
+          <p:nvPr>
+            <p:ph type="sldNum" sz="quarter" idx="12"/>
+          </p:nvPr>
+        </p:nvSpPr>
+        <p:spPr/>
+        <p:txBody>
+          <a:bodyPr/>
+          <a:lstStyle/>
+          <a:p>
+            <a:fld id="{D875CEC6-8E5A-CE43-9ACC-02DF7099DAAF}" type="slidenum">
+              <a:rPr lang="en-US" smtClean="0"/>
+              <a:t>6</a:t>
+            </a:fld>
+            <a:endParaRPr lang="en-US"/>
+          </a:p>
+        </p:txBody>
+      </p:sp>
+    </p:spTree>
+    <p:extLst>
+      <p:ext uri="{BB962C8B-B14F-4D97-AF65-F5344CB8AC3E}">
+        <p14:creationId xmlns:p14="http://schemas.microsoft.com/office/powerpoint/2010/main" val="1120634943"/>
+      </p:ext>
+    </p:extLst>
+  </p:cSld>
+  <p:clrMapOvr>
+    <a:masterClrMapping/>
+  </p:clrMapOvr>
+  <p:timing>
+    <p:tnLst>
+      <p:par>
+        <p:cTn id="1" dur="indefinite" restart="never" nodeType="tmRoot"/>
+      </p:par>
+    </p:tnLst>
+  </p:timing>
+</p:sld>
+</file>
+
+<file path=ppt/slides/slide7.xml><?xml version="1.0" encoding="utf-8"?>
+<p:sld xmlns:a="http://schemas.openxmlformats.org/drawingml/2006/main" xmlns:r="http://schemas.openxmlformats.org/officeDocument/2006/relationships" xmlns:p="http://schemas.openxmlformats.org/presentationml/2006/main">
+  <p:cSld>
+    <p:spTree>
+      <p:nvGrpSpPr>
+        <p:cNvPr id="1" name=""/>
+        <p:cNvGrpSpPr/>
+        <p:nvPr/>
+      </p:nvGrpSpPr>
+      <p:grpSpPr>
+        <a:xfrm>
+          <a:off x="0" y="0"/>
+          <a:ext cx="0" cy="0"/>
+          <a:chOff x="0" y="0"/>
+          <a:chExt cx="0" cy="0"/>
+        </a:xfrm>
+      </p:grpSpPr>
+      <p:sp>
+        <p:nvSpPr>
+          <p:cNvPr id="2" name="Title 1"/>
+          <p:cNvSpPr>
+            <a:spLocks noGrp="1"/>
+          </p:cNvSpPr>
+          <p:nvPr>
+            <p:ph type="title"/>
+          </p:nvPr>
+        </p:nvSpPr>
+        <p:spPr/>
+        <p:txBody>
+          <a:bodyPr/>
+          <a:lstStyle/>
+          <a:p>
+            <a:r>
+              <a:rPr lang="en-US" dirty="0"/>
+              <a:t>Project -  </a:t>
+            </a:r>
+            <a:r>
+              <a:rPr lang="en-US" dirty="0" smtClean="0"/>
+              <a:t>Next Steps</a:t>
             </a:r>
             <a:endParaRPr lang="en-US" dirty="0"/>
           </a:p>
@@ -6091,7 +6854,7 @@
           <a:p>
             <a:fld id="{D875CEC6-8E5A-CE43-9ACC-02DF7099DAAF}" type="slidenum">
               <a:rPr lang="en-US" smtClean="0"/>
-              <a:t>6</a:t>
+              <a:t>7</a:t>
             </a:fld>
             <a:endParaRPr lang="en-US"/>
           </a:p>
@@ -6101,6 +6864,862 @@
     <p:extLst>
       <p:ext uri="{BB962C8B-B14F-4D97-AF65-F5344CB8AC3E}">
         <p14:creationId xmlns:p14="http://schemas.microsoft.com/office/powerpoint/2010/main" val="377641290"/>
+      </p:ext>
+    </p:extLst>
+  </p:cSld>
+  <p:clrMapOvr>
+    <a:masterClrMapping/>
+  </p:clrMapOvr>
+  <p:timing>
+    <p:tnLst>
+      <p:par>
+        <p:cTn id="1" dur="indefinite" restart="never" nodeType="tmRoot"/>
+      </p:par>
+    </p:tnLst>
+  </p:timing>
+</p:sld>
+</file>
+
+<file path=ppt/slides/slide8.xml><?xml version="1.0" encoding="utf-8"?>
+<p:sld xmlns:a="http://schemas.openxmlformats.org/drawingml/2006/main" xmlns:r="http://schemas.openxmlformats.org/officeDocument/2006/relationships" xmlns:p="http://schemas.openxmlformats.org/presentationml/2006/main">
+  <p:cSld>
+    <p:spTree>
+      <p:nvGrpSpPr>
+        <p:cNvPr id="1" name=""/>
+        <p:cNvGrpSpPr/>
+        <p:nvPr/>
+      </p:nvGrpSpPr>
+      <p:grpSpPr>
+        <a:xfrm>
+          <a:off x="0" y="0"/>
+          <a:ext cx="0" cy="0"/>
+          <a:chOff x="0" y="0"/>
+          <a:chExt cx="0" cy="0"/>
+        </a:xfrm>
+      </p:grpSpPr>
+      <p:sp>
+        <p:nvSpPr>
+          <p:cNvPr id="2" name="Title 1"/>
+          <p:cNvSpPr>
+            <a:spLocks noGrp="1"/>
+          </p:cNvSpPr>
+          <p:nvPr>
+            <p:ph type="title"/>
+          </p:nvPr>
+        </p:nvSpPr>
+        <p:spPr/>
+        <p:txBody>
+          <a:bodyPr/>
+          <a:lstStyle/>
+          <a:p>
+            <a:r>
+              <a:rPr lang="en-US" dirty="0" smtClean="0"/>
+              <a:t>Questions ?</a:t>
+            </a:r>
+            <a:endParaRPr lang="en-US" dirty="0"/>
+          </a:p>
+        </p:txBody>
+      </p:sp>
+      <p:sp>
+        <p:nvSpPr>
+          <p:cNvPr id="4" name="Slide Number Placeholder 3"/>
+          <p:cNvSpPr>
+            <a:spLocks noGrp="1"/>
+          </p:cNvSpPr>
+          <p:nvPr>
+            <p:ph type="sldNum" sz="quarter" idx="12"/>
+          </p:nvPr>
+        </p:nvSpPr>
+        <p:spPr/>
+        <p:txBody>
+          <a:bodyPr/>
+          <a:lstStyle/>
+          <a:p>
+            <a:fld id="{D875CEC6-8E5A-CE43-9ACC-02DF7099DAAF}" type="slidenum">
+              <a:rPr lang="en-US" smtClean="0"/>
+              <a:t>8</a:t>
+            </a:fld>
+            <a:endParaRPr lang="en-US"/>
+          </a:p>
+        </p:txBody>
+      </p:sp>
+      <p:sp>
+        <p:nvSpPr>
+          <p:cNvPr id="5" name="Content Placeholder 4"/>
+          <p:cNvSpPr>
+            <a:spLocks noGrp="1"/>
+          </p:cNvSpPr>
+          <p:nvPr>
+            <p:ph idx="1"/>
+          </p:nvPr>
+        </p:nvSpPr>
+        <p:spPr/>
+        <p:txBody>
+          <a:bodyPr/>
+          <a:lstStyle/>
+          <a:p>
+            <a:endParaRPr lang="en-US"/>
+          </a:p>
+        </p:txBody>
+      </p:sp>
+    </p:spTree>
+    <p:extLst>
+      <p:ext uri="{BB962C8B-B14F-4D97-AF65-F5344CB8AC3E}">
+        <p14:creationId xmlns:p14="http://schemas.microsoft.com/office/powerpoint/2010/main" val="841622756"/>
+      </p:ext>
+    </p:extLst>
+  </p:cSld>
+  <p:clrMapOvr>
+    <a:masterClrMapping/>
+  </p:clrMapOvr>
+  <p:timing>
+    <p:tnLst>
+      <p:par>
+        <p:cTn id="1" dur="indefinite" restart="never" nodeType="tmRoot"/>
+      </p:par>
+    </p:tnLst>
+  </p:timing>
+</p:sld>
+</file>
+
+<file path=ppt/slides/slide9.xml><?xml version="1.0" encoding="utf-8"?>
+<p:sld xmlns:a="http://schemas.openxmlformats.org/drawingml/2006/main" xmlns:r="http://schemas.openxmlformats.org/officeDocument/2006/relationships" xmlns:p="http://schemas.openxmlformats.org/presentationml/2006/main">
+  <p:cSld>
+    <p:spTree>
+      <p:nvGrpSpPr>
+        <p:cNvPr id="1" name=""/>
+        <p:cNvGrpSpPr/>
+        <p:nvPr/>
+      </p:nvGrpSpPr>
+      <p:grpSpPr>
+        <a:xfrm>
+          <a:off x="0" y="0"/>
+          <a:ext cx="0" cy="0"/>
+          <a:chOff x="0" y="0"/>
+          <a:chExt cx="0" cy="0"/>
+        </a:xfrm>
+      </p:grpSpPr>
+      <p:sp>
+        <p:nvSpPr>
+          <p:cNvPr id="2" name="Title 1"/>
+          <p:cNvSpPr>
+            <a:spLocks noGrp="1"/>
+          </p:cNvSpPr>
+          <p:nvPr>
+            <p:ph type="title"/>
+          </p:nvPr>
+        </p:nvSpPr>
+        <p:spPr/>
+        <p:txBody>
+          <a:bodyPr/>
+          <a:lstStyle/>
+          <a:p>
+            <a:r>
+              <a:rPr lang="en-US" dirty="0" smtClean="0"/>
+              <a:t>APPENDIX </a:t>
+            </a:r>
+            <a:r>
+              <a:rPr lang="mr-IN" dirty="0" smtClean="0"/>
+              <a:t>–</a:t>
+            </a:r>
+            <a:r>
+              <a:rPr lang="en-US" dirty="0" smtClean="0"/>
+              <a:t> II ; Graphical Representation of the data</a:t>
+            </a:r>
+            <a:endParaRPr lang="en-US" dirty="0"/>
+          </a:p>
+        </p:txBody>
+      </p:sp>
+      <p:sp>
+        <p:nvSpPr>
+          <p:cNvPr id="4" name="Slide Number Placeholder 3"/>
+          <p:cNvSpPr>
+            <a:spLocks noGrp="1"/>
+          </p:cNvSpPr>
+          <p:nvPr>
+            <p:ph type="sldNum" sz="quarter" idx="12"/>
+          </p:nvPr>
+        </p:nvSpPr>
+        <p:spPr/>
+        <p:txBody>
+          <a:bodyPr/>
+          <a:lstStyle/>
+          <a:p>
+            <a:fld id="{D875CEC6-8E5A-CE43-9ACC-02DF7099DAAF}" type="slidenum">
+              <a:rPr lang="en-US" smtClean="0"/>
+              <a:t>9</a:t>
+            </a:fld>
+            <a:endParaRPr lang="en-US"/>
+          </a:p>
+        </p:txBody>
+      </p:sp>
+      <p:sp>
+        <p:nvSpPr>
+          <p:cNvPr id="6" name="Rectangle 5"/>
+          <p:cNvSpPr/>
+          <p:nvPr/>
+        </p:nvSpPr>
+        <p:spPr>
+          <a:xfrm>
+            <a:off x="5070764" y="2327564"/>
+            <a:ext cx="1350818" cy="457200"/>
+          </a:xfrm>
+          <a:prstGeom prst="rect">
+            <a:avLst/>
+          </a:prstGeom>
+        </p:spPr>
+        <p:style>
+          <a:lnRef idx="2">
+            <a:schemeClr val="accent1">
+              <a:shade val="50000"/>
+            </a:schemeClr>
+          </a:lnRef>
+          <a:fillRef idx="1">
+            <a:schemeClr val="accent1"/>
+          </a:fillRef>
+          <a:effectRef idx="0">
+            <a:schemeClr val="accent1"/>
+          </a:effectRef>
+          <a:fontRef idx="minor">
+            <a:schemeClr val="lt1"/>
+          </a:fontRef>
+        </p:style>
+        <p:txBody>
+          <a:bodyPr rtlCol="0" anchor="ctr"/>
+          <a:lstStyle/>
+          <a:p>
+            <a:pPr algn="ctr"/>
+            <a:r>
+              <a:rPr lang="en-US" smtClean="0"/>
+              <a:t>Raw Data</a:t>
+            </a:r>
+            <a:endParaRPr lang="en-US"/>
+          </a:p>
+        </p:txBody>
+      </p:sp>
+      <p:sp>
+        <p:nvSpPr>
+          <p:cNvPr id="10" name="Rectangle 9"/>
+          <p:cNvSpPr/>
+          <p:nvPr/>
+        </p:nvSpPr>
+        <p:spPr>
+          <a:xfrm>
+            <a:off x="2729344" y="3291424"/>
+            <a:ext cx="1350818" cy="457200"/>
+          </a:xfrm>
+          <a:prstGeom prst="rect">
+            <a:avLst/>
+          </a:prstGeom>
+        </p:spPr>
+        <p:style>
+          <a:lnRef idx="2">
+            <a:schemeClr val="accent1">
+              <a:shade val="50000"/>
+            </a:schemeClr>
+          </a:lnRef>
+          <a:fillRef idx="1">
+            <a:schemeClr val="accent1"/>
+          </a:fillRef>
+          <a:effectRef idx="0">
+            <a:schemeClr val="accent1"/>
+          </a:effectRef>
+          <a:fontRef idx="minor">
+            <a:schemeClr val="lt1"/>
+          </a:fontRef>
+        </p:style>
+        <p:txBody>
+          <a:bodyPr rtlCol="0" anchor="ctr"/>
+          <a:lstStyle/>
+          <a:p>
+            <a:pPr algn="ctr"/>
+            <a:r>
+              <a:rPr lang="en-US" dirty="0" smtClean="0"/>
+              <a:t>Document</a:t>
+            </a:r>
+            <a:endParaRPr lang="en-US" dirty="0"/>
+          </a:p>
+        </p:txBody>
+      </p:sp>
+      <p:sp>
+        <p:nvSpPr>
+          <p:cNvPr id="11" name="Rectangle 10"/>
+          <p:cNvSpPr/>
+          <p:nvPr/>
+        </p:nvSpPr>
+        <p:spPr>
+          <a:xfrm>
+            <a:off x="8206877" y="3291424"/>
+            <a:ext cx="1350818" cy="457200"/>
+          </a:xfrm>
+          <a:prstGeom prst="rect">
+            <a:avLst/>
+          </a:prstGeom>
+        </p:spPr>
+        <p:style>
+          <a:lnRef idx="2">
+            <a:schemeClr val="accent1">
+              <a:shade val="50000"/>
+            </a:schemeClr>
+          </a:lnRef>
+          <a:fillRef idx="1">
+            <a:schemeClr val="accent1"/>
+          </a:fillRef>
+          <a:effectRef idx="0">
+            <a:schemeClr val="accent1"/>
+          </a:effectRef>
+          <a:fontRef idx="minor">
+            <a:schemeClr val="lt1"/>
+          </a:fontRef>
+        </p:style>
+        <p:txBody>
+          <a:bodyPr rtlCol="0" anchor="ctr"/>
+          <a:lstStyle/>
+          <a:p>
+            <a:pPr algn="ctr"/>
+            <a:r>
+              <a:rPr lang="en-US" dirty="0" smtClean="0"/>
+              <a:t>AD</a:t>
+            </a:r>
+            <a:endParaRPr lang="en-US" dirty="0"/>
+          </a:p>
+        </p:txBody>
+      </p:sp>
+      <p:sp>
+        <p:nvSpPr>
+          <p:cNvPr id="12" name="Rectangle 11"/>
+          <p:cNvSpPr/>
+          <p:nvPr/>
+        </p:nvSpPr>
+        <p:spPr>
+          <a:xfrm>
+            <a:off x="1069848" y="4294911"/>
+            <a:ext cx="1350818" cy="457200"/>
+          </a:xfrm>
+          <a:prstGeom prst="rect">
+            <a:avLst/>
+          </a:prstGeom>
+        </p:spPr>
+        <p:style>
+          <a:lnRef idx="2">
+            <a:schemeClr val="accent1">
+              <a:shade val="50000"/>
+            </a:schemeClr>
+          </a:lnRef>
+          <a:fillRef idx="1">
+            <a:schemeClr val="accent1"/>
+          </a:fillRef>
+          <a:effectRef idx="0">
+            <a:schemeClr val="accent1"/>
+          </a:effectRef>
+          <a:fontRef idx="minor">
+            <a:schemeClr val="lt1"/>
+          </a:fontRef>
+        </p:style>
+        <p:txBody>
+          <a:bodyPr rtlCol="0" anchor="ctr"/>
+          <a:lstStyle/>
+          <a:p>
+            <a:pPr algn="ctr"/>
+            <a:r>
+              <a:rPr lang="en-US" dirty="0" smtClean="0"/>
+              <a:t>Topic</a:t>
+            </a:r>
+            <a:endParaRPr lang="en-US" dirty="0"/>
+          </a:p>
+        </p:txBody>
+      </p:sp>
+      <p:sp>
+        <p:nvSpPr>
+          <p:cNvPr id="13" name="Rectangle 12"/>
+          <p:cNvSpPr/>
+          <p:nvPr/>
+        </p:nvSpPr>
+        <p:spPr>
+          <a:xfrm>
+            <a:off x="2713551" y="4294911"/>
+            <a:ext cx="1350818" cy="457200"/>
+          </a:xfrm>
+          <a:prstGeom prst="rect">
+            <a:avLst/>
+          </a:prstGeom>
+        </p:spPr>
+        <p:style>
+          <a:lnRef idx="2">
+            <a:schemeClr val="accent1">
+              <a:shade val="50000"/>
+            </a:schemeClr>
+          </a:lnRef>
+          <a:fillRef idx="1">
+            <a:schemeClr val="accent1"/>
+          </a:fillRef>
+          <a:effectRef idx="0">
+            <a:schemeClr val="accent1"/>
+          </a:effectRef>
+          <a:fontRef idx="minor">
+            <a:schemeClr val="lt1"/>
+          </a:fontRef>
+        </p:style>
+        <p:txBody>
+          <a:bodyPr rtlCol="0" anchor="ctr"/>
+          <a:lstStyle/>
+          <a:p>
+            <a:pPr algn="ctr"/>
+            <a:r>
+              <a:rPr lang="en-US" dirty="0" smtClean="0"/>
+              <a:t>Category</a:t>
+            </a:r>
+            <a:endParaRPr lang="en-US" dirty="0"/>
+          </a:p>
+        </p:txBody>
+      </p:sp>
+      <p:sp>
+        <p:nvSpPr>
+          <p:cNvPr id="14" name="Rectangle 13"/>
+          <p:cNvSpPr/>
+          <p:nvPr/>
+        </p:nvSpPr>
+        <p:spPr>
+          <a:xfrm>
+            <a:off x="4357254" y="4294911"/>
+            <a:ext cx="1350818" cy="457200"/>
+          </a:xfrm>
+          <a:prstGeom prst="rect">
+            <a:avLst/>
+          </a:prstGeom>
+        </p:spPr>
+        <p:style>
+          <a:lnRef idx="2">
+            <a:schemeClr val="accent1">
+              <a:shade val="50000"/>
+            </a:schemeClr>
+          </a:lnRef>
+          <a:fillRef idx="1">
+            <a:schemeClr val="accent1"/>
+          </a:fillRef>
+          <a:effectRef idx="0">
+            <a:schemeClr val="accent1"/>
+          </a:effectRef>
+          <a:fontRef idx="minor">
+            <a:schemeClr val="lt1"/>
+          </a:fontRef>
+        </p:style>
+        <p:txBody>
+          <a:bodyPr rtlCol="0" anchor="ctr"/>
+          <a:lstStyle/>
+          <a:p>
+            <a:pPr algn="ctr"/>
+            <a:r>
+              <a:rPr lang="en-US" smtClean="0"/>
+              <a:t>Source</a:t>
+            </a:r>
+            <a:endParaRPr lang="en-US" dirty="0"/>
+          </a:p>
+        </p:txBody>
+      </p:sp>
+      <p:sp>
+        <p:nvSpPr>
+          <p:cNvPr id="15" name="Rectangle 14"/>
+          <p:cNvSpPr/>
+          <p:nvPr/>
+        </p:nvSpPr>
+        <p:spPr>
+          <a:xfrm>
+            <a:off x="6856059" y="4294911"/>
+            <a:ext cx="1350818" cy="457200"/>
+          </a:xfrm>
+          <a:prstGeom prst="rect">
+            <a:avLst/>
+          </a:prstGeom>
+        </p:spPr>
+        <p:style>
+          <a:lnRef idx="2">
+            <a:schemeClr val="accent1">
+              <a:shade val="50000"/>
+            </a:schemeClr>
+          </a:lnRef>
+          <a:fillRef idx="1">
+            <a:schemeClr val="accent1"/>
+          </a:fillRef>
+          <a:effectRef idx="0">
+            <a:schemeClr val="accent1"/>
+          </a:effectRef>
+          <a:fontRef idx="minor">
+            <a:schemeClr val="lt1"/>
+          </a:fontRef>
+        </p:style>
+        <p:txBody>
+          <a:bodyPr rtlCol="0" anchor="ctr"/>
+          <a:lstStyle/>
+          <a:p>
+            <a:pPr algn="ctr"/>
+            <a:r>
+              <a:rPr lang="en-US" dirty="0" smtClean="0"/>
+              <a:t>Advertiser</a:t>
+            </a:r>
+            <a:endParaRPr lang="en-US" dirty="0"/>
+          </a:p>
+        </p:txBody>
+      </p:sp>
+      <p:sp>
+        <p:nvSpPr>
+          <p:cNvPr id="16" name="Rectangle 15"/>
+          <p:cNvSpPr/>
+          <p:nvPr/>
+        </p:nvSpPr>
+        <p:spPr>
+          <a:xfrm>
+            <a:off x="9608127" y="4301840"/>
+            <a:ext cx="1350818" cy="457200"/>
+          </a:xfrm>
+          <a:prstGeom prst="rect">
+            <a:avLst/>
+          </a:prstGeom>
+        </p:spPr>
+        <p:style>
+          <a:lnRef idx="2">
+            <a:schemeClr val="accent1">
+              <a:shade val="50000"/>
+            </a:schemeClr>
+          </a:lnRef>
+          <a:fillRef idx="1">
+            <a:schemeClr val="accent1"/>
+          </a:fillRef>
+          <a:effectRef idx="0">
+            <a:schemeClr val="accent1"/>
+          </a:effectRef>
+          <a:fontRef idx="minor">
+            <a:schemeClr val="lt1"/>
+          </a:fontRef>
+        </p:style>
+        <p:txBody>
+          <a:bodyPr rtlCol="0" anchor="ctr"/>
+          <a:lstStyle/>
+          <a:p>
+            <a:pPr algn="ctr"/>
+            <a:r>
+              <a:rPr lang="en-US" dirty="0" smtClean="0"/>
+              <a:t>Campaign</a:t>
+            </a:r>
+            <a:endParaRPr lang="en-US" dirty="0"/>
+          </a:p>
+        </p:txBody>
+      </p:sp>
+      <p:cxnSp>
+        <p:nvCxnSpPr>
+          <p:cNvPr id="18" name="Straight Arrow Connector 17"/>
+          <p:cNvCxnSpPr>
+            <a:stCxn id="6" idx="1"/>
+            <a:endCxn id="10" idx="0"/>
+          </p:cNvCxnSpPr>
+          <p:nvPr/>
+        </p:nvCxnSpPr>
+        <p:spPr>
+          <a:xfrm flipH="1">
+            <a:off x="3404753" y="2556164"/>
+            <a:ext cx="1666011" cy="735260"/>
+          </a:xfrm>
+          <a:prstGeom prst="straightConnector1">
+            <a:avLst/>
+          </a:prstGeom>
+          <a:ln>
+            <a:tailEnd type="triangle"/>
+          </a:ln>
+        </p:spPr>
+        <p:style>
+          <a:lnRef idx="1">
+            <a:schemeClr val="accent1"/>
+          </a:lnRef>
+          <a:fillRef idx="0">
+            <a:schemeClr val="accent1"/>
+          </a:fillRef>
+          <a:effectRef idx="0">
+            <a:schemeClr val="accent1"/>
+          </a:effectRef>
+          <a:fontRef idx="minor">
+            <a:schemeClr val="tx1"/>
+          </a:fontRef>
+        </p:style>
+      </p:cxnSp>
+      <p:cxnSp>
+        <p:nvCxnSpPr>
+          <p:cNvPr id="20" name="Straight Arrow Connector 19"/>
+          <p:cNvCxnSpPr>
+            <a:stCxn id="10" idx="2"/>
+            <a:endCxn id="12" idx="0"/>
+          </p:cNvCxnSpPr>
+          <p:nvPr/>
+        </p:nvCxnSpPr>
+        <p:spPr>
+          <a:xfrm flipH="1">
+            <a:off x="1745257" y="3748624"/>
+            <a:ext cx="1659496" cy="546287"/>
+          </a:xfrm>
+          <a:prstGeom prst="straightConnector1">
+            <a:avLst/>
+          </a:prstGeom>
+          <a:ln>
+            <a:tailEnd type="triangle"/>
+          </a:ln>
+        </p:spPr>
+        <p:style>
+          <a:lnRef idx="1">
+            <a:schemeClr val="accent1"/>
+          </a:lnRef>
+          <a:fillRef idx="0">
+            <a:schemeClr val="accent1"/>
+          </a:fillRef>
+          <a:effectRef idx="0">
+            <a:schemeClr val="accent1"/>
+          </a:effectRef>
+          <a:fontRef idx="minor">
+            <a:schemeClr val="tx1"/>
+          </a:fontRef>
+        </p:style>
+      </p:cxnSp>
+      <p:cxnSp>
+        <p:nvCxnSpPr>
+          <p:cNvPr id="22" name="Straight Arrow Connector 21"/>
+          <p:cNvCxnSpPr>
+            <a:stCxn id="10" idx="2"/>
+            <a:endCxn id="13" idx="0"/>
+          </p:cNvCxnSpPr>
+          <p:nvPr/>
+        </p:nvCxnSpPr>
+        <p:spPr>
+          <a:xfrm flipH="1">
+            <a:off x="3388960" y="3748624"/>
+            <a:ext cx="15793" cy="546287"/>
+          </a:xfrm>
+          <a:prstGeom prst="straightConnector1">
+            <a:avLst/>
+          </a:prstGeom>
+          <a:ln>
+            <a:tailEnd type="triangle"/>
+          </a:ln>
+        </p:spPr>
+        <p:style>
+          <a:lnRef idx="1">
+            <a:schemeClr val="accent1"/>
+          </a:lnRef>
+          <a:fillRef idx="0">
+            <a:schemeClr val="accent1"/>
+          </a:fillRef>
+          <a:effectRef idx="0">
+            <a:schemeClr val="accent1"/>
+          </a:effectRef>
+          <a:fontRef idx="minor">
+            <a:schemeClr val="tx1"/>
+          </a:fontRef>
+        </p:style>
+      </p:cxnSp>
+      <p:cxnSp>
+        <p:nvCxnSpPr>
+          <p:cNvPr id="23" name="Straight Arrow Connector 22"/>
+          <p:cNvCxnSpPr>
+            <a:stCxn id="10" idx="2"/>
+            <a:endCxn id="14" idx="0"/>
+          </p:cNvCxnSpPr>
+          <p:nvPr/>
+        </p:nvCxnSpPr>
+        <p:spPr>
+          <a:xfrm>
+            <a:off x="3404753" y="3748624"/>
+            <a:ext cx="1627910" cy="546287"/>
+          </a:xfrm>
+          <a:prstGeom prst="straightConnector1">
+            <a:avLst/>
+          </a:prstGeom>
+          <a:ln>
+            <a:tailEnd type="triangle"/>
+          </a:ln>
+        </p:spPr>
+        <p:style>
+          <a:lnRef idx="1">
+            <a:schemeClr val="accent1"/>
+          </a:lnRef>
+          <a:fillRef idx="0">
+            <a:schemeClr val="accent1"/>
+          </a:fillRef>
+          <a:effectRef idx="0">
+            <a:schemeClr val="accent1"/>
+          </a:effectRef>
+          <a:fontRef idx="minor">
+            <a:schemeClr val="tx1"/>
+          </a:fontRef>
+        </p:style>
+      </p:cxnSp>
+      <p:cxnSp>
+        <p:nvCxnSpPr>
+          <p:cNvPr id="27" name="Straight Arrow Connector 26"/>
+          <p:cNvCxnSpPr>
+            <a:stCxn id="11" idx="2"/>
+            <a:endCxn id="15" idx="0"/>
+          </p:cNvCxnSpPr>
+          <p:nvPr/>
+        </p:nvCxnSpPr>
+        <p:spPr>
+          <a:xfrm flipH="1">
+            <a:off x="7531468" y="3748624"/>
+            <a:ext cx="1350818" cy="546287"/>
+          </a:xfrm>
+          <a:prstGeom prst="straightConnector1">
+            <a:avLst/>
+          </a:prstGeom>
+          <a:ln>
+            <a:tailEnd type="triangle"/>
+          </a:ln>
+        </p:spPr>
+        <p:style>
+          <a:lnRef idx="1">
+            <a:schemeClr val="accent1"/>
+          </a:lnRef>
+          <a:fillRef idx="0">
+            <a:schemeClr val="accent1"/>
+          </a:fillRef>
+          <a:effectRef idx="0">
+            <a:schemeClr val="accent1"/>
+          </a:effectRef>
+          <a:fontRef idx="minor">
+            <a:schemeClr val="tx1"/>
+          </a:fontRef>
+        </p:style>
+      </p:cxnSp>
+      <p:cxnSp>
+        <p:nvCxnSpPr>
+          <p:cNvPr id="30" name="Straight Arrow Connector 29"/>
+          <p:cNvCxnSpPr>
+            <a:stCxn id="11" idx="2"/>
+          </p:cNvCxnSpPr>
+          <p:nvPr/>
+        </p:nvCxnSpPr>
+        <p:spPr>
+          <a:xfrm>
+            <a:off x="8882286" y="3748624"/>
+            <a:ext cx="1401250" cy="553216"/>
+          </a:xfrm>
+          <a:prstGeom prst="straightConnector1">
+            <a:avLst/>
+          </a:prstGeom>
+          <a:ln>
+            <a:tailEnd type="triangle"/>
+          </a:ln>
+        </p:spPr>
+        <p:style>
+          <a:lnRef idx="1">
+            <a:schemeClr val="accent1"/>
+          </a:lnRef>
+          <a:fillRef idx="0">
+            <a:schemeClr val="accent1"/>
+          </a:fillRef>
+          <a:effectRef idx="0">
+            <a:schemeClr val="accent1"/>
+          </a:effectRef>
+          <a:fontRef idx="minor">
+            <a:schemeClr val="tx1"/>
+          </a:fontRef>
+        </p:style>
+      </p:cxnSp>
+      <p:cxnSp>
+        <p:nvCxnSpPr>
+          <p:cNvPr id="33" name="Straight Arrow Connector 32"/>
+          <p:cNvCxnSpPr>
+            <a:stCxn id="6" idx="3"/>
+            <a:endCxn id="11" idx="0"/>
+          </p:cNvCxnSpPr>
+          <p:nvPr/>
+        </p:nvCxnSpPr>
+        <p:spPr>
+          <a:xfrm>
+            <a:off x="6421582" y="2556164"/>
+            <a:ext cx="2460704" cy="735260"/>
+          </a:xfrm>
+          <a:prstGeom prst="straightConnector1">
+            <a:avLst/>
+          </a:prstGeom>
+          <a:ln>
+            <a:tailEnd type="triangle"/>
+          </a:ln>
+        </p:spPr>
+        <p:style>
+          <a:lnRef idx="1">
+            <a:schemeClr val="accent1"/>
+          </a:lnRef>
+          <a:fillRef idx="0">
+            <a:schemeClr val="accent1"/>
+          </a:fillRef>
+          <a:effectRef idx="0">
+            <a:schemeClr val="accent1"/>
+          </a:effectRef>
+          <a:fontRef idx="minor">
+            <a:schemeClr val="tx1"/>
+          </a:fontRef>
+        </p:style>
+      </p:cxnSp>
+      <p:sp>
+        <p:nvSpPr>
+          <p:cNvPr id="36" name="TextBox 35"/>
+          <p:cNvSpPr txBox="1"/>
+          <p:nvPr/>
+        </p:nvSpPr>
+        <p:spPr>
+          <a:xfrm>
+            <a:off x="7107382" y="2490217"/>
+            <a:ext cx="914400" cy="369332"/>
+          </a:xfrm>
+          <a:prstGeom prst="rect">
+            <a:avLst/>
+          </a:prstGeom>
+          <a:noFill/>
+        </p:spPr>
+        <p:txBody>
+          <a:bodyPr wrap="square" rtlCol="0">
+            <a:spAutoFit/>
+          </a:bodyPr>
+          <a:lstStyle/>
+          <a:p>
+            <a:r>
+              <a:rPr lang="en-US" dirty="0" err="1" smtClean="0"/>
+              <a:t>Ad_id</a:t>
+            </a:r>
+            <a:endParaRPr lang="en-US" dirty="0"/>
+          </a:p>
+        </p:txBody>
+      </p:sp>
+      <p:sp>
+        <p:nvSpPr>
+          <p:cNvPr id="38" name="TextBox 37"/>
+          <p:cNvSpPr txBox="1"/>
+          <p:nvPr/>
+        </p:nvSpPr>
+        <p:spPr>
+          <a:xfrm>
+            <a:off x="2843644" y="2477515"/>
+            <a:ext cx="1884220" cy="369332"/>
+          </a:xfrm>
+          <a:prstGeom prst="rect">
+            <a:avLst/>
+          </a:prstGeom>
+          <a:noFill/>
+        </p:spPr>
+        <p:txBody>
+          <a:bodyPr wrap="square" rtlCol="0">
+            <a:spAutoFit/>
+          </a:bodyPr>
+          <a:lstStyle/>
+          <a:p>
+            <a:r>
+              <a:rPr lang="en-US" dirty="0" err="1" smtClean="0"/>
+              <a:t>Document_id</a:t>
+            </a:r>
+            <a:endParaRPr lang="en-US" dirty="0"/>
+          </a:p>
+        </p:txBody>
+      </p:sp>
+    </p:spTree>
+    <p:extLst>
+      <p:ext uri="{BB962C8B-B14F-4D97-AF65-F5344CB8AC3E}">
+        <p14:creationId xmlns:p14="http://schemas.microsoft.com/office/powerpoint/2010/main" val="659111951"/>
       </p:ext>
     </p:extLst>
   </p:cSld>

</xml_diff>

<commit_message>
3rd version of ppt
</commit_message>
<xml_diff>
--- a/presentations/DSClickPrediction_Pramod_DataExploration.pptx
+++ b/presentations/DSClickPrediction_Pramod_DataExploration.pptx
@@ -11,8 +11,8 @@
     <p:sldId id="256" r:id="rId2"/>
     <p:sldId id="257" r:id="rId3"/>
     <p:sldId id="258" r:id="rId4"/>
-    <p:sldId id="262" r:id="rId5"/>
-    <p:sldId id="266" r:id="rId6"/>
+    <p:sldId id="266" r:id="rId5"/>
+    <p:sldId id="262" r:id="rId6"/>
     <p:sldId id="259" r:id="rId7"/>
     <p:sldId id="261" r:id="rId8"/>
     <p:sldId id="267" r:id="rId9"/>
@@ -1015,7 +1015,7 @@
           <a:p>
             <a:fld id="{B942DD7C-DF0A-314E-B225-27CBA0EF8444}" type="slidenum">
               <a:rPr lang="en-US" smtClean="0"/>
-              <a:t>4</a:t>
+              <a:t>5</a:t>
             </a:fld>
             <a:endParaRPr lang="en-US"/>
           </a:p>
@@ -6046,11 +6046,7 @@
           <a:p>
             <a:r>
               <a:rPr lang="en-US" dirty="0" smtClean="0"/>
-              <a:t>This is a very large relational set where one of the log file is ( 2B rows and 100GB uncompressed</a:t>
-            </a:r>
-            <a:r>
-              <a:rPr lang="en-US" dirty="0" smtClean="0"/>
-              <a:t>).</a:t>
+              <a:t>This is a very large relational set where one of the log file is ( 2B rows and 100GB uncompressed).</a:t>
             </a:r>
           </a:p>
           <a:p>
@@ -6149,312 +6145,6 @@
           <a:p>
             <a:r>
               <a:rPr lang="en-US" dirty="0" smtClean="0"/>
-              <a:t>data</a:t>
-            </a:r>
-            <a:endParaRPr lang="en-US" dirty="0"/>
-          </a:p>
-        </p:txBody>
-      </p:sp>
-      <p:sp>
-        <p:nvSpPr>
-          <p:cNvPr id="3" name="Content Placeholder 2"/>
-          <p:cNvSpPr>
-            <a:spLocks noGrp="1"/>
-          </p:cNvSpPr>
-          <p:nvPr>
-            <p:ph idx="1"/>
-          </p:nvPr>
-        </p:nvSpPr>
-        <p:spPr/>
-        <p:txBody>
-          <a:bodyPr>
-            <a:normAutofit/>
-          </a:bodyPr>
-          <a:lstStyle/>
-          <a:p>
-            <a:r>
-              <a:rPr lang="en-US" dirty="0" smtClean="0"/>
-              <a:t>Collected Data from multiple CSV </a:t>
-            </a:r>
-            <a:r>
-              <a:rPr lang="en-US" dirty="0" smtClean="0"/>
-              <a:t>files</a:t>
-            </a:r>
-          </a:p>
-          <a:p>
-            <a:r>
-              <a:rPr lang="en-US" dirty="0"/>
-              <a:t>Database Size - ~9GB</a:t>
-            </a:r>
-          </a:p>
-          <a:p>
-            <a:r>
-              <a:rPr lang="en-US" dirty="0"/>
-              <a:t>Did not even load the PAGE_VIEW </a:t>
-            </a:r>
-            <a:r>
-              <a:rPr lang="en-US" dirty="0" err="1"/>
-              <a:t>enire</a:t>
-            </a:r>
-            <a:r>
-              <a:rPr lang="en-US" dirty="0"/>
-              <a:t> table!!</a:t>
-            </a:r>
-          </a:p>
-          <a:p>
-            <a:endParaRPr lang="en-US" dirty="0" smtClean="0"/>
-          </a:p>
-        </p:txBody>
-      </p:sp>
-      <p:sp>
-        <p:nvSpPr>
-          <p:cNvPr id="4" name="Slide Number Placeholder 3"/>
-          <p:cNvSpPr>
-            <a:spLocks noGrp="1"/>
-          </p:cNvSpPr>
-          <p:nvPr>
-            <p:ph type="sldNum" sz="quarter" idx="12"/>
-          </p:nvPr>
-        </p:nvSpPr>
-        <p:spPr/>
-        <p:txBody>
-          <a:bodyPr/>
-          <a:lstStyle/>
-          <a:p>
-            <a:fld id="{D875CEC6-8E5A-CE43-9ACC-02DF7099DAAF}" type="slidenum">
-              <a:rPr lang="en-US" smtClean="0"/>
-              <a:t>4</a:t>
-            </a:fld>
-            <a:endParaRPr lang="en-US"/>
-          </a:p>
-        </p:txBody>
-      </p:sp>
-      <p:sp>
-        <p:nvSpPr>
-          <p:cNvPr id="6" name="Rectangle 5"/>
-          <p:cNvSpPr/>
-          <p:nvPr/>
-        </p:nvSpPr>
-        <p:spPr>
-          <a:xfrm>
-            <a:off x="540328" y="3408358"/>
-            <a:ext cx="13404273" cy="3046988"/>
-          </a:xfrm>
-          <a:prstGeom prst="rect">
-            <a:avLst/>
-          </a:prstGeom>
-        </p:spPr>
-        <p:txBody>
-          <a:bodyPr wrap="square">
-            <a:spAutoFit/>
-          </a:bodyPr>
-          <a:lstStyle/>
-          <a:p>
-            <a:r>
-              <a:rPr lang="is-IS" sz="1600" dirty="0">
-                <a:solidFill>
-                  <a:srgbClr val="000000"/>
-                </a:solidFill>
-                <a:latin typeface="Menlo" charset="0"/>
-              </a:rPr>
-              <a:t> table         </a:t>
-            </a:r>
-            <a:r>
-              <a:rPr lang="is-IS" sz="1600" dirty="0" smtClean="0">
-                <a:solidFill>
-                  <a:srgbClr val="000000"/>
-                </a:solidFill>
-                <a:latin typeface="Menlo" charset="0"/>
-              </a:rPr>
-              <a:t>       | </a:t>
-            </a:r>
-            <a:r>
-              <a:rPr lang="is-IS" sz="1600" dirty="0">
-                <a:solidFill>
-                  <a:srgbClr val="000000"/>
-                </a:solidFill>
-                <a:latin typeface="Menlo" charset="0"/>
-              </a:rPr>
-              <a:t>table_size | related_objects_size | total_table_size | live_rows </a:t>
-            </a:r>
-          </a:p>
-          <a:p>
-            <a:r>
-              <a:rPr lang="is-IS" sz="1600" dirty="0">
-                <a:solidFill>
-                  <a:srgbClr val="000000"/>
-                </a:solidFill>
-                <a:latin typeface="Menlo" charset="0"/>
-              </a:rPr>
-              <a:t>----------------------+------------+----------------------+------------------+-----------</a:t>
-            </a:r>
-          </a:p>
-          <a:p>
-            <a:r>
-              <a:rPr lang="is-IS" sz="1600" dirty="0">
-                <a:solidFill>
-                  <a:srgbClr val="000000"/>
-                </a:solidFill>
-                <a:latin typeface="Menlo" charset="0"/>
-              </a:rPr>
-              <a:t> promoted_content     | 32 MB      | 32 kB                | 32 MB            |    559583</a:t>
-            </a:r>
-          </a:p>
-          <a:p>
-            <a:r>
-              <a:rPr lang="is-IS" sz="1600" dirty="0">
-                <a:solidFill>
-                  <a:srgbClr val="000000"/>
-                </a:solidFill>
-                <a:latin typeface="Menlo" charset="0"/>
-              </a:rPr>
-              <a:t> documents_meta       | 164 MB     | 64 kB                | 164 MB           |   2999334</a:t>
-            </a:r>
-          </a:p>
-          <a:p>
-            <a:r>
-              <a:rPr lang="is-IS" sz="1600" dirty="0">
-                <a:solidFill>
-                  <a:srgbClr val="000000"/>
-                </a:solidFill>
-                <a:latin typeface="Menlo" charset="0"/>
-              </a:rPr>
-              <a:t> documents_categories | 273 MB     | 88 kB                | 273 MB           |   5481471</a:t>
-            </a:r>
-          </a:p>
-          <a:p>
-            <a:r>
-              <a:rPr lang="is-IS" sz="1600" dirty="0">
-                <a:solidFill>
-                  <a:srgbClr val="000000"/>
-                </a:solidFill>
-                <a:latin typeface="Menlo" charset="0"/>
-              </a:rPr>
-              <a:t> documents_entities   | 446 MB     | 136 kB               | 446 MB           |   5537633</a:t>
-            </a:r>
-          </a:p>
-          <a:p>
-            <a:r>
-              <a:rPr lang="is-IS" sz="1600" dirty="0">
-                <a:solidFill>
-                  <a:srgbClr val="000000"/>
-                </a:solidFill>
-                <a:latin typeface="Menlo" charset="0"/>
-              </a:rPr>
-              <a:t> page_views_sample    | 726 MB     | 200 kB               | 726 MB           |  10000008</a:t>
-            </a:r>
-          </a:p>
-          <a:p>
-            <a:r>
-              <a:rPr lang="is-IS" sz="1600" dirty="0">
-                <a:solidFill>
-                  <a:srgbClr val="000000"/>
-                </a:solidFill>
-                <a:latin typeface="Menlo" charset="0"/>
-              </a:rPr>
-              <a:t> documents_topics     | 564 MB     | 160 kB               | 564 MB           |  11325980</a:t>
-            </a:r>
-          </a:p>
-          <a:p>
-            <a:r>
-              <a:rPr lang="is-IS" sz="1600" dirty="0">
-                <a:solidFill>
-                  <a:srgbClr val="000000"/>
-                </a:solidFill>
-                <a:latin typeface="Menlo" charset="0"/>
-              </a:rPr>
-              <a:t> events               | 1822 MB    | 480 kB               | 1822 MB          |  23121858</a:t>
-            </a:r>
-          </a:p>
-          <a:p>
-            <a:r>
-              <a:rPr lang="is-IS" sz="1600" dirty="0">
-                <a:solidFill>
-                  <a:srgbClr val="000000"/>
-                </a:solidFill>
-                <a:latin typeface="Menlo" charset="0"/>
-              </a:rPr>
-              <a:t> clicks_test          | 1361 MB    | 360 kB               | 1361 MB          |  32225335</a:t>
-            </a:r>
-          </a:p>
-          <a:p>
-            <a:r>
-              <a:rPr lang="is-IS" sz="1600" dirty="0">
-                <a:solidFill>
-                  <a:srgbClr val="000000"/>
-                </a:solidFill>
-                <a:latin typeface="Menlo" charset="0"/>
-              </a:rPr>
-              <a:t> clicks_train         | 4336 MB    | 1112 kB              | 4337 MB          |  87141751</a:t>
-            </a:r>
-          </a:p>
-          <a:p>
-            <a:r>
-              <a:rPr lang="is-IS" sz="1600" dirty="0">
-                <a:solidFill>
-                  <a:srgbClr val="000000"/>
-                </a:solidFill>
-                <a:latin typeface="Menlo" charset="0"/>
-              </a:rPr>
-              <a:t> TOTAL                | 9724 MB    | 2632 kB              | 9726 MB          | 178392953</a:t>
-            </a:r>
-            <a:endParaRPr lang="is-IS" sz="1600" dirty="0">
-              <a:solidFill>
-                <a:srgbClr val="000000"/>
-              </a:solidFill>
-              <a:effectLst/>
-              <a:latin typeface="Menlo" charset="0"/>
-            </a:endParaRPr>
-          </a:p>
-        </p:txBody>
-      </p:sp>
-    </p:spTree>
-    <p:extLst>
-      <p:ext uri="{BB962C8B-B14F-4D97-AF65-F5344CB8AC3E}">
-        <p14:creationId xmlns:p14="http://schemas.microsoft.com/office/powerpoint/2010/main" val="1893351295"/>
-      </p:ext>
-    </p:extLst>
-  </p:cSld>
-  <p:clrMapOvr>
-    <a:masterClrMapping/>
-  </p:clrMapOvr>
-</p:sld>
-</file>
-
-<file path=ppt/slides/slide5.xml><?xml version="1.0" encoding="utf-8"?>
-<p:sld xmlns:a="http://schemas.openxmlformats.org/drawingml/2006/main" xmlns:r="http://schemas.openxmlformats.org/officeDocument/2006/relationships" xmlns:p="http://schemas.openxmlformats.org/presentationml/2006/main">
-  <p:cSld>
-    <p:spTree>
-      <p:nvGrpSpPr>
-        <p:cNvPr id="1" name=""/>
-        <p:cNvGrpSpPr/>
-        <p:nvPr/>
-      </p:nvGrpSpPr>
-      <p:grpSpPr>
-        <a:xfrm>
-          <a:off x="0" y="0"/>
-          <a:ext cx="0" cy="0"/>
-          <a:chOff x="0" y="0"/>
-          <a:chExt cx="0" cy="0"/>
-        </a:xfrm>
-      </p:grpSpPr>
-      <p:sp>
-        <p:nvSpPr>
-          <p:cNvPr id="2" name="Title 1"/>
-          <p:cNvSpPr>
-            <a:spLocks noGrp="1"/>
-          </p:cNvSpPr>
-          <p:nvPr>
-            <p:ph type="title"/>
-          </p:nvPr>
-        </p:nvSpPr>
-        <p:spPr/>
-        <p:txBody>
-          <a:bodyPr/>
-          <a:lstStyle/>
-          <a:p>
-            <a:r>
-              <a:rPr lang="en-US" dirty="0" smtClean="0"/>
               <a:t>DATA </a:t>
             </a:r>
             <a:r>
@@ -6486,7 +6176,7 @@
           <a:p>
             <a:fld id="{D875CEC6-8E5A-CE43-9ACC-02DF7099DAAF}" type="slidenum">
               <a:rPr lang="en-US" smtClean="0"/>
-              <a:t>5</a:t>
+              <a:t>4</a:t>
             </a:fld>
             <a:endParaRPr lang="en-US"/>
           </a:p>
@@ -6541,6 +6231,321 @@
 </p:sld>
 </file>
 
+<file path=ppt/slides/slide5.xml><?xml version="1.0" encoding="utf-8"?>
+<p:sld xmlns:a="http://schemas.openxmlformats.org/drawingml/2006/main" xmlns:r="http://schemas.openxmlformats.org/officeDocument/2006/relationships" xmlns:p="http://schemas.openxmlformats.org/presentationml/2006/main">
+  <p:cSld>
+    <p:spTree>
+      <p:nvGrpSpPr>
+        <p:cNvPr id="1" name=""/>
+        <p:cNvGrpSpPr/>
+        <p:nvPr/>
+      </p:nvGrpSpPr>
+      <p:grpSpPr>
+        <a:xfrm>
+          <a:off x="0" y="0"/>
+          <a:ext cx="0" cy="0"/>
+          <a:chOff x="0" y="0"/>
+          <a:chExt cx="0" cy="0"/>
+        </a:xfrm>
+      </p:grpSpPr>
+      <p:sp>
+        <p:nvSpPr>
+          <p:cNvPr id="2" name="Title 1"/>
+          <p:cNvSpPr>
+            <a:spLocks noGrp="1"/>
+          </p:cNvSpPr>
+          <p:nvPr>
+            <p:ph type="title"/>
+          </p:nvPr>
+        </p:nvSpPr>
+        <p:spPr/>
+        <p:txBody>
+          <a:bodyPr/>
+          <a:lstStyle/>
+          <a:p>
+            <a:r>
+              <a:rPr lang="en-US" dirty="0" smtClean="0"/>
+              <a:t>Data </a:t>
+            </a:r>
+            <a:r>
+              <a:rPr lang="mr-IN" dirty="0" smtClean="0"/>
+              <a:t>–</a:t>
+            </a:r>
+            <a:r>
+              <a:rPr lang="en-US" dirty="0" smtClean="0"/>
+              <a:t> </a:t>
+            </a:r>
+            <a:r>
+              <a:rPr lang="en-US" dirty="0" err="1" smtClean="0"/>
+              <a:t>BiG</a:t>
+            </a:r>
+            <a:r>
+              <a:rPr lang="en-US" dirty="0" smtClean="0"/>
+              <a:t> or Small ?</a:t>
+            </a:r>
+            <a:endParaRPr lang="en-US" dirty="0"/>
+          </a:p>
+        </p:txBody>
+      </p:sp>
+      <p:sp>
+        <p:nvSpPr>
+          <p:cNvPr id="3" name="Content Placeholder 2"/>
+          <p:cNvSpPr>
+            <a:spLocks noGrp="1"/>
+          </p:cNvSpPr>
+          <p:nvPr>
+            <p:ph idx="1"/>
+          </p:nvPr>
+        </p:nvSpPr>
+        <p:spPr/>
+        <p:txBody>
+          <a:bodyPr>
+            <a:normAutofit/>
+          </a:bodyPr>
+          <a:lstStyle/>
+          <a:p>
+            <a:r>
+              <a:rPr lang="en-US" dirty="0" smtClean="0"/>
+              <a:t>Collected Data from multiple CSV files</a:t>
+            </a:r>
+          </a:p>
+          <a:p>
+            <a:r>
+              <a:rPr lang="en-US" dirty="0"/>
+              <a:t>Database Size - ~9GB</a:t>
+            </a:r>
+          </a:p>
+          <a:p>
+            <a:r>
+              <a:rPr lang="en-US" dirty="0"/>
+              <a:t>Did not even load the </a:t>
+            </a:r>
+            <a:r>
+              <a:rPr lang="en-US" dirty="0" smtClean="0"/>
+              <a:t>entire PAGE_VIEW log!!</a:t>
+            </a:r>
+            <a:endParaRPr lang="en-US" dirty="0"/>
+          </a:p>
+          <a:p>
+            <a:endParaRPr lang="en-US" dirty="0" smtClean="0"/>
+          </a:p>
+        </p:txBody>
+      </p:sp>
+      <p:sp>
+        <p:nvSpPr>
+          <p:cNvPr id="4" name="Slide Number Placeholder 3"/>
+          <p:cNvSpPr>
+            <a:spLocks noGrp="1"/>
+          </p:cNvSpPr>
+          <p:nvPr>
+            <p:ph type="sldNum" sz="quarter" idx="12"/>
+          </p:nvPr>
+        </p:nvSpPr>
+        <p:spPr/>
+        <p:txBody>
+          <a:bodyPr/>
+          <a:lstStyle/>
+          <a:p>
+            <a:fld id="{D875CEC6-8E5A-CE43-9ACC-02DF7099DAAF}" type="slidenum">
+              <a:rPr lang="en-US" smtClean="0"/>
+              <a:t>5</a:t>
+            </a:fld>
+            <a:endParaRPr lang="en-US"/>
+          </a:p>
+        </p:txBody>
+      </p:sp>
+      <p:sp>
+        <p:nvSpPr>
+          <p:cNvPr id="6" name="Rectangle 5"/>
+          <p:cNvSpPr/>
+          <p:nvPr/>
+        </p:nvSpPr>
+        <p:spPr>
+          <a:xfrm>
+            <a:off x="540328" y="3408358"/>
+            <a:ext cx="13404273" cy="3046988"/>
+          </a:xfrm>
+          <a:prstGeom prst="rect">
+            <a:avLst/>
+          </a:prstGeom>
+        </p:spPr>
+        <p:txBody>
+          <a:bodyPr wrap="square">
+            <a:spAutoFit/>
+          </a:bodyPr>
+          <a:lstStyle/>
+          <a:p>
+            <a:r>
+              <a:rPr lang="is-IS" sz="1600" dirty="0">
+                <a:solidFill>
+                  <a:srgbClr val="000000"/>
+                </a:solidFill>
+                <a:latin typeface="Menlo" charset="0"/>
+              </a:rPr>
+              <a:t> table         </a:t>
+            </a:r>
+            <a:r>
+              <a:rPr lang="is-IS" sz="1600" dirty="0" smtClean="0">
+                <a:solidFill>
+                  <a:srgbClr val="000000"/>
+                </a:solidFill>
+                <a:latin typeface="Menlo" charset="0"/>
+              </a:rPr>
+              <a:t>       | </a:t>
+            </a:r>
+            <a:r>
+              <a:rPr lang="is-IS" sz="1600" dirty="0">
+                <a:solidFill>
+                  <a:srgbClr val="000000"/>
+                </a:solidFill>
+                <a:latin typeface="Menlo" charset="0"/>
+              </a:rPr>
+              <a:t>table_size | related_objects_size | total_table_size | live_rows </a:t>
+            </a:r>
+          </a:p>
+          <a:p>
+            <a:r>
+              <a:rPr lang="is-IS" sz="1600" dirty="0">
+                <a:solidFill>
+                  <a:srgbClr val="000000"/>
+                </a:solidFill>
+                <a:latin typeface="Menlo" charset="0"/>
+              </a:rPr>
+              <a:t>----------------------+------------+----------------------+------------------+-----------</a:t>
+            </a:r>
+          </a:p>
+          <a:p>
+            <a:r>
+              <a:rPr lang="is-IS" sz="1600" dirty="0">
+                <a:solidFill>
+                  <a:srgbClr val="000000"/>
+                </a:solidFill>
+                <a:latin typeface="Menlo" charset="0"/>
+              </a:rPr>
+              <a:t> promoted_content     | 32 MB      | 32 kB                | 32 MB            |    559583</a:t>
+            </a:r>
+          </a:p>
+          <a:p>
+            <a:r>
+              <a:rPr lang="is-IS" sz="1600" dirty="0">
+                <a:solidFill>
+                  <a:srgbClr val="000000"/>
+                </a:solidFill>
+                <a:latin typeface="Menlo" charset="0"/>
+              </a:rPr>
+              <a:t> documents_meta       | 164 MB     | 64 kB                | 164 MB           |   2999334</a:t>
+            </a:r>
+          </a:p>
+          <a:p>
+            <a:r>
+              <a:rPr lang="is-IS" sz="1600" dirty="0">
+                <a:solidFill>
+                  <a:srgbClr val="000000"/>
+                </a:solidFill>
+                <a:latin typeface="Menlo" charset="0"/>
+              </a:rPr>
+              <a:t> documents_categories | 273 MB     | 88 kB                | 273 MB           |   5481471</a:t>
+            </a:r>
+          </a:p>
+          <a:p>
+            <a:r>
+              <a:rPr lang="is-IS" sz="1600" dirty="0">
+                <a:solidFill>
+                  <a:srgbClr val="000000"/>
+                </a:solidFill>
+                <a:latin typeface="Menlo" charset="0"/>
+              </a:rPr>
+              <a:t> documents_entities   | 446 MB     | 136 kB               | 446 MB           |   5537633</a:t>
+            </a:r>
+          </a:p>
+          <a:p>
+            <a:r>
+              <a:rPr lang="is-IS" sz="1600" dirty="0">
+                <a:solidFill>
+                  <a:srgbClr val="000000"/>
+                </a:solidFill>
+                <a:latin typeface="Menlo" charset="0"/>
+              </a:rPr>
+              <a:t> page_views_sample    | 726 MB     | 200 kB               | 726 MB           |  10000008</a:t>
+            </a:r>
+          </a:p>
+          <a:p>
+            <a:r>
+              <a:rPr lang="is-IS" sz="1600" dirty="0">
+                <a:solidFill>
+                  <a:srgbClr val="000000"/>
+                </a:solidFill>
+                <a:latin typeface="Menlo" charset="0"/>
+              </a:rPr>
+              <a:t> documents_topics     | 564 MB     | 160 kB               | 564 MB           |  11325980</a:t>
+            </a:r>
+          </a:p>
+          <a:p>
+            <a:r>
+              <a:rPr lang="is-IS" sz="1600" dirty="0">
+                <a:solidFill>
+                  <a:srgbClr val="000000"/>
+                </a:solidFill>
+                <a:latin typeface="Menlo" charset="0"/>
+              </a:rPr>
+              <a:t> events               | 1822 MB    | 480 kB               | 1822 MB          |  23121858</a:t>
+            </a:r>
+          </a:p>
+          <a:p>
+            <a:r>
+              <a:rPr lang="is-IS" sz="1600" dirty="0">
+                <a:solidFill>
+                  <a:srgbClr val="000000"/>
+                </a:solidFill>
+                <a:latin typeface="Menlo" charset="0"/>
+              </a:rPr>
+              <a:t> clicks_test          | 1361 MB    | 360 kB               | 1361 MB          |  32225335</a:t>
+            </a:r>
+          </a:p>
+          <a:p>
+            <a:r>
+              <a:rPr lang="is-IS" sz="1600" dirty="0">
+                <a:solidFill>
+                  <a:srgbClr val="000000"/>
+                </a:solidFill>
+                <a:latin typeface="Menlo" charset="0"/>
+              </a:rPr>
+              <a:t> clicks_train         | 4336 MB    | 1112 kB              | 4337 MB          |  87141751</a:t>
+            </a:r>
+          </a:p>
+          <a:p>
+            <a:r>
+              <a:rPr lang="is-IS" sz="1600" dirty="0">
+                <a:solidFill>
+                  <a:srgbClr val="000000"/>
+                </a:solidFill>
+                <a:latin typeface="Menlo" charset="0"/>
+              </a:rPr>
+              <a:t> TOTAL                | 9724 MB    | 2632 kB              | 9726 MB          | 178392953</a:t>
+            </a:r>
+            <a:endParaRPr lang="is-IS" sz="1600" dirty="0">
+              <a:solidFill>
+                <a:srgbClr val="000000"/>
+              </a:solidFill>
+              <a:effectLst/>
+              <a:latin typeface="Menlo" charset="0"/>
+            </a:endParaRPr>
+          </a:p>
+        </p:txBody>
+      </p:sp>
+    </p:spTree>
+    <p:extLst>
+      <p:ext uri="{BB962C8B-B14F-4D97-AF65-F5344CB8AC3E}">
+        <p14:creationId xmlns:p14="http://schemas.microsoft.com/office/powerpoint/2010/main" val="1893351295"/>
+      </p:ext>
+    </p:extLst>
+  </p:cSld>
+  <p:clrMapOvr>
+    <a:masterClrMapping/>
+  </p:clrMapOvr>
+</p:sld>
+</file>
+
 <file path=ppt/slides/slide6.xml><?xml version="1.0" encoding="utf-8"?>
 <p:sld xmlns:a="http://schemas.openxmlformats.org/drawingml/2006/main" xmlns:r="http://schemas.openxmlformats.org/officeDocument/2006/relationships" xmlns:p="http://schemas.openxmlformats.org/presentationml/2006/main">
   <p:cSld>
@@ -6575,19 +6580,7 @@
           <a:p>
             <a:r>
               <a:rPr lang="en-US" dirty="0" smtClean="0"/>
-              <a:t>Data </a:t>
-            </a:r>
-            <a:r>
-              <a:rPr lang="en-US" dirty="0" smtClean="0"/>
-              <a:t>- Cleaning </a:t>
-            </a:r>
-            <a:r>
-              <a:rPr lang="en-US" dirty="0" smtClean="0"/>
-              <a:t>and </a:t>
-            </a:r>
-            <a:r>
-              <a:rPr lang="en-US" dirty="0" smtClean="0"/>
-              <a:t>Munging</a:t>
+              <a:t>Data - Cleaning and Munging</a:t>
             </a:r>
             <a:endParaRPr lang="en-US" dirty="0"/>
           </a:p>
@@ -6619,11 +6612,7 @@
             <a:pPr lvl="1"/>
             <a:r>
               <a:rPr lang="en-US" dirty="0" smtClean="0"/>
-              <a:t>Analysis is in progress using </a:t>
-            </a:r>
-            <a:r>
-              <a:rPr lang="en-US" dirty="0" smtClean="0"/>
-              <a:t>following notebook</a:t>
+              <a:t>Analysis is in progress using following notebook</a:t>
             </a:r>
           </a:p>
           <a:p>
@@ -6646,17 +6635,8 @@
             <a:pPr lvl="1"/>
             <a:r>
               <a:rPr lang="en-US" dirty="0" smtClean="0"/>
-              <a:t>Created  </a:t>
-            </a:r>
-            <a:r>
-              <a:rPr lang="en-US" dirty="0" smtClean="0"/>
-              <a:t>a relational database </a:t>
-            </a:r>
-            <a:r>
-              <a:rPr lang="en-US" dirty="0" smtClean="0"/>
-              <a:t>locally for each data set</a:t>
-            </a:r>
-            <a:endParaRPr lang="en-US" dirty="0" smtClean="0"/>
+              <a:t>Created  a relational database locally for each data set</a:t>
+            </a:r>
           </a:p>
           <a:p>
             <a:r>

</xml_diff>

<commit_message>
adding sql files and changes to analysis and ppt
</commit_message>
<xml_diff>
--- a/presentations/DSClickPrediction_Pramod_DataExploration.pptx
+++ b/presentations/DSClickPrediction_Pramod_DataExploration.pptx
@@ -5,18 +5,19 @@
     <p:sldMasterId id="2147483684" r:id="rId1"/>
   </p:sldMasterIdLst>
   <p:notesMasterIdLst>
-    <p:notesMasterId r:id="rId11"/>
+    <p:notesMasterId r:id="rId12"/>
   </p:notesMasterIdLst>
   <p:sldIdLst>
     <p:sldId id="256" r:id="rId2"/>
     <p:sldId id="257" r:id="rId3"/>
-    <p:sldId id="258" r:id="rId4"/>
-    <p:sldId id="266" r:id="rId5"/>
+    <p:sldId id="266" r:id="rId4"/>
+    <p:sldId id="258" r:id="rId5"/>
     <p:sldId id="262" r:id="rId6"/>
     <p:sldId id="259" r:id="rId7"/>
     <p:sldId id="261" r:id="rId8"/>
     <p:sldId id="267" r:id="rId9"/>
-    <p:sldId id="264" r:id="rId10"/>
+    <p:sldId id="268" r:id="rId10"/>
+    <p:sldId id="264" r:id="rId11"/>
   </p:sldIdLst>
   <p:sldSz cx="12192000" cy="6858000"/>
   <p:notesSz cx="6858000" cy="9144000"/>
@@ -908,7 +909,7 @@
           <a:p>
             <a:fld id="{B942DD7C-DF0A-314E-B225-27CBA0EF8444}" type="slidenum">
               <a:rPr lang="en-US" smtClean="0"/>
-              <a:t>3</a:t>
+              <a:t>4</a:t>
             </a:fld>
             <a:endParaRPr lang="en-US"/>
           </a:p>
@@ -1099,7 +1100,7 @@
           <a:p>
             <a:fld id="{B942DD7C-DF0A-314E-B225-27CBA0EF8444}" type="slidenum">
               <a:rPr lang="en-US" smtClean="0"/>
-              <a:t>8</a:t>
+              <a:t>7</a:t>
             </a:fld>
             <a:endParaRPr lang="en-US"/>
           </a:p>
@@ -1108,7 +1109,7 @@
     </p:spTree>
     <p:extLst>
       <p:ext uri="{BB962C8B-B14F-4D97-AF65-F5344CB8AC3E}">
-        <p14:creationId xmlns:p14="http://schemas.microsoft.com/office/powerpoint/2010/main" val="123282419"/>
+        <p14:creationId xmlns:p14="http://schemas.microsoft.com/office/powerpoint/2010/main" val="1699932477"/>
       </p:ext>
     </p:extLst>
   </p:cSld>
@@ -1162,6 +1163,90 @@
           <a:bodyPr/>
           <a:lstStyle/>
           <a:p>
+            <a:endParaRPr lang="en-US" dirty="0"/>
+          </a:p>
+        </p:txBody>
+      </p:sp>
+      <p:sp>
+        <p:nvSpPr>
+          <p:cNvPr id="4" name="Slide Number Placeholder 3"/>
+          <p:cNvSpPr>
+            <a:spLocks noGrp="1"/>
+          </p:cNvSpPr>
+          <p:nvPr>
+            <p:ph type="sldNum" sz="quarter" idx="10"/>
+          </p:nvPr>
+        </p:nvSpPr>
+        <p:spPr/>
+        <p:txBody>
+          <a:bodyPr/>
+          <a:lstStyle/>
+          <a:p>
+            <a:fld id="{B942DD7C-DF0A-314E-B225-27CBA0EF8444}" type="slidenum">
+              <a:rPr lang="en-US" smtClean="0"/>
+              <a:t>8</a:t>
+            </a:fld>
+            <a:endParaRPr lang="en-US"/>
+          </a:p>
+        </p:txBody>
+      </p:sp>
+    </p:spTree>
+    <p:extLst>
+      <p:ext uri="{BB962C8B-B14F-4D97-AF65-F5344CB8AC3E}">
+        <p14:creationId xmlns:p14="http://schemas.microsoft.com/office/powerpoint/2010/main" val="123282419"/>
+      </p:ext>
+    </p:extLst>
+  </p:cSld>
+  <p:clrMapOvr>
+    <a:masterClrMapping/>
+  </p:clrMapOvr>
+</p:notes>
+</file>
+
+<file path=ppt/notesSlides/notesSlide7.xml><?xml version="1.0" encoding="utf-8"?>
+<p:notes xmlns:a="http://schemas.openxmlformats.org/drawingml/2006/main" xmlns:r="http://schemas.openxmlformats.org/officeDocument/2006/relationships" xmlns:p="http://schemas.openxmlformats.org/presentationml/2006/main">
+  <p:cSld>
+    <p:spTree>
+      <p:nvGrpSpPr>
+        <p:cNvPr id="1" name=""/>
+        <p:cNvGrpSpPr/>
+        <p:nvPr/>
+      </p:nvGrpSpPr>
+      <p:grpSpPr>
+        <a:xfrm>
+          <a:off x="0" y="0"/>
+          <a:ext cx="0" cy="0"/>
+          <a:chOff x="0" y="0"/>
+          <a:chExt cx="0" cy="0"/>
+        </a:xfrm>
+      </p:grpSpPr>
+      <p:sp>
+        <p:nvSpPr>
+          <p:cNvPr id="2" name="Slide Image Placeholder 1"/>
+          <p:cNvSpPr>
+            <a:spLocks noGrp="1" noRot="1" noChangeAspect="1"/>
+          </p:cNvSpPr>
+          <p:nvPr>
+            <p:ph type="sldImg"/>
+          </p:nvPr>
+        </p:nvSpPr>
+        <p:spPr/>
+      </p:sp>
+      <p:sp>
+        <p:nvSpPr>
+          <p:cNvPr id="3" name="Notes Placeholder 2"/>
+          <p:cNvSpPr>
+            <a:spLocks noGrp="1"/>
+          </p:cNvSpPr>
+          <p:nvPr>
+            <p:ph type="body" idx="1"/>
+          </p:nvPr>
+        </p:nvSpPr>
+        <p:spPr/>
+        <p:txBody>
+          <a:bodyPr/>
+          <a:lstStyle/>
+          <a:p>
             <a:r>
               <a:rPr lang="en-US" sz="1200" kern="1200" dirty="0" smtClean="0">
                 <a:solidFill>
@@ -1425,7 +1510,7 @@
           <a:p>
             <a:fld id="{B942DD7C-DF0A-314E-B225-27CBA0EF8444}" type="slidenum">
               <a:rPr lang="en-US" smtClean="0"/>
-              <a:t>9</a:t>
+              <a:t>10</a:t>
             </a:fld>
             <a:endParaRPr lang="en-US"/>
           </a:p>
@@ -5841,10 +5926,17 @@
   <p:clrMapOvr>
     <a:masterClrMapping/>
   </p:clrMapOvr>
+  <p:timing>
+    <p:tnLst>
+      <p:par>
+        <p:cTn id="1" dur="indefinite" restart="never" nodeType="tmRoot"/>
+      </p:par>
+    </p:tnLst>
+  </p:timing>
 </p:sld>
 </file>
 
-<file path=ppt/slides/slide2.xml><?xml version="1.0" encoding="utf-8"?>
+<file path=ppt/slides/slide10.xml><?xml version="1.0" encoding="utf-8"?>
 <p:sld xmlns:a="http://schemas.openxmlformats.org/drawingml/2006/main" xmlns:r="http://schemas.openxmlformats.org/officeDocument/2006/relationships" xmlns:p="http://schemas.openxmlformats.org/presentationml/2006/main">
   <p:cSld>
     <p:spTree>
@@ -5878,274 +5970,7 @@
           <a:p>
             <a:r>
               <a:rPr lang="en-US" dirty="0" smtClean="0"/>
-              <a:t>What is the challenge?</a:t>
-            </a:r>
-            <a:endParaRPr lang="en-US" dirty="0"/>
-          </a:p>
-        </p:txBody>
-      </p:sp>
-      <p:sp>
-        <p:nvSpPr>
-          <p:cNvPr id="3" name="Content Placeholder 2"/>
-          <p:cNvSpPr>
-            <a:spLocks noGrp="1"/>
-          </p:cNvSpPr>
-          <p:nvPr>
-            <p:ph idx="1"/>
-          </p:nvPr>
-        </p:nvSpPr>
-        <p:spPr/>
-        <p:txBody>
-          <a:bodyPr/>
-          <a:lstStyle/>
-          <a:p>
-            <a:r>
-              <a:rPr lang="en-US" dirty="0" smtClean="0"/>
-              <a:t>Can we predict which recommended  content each user will click?</a:t>
-            </a:r>
-          </a:p>
-          <a:p>
-            <a:endParaRPr lang="en-US" dirty="0" smtClean="0"/>
-          </a:p>
-          <a:p>
-            <a:r>
-              <a:rPr lang="en-US" dirty="0" smtClean="0"/>
-              <a:t>What are the significant features that drive the likely hood of user clicking the recommended content indicating association? </a:t>
-            </a:r>
-          </a:p>
-          <a:p>
-            <a:endParaRPr lang="en-US" dirty="0" smtClean="0"/>
-          </a:p>
-          <a:p>
-            <a:r>
-              <a:rPr lang="en-US" dirty="0" smtClean="0"/>
-              <a:t>Improving </a:t>
-            </a:r>
-            <a:r>
-              <a:rPr lang="en-US" dirty="0" err="1" smtClean="0"/>
-              <a:t>Outbrain’s</a:t>
-            </a:r>
-            <a:r>
-              <a:rPr lang="en-US" dirty="0" smtClean="0"/>
-              <a:t> recommendation algorithm will mean more users uncover stories that satisfy their individual tastes.</a:t>
-            </a:r>
-            <a:endParaRPr lang="en-US" dirty="0"/>
-          </a:p>
-        </p:txBody>
-      </p:sp>
-      <p:sp>
-        <p:nvSpPr>
-          <p:cNvPr id="4" name="Slide Number Placeholder 3"/>
-          <p:cNvSpPr>
-            <a:spLocks noGrp="1"/>
-          </p:cNvSpPr>
-          <p:nvPr>
-            <p:ph type="sldNum" sz="quarter" idx="12"/>
-          </p:nvPr>
-        </p:nvSpPr>
-        <p:spPr/>
-        <p:txBody>
-          <a:bodyPr/>
-          <a:lstStyle/>
-          <a:p>
-            <a:fld id="{D875CEC6-8E5A-CE43-9ACC-02DF7099DAAF}" type="slidenum">
-              <a:rPr lang="en-US" smtClean="0"/>
-              <a:t>2</a:t>
-            </a:fld>
-            <a:endParaRPr lang="en-US"/>
-          </a:p>
-        </p:txBody>
-      </p:sp>
-    </p:spTree>
-    <p:extLst>
-      <p:ext uri="{BB962C8B-B14F-4D97-AF65-F5344CB8AC3E}">
-        <p14:creationId xmlns:p14="http://schemas.microsoft.com/office/powerpoint/2010/main" val="881873108"/>
-      </p:ext>
-    </p:extLst>
-  </p:cSld>
-  <p:clrMapOvr>
-    <a:masterClrMapping/>
-  </p:clrMapOvr>
-</p:sld>
-</file>
-
-<file path=ppt/slides/slide3.xml><?xml version="1.0" encoding="utf-8"?>
-<p:sld xmlns:a="http://schemas.openxmlformats.org/drawingml/2006/main" xmlns:r="http://schemas.openxmlformats.org/officeDocument/2006/relationships" xmlns:p="http://schemas.openxmlformats.org/presentationml/2006/main">
-  <p:cSld>
-    <p:spTree>
-      <p:nvGrpSpPr>
-        <p:cNvPr id="1" name=""/>
-        <p:cNvGrpSpPr/>
-        <p:nvPr/>
-      </p:nvGrpSpPr>
-      <p:grpSpPr>
-        <a:xfrm>
-          <a:off x="0" y="0"/>
-          <a:ext cx="0" cy="0"/>
-          <a:chOff x="0" y="0"/>
-          <a:chExt cx="0" cy="0"/>
-        </a:xfrm>
-      </p:grpSpPr>
-      <p:sp>
-        <p:nvSpPr>
-          <p:cNvPr id="2" name="Title 1"/>
-          <p:cNvSpPr>
-            <a:spLocks noGrp="1"/>
-          </p:cNvSpPr>
-          <p:nvPr>
-            <p:ph type="title"/>
-          </p:nvPr>
-        </p:nvSpPr>
-        <p:spPr/>
-        <p:txBody>
-          <a:bodyPr/>
-          <a:lstStyle/>
-          <a:p>
-            <a:r>
-              <a:rPr lang="en-US" dirty="0" smtClean="0"/>
-              <a:t>What data would be used ?</a:t>
-            </a:r>
-            <a:endParaRPr lang="en-US" dirty="0"/>
-          </a:p>
-        </p:txBody>
-      </p:sp>
-      <p:sp>
-        <p:nvSpPr>
-          <p:cNvPr id="3" name="Content Placeholder 2"/>
-          <p:cNvSpPr>
-            <a:spLocks noGrp="1"/>
-          </p:cNvSpPr>
-          <p:nvPr>
-            <p:ph idx="1"/>
-          </p:nvPr>
-        </p:nvSpPr>
-        <p:spPr/>
-        <p:txBody>
-          <a:bodyPr>
-            <a:normAutofit/>
-          </a:bodyPr>
-          <a:lstStyle/>
-          <a:p>
-            <a:r>
-              <a:rPr lang="en-US" dirty="0" err="1" smtClean="0"/>
-              <a:t>Outbrain's</a:t>
-            </a:r>
-            <a:r>
-              <a:rPr lang="en-US" dirty="0" smtClean="0"/>
-              <a:t> two weeks of data from 14-Jun-2016 and 28-jun-2016 provided on </a:t>
-            </a:r>
-            <a:r>
-              <a:rPr lang="en-US" dirty="0" err="1" smtClean="0"/>
-              <a:t>kaggle</a:t>
-            </a:r>
-            <a:r>
-              <a:rPr lang="en-US" dirty="0" smtClean="0"/>
-              <a:t>. </a:t>
-            </a:r>
-          </a:p>
-          <a:p>
-            <a:r>
-              <a:rPr lang="en-US" dirty="0" smtClean="0"/>
-              <a:t>This is a very large relational set where one of the log file is ( 2B rows and 100GB uncompressed).</a:t>
-            </a:r>
-          </a:p>
-          <a:p>
-            <a:r>
-              <a:rPr lang="en-US" dirty="0"/>
-              <a:t>2 Billion page views and 16,900,000 clicks of 700 Million unique users, across 560 sites.</a:t>
-            </a:r>
-            <a:endParaRPr lang="en-US" dirty="0" smtClean="0"/>
-          </a:p>
-          <a:p>
-            <a:r>
-              <a:rPr lang="en-US" dirty="0" smtClean="0"/>
-              <a:t>Link to acquire the data: </a:t>
-            </a:r>
-            <a:r>
-              <a:rPr lang="en-US" dirty="0" smtClean="0">
-                <a:hlinkClick r:id="rId3"/>
-              </a:rPr>
-              <a:t>https://www.kaggle.com/c/outbrain-click-prediction/data</a:t>
-            </a:r>
-            <a:r>
-              <a:rPr lang="en-US" dirty="0" smtClean="0"/>
-              <a:t>.</a:t>
-            </a:r>
-            <a:endParaRPr lang="en-US" dirty="0"/>
-          </a:p>
-        </p:txBody>
-      </p:sp>
-      <p:sp>
-        <p:nvSpPr>
-          <p:cNvPr id="4" name="Slide Number Placeholder 3"/>
-          <p:cNvSpPr>
-            <a:spLocks noGrp="1"/>
-          </p:cNvSpPr>
-          <p:nvPr>
-            <p:ph type="sldNum" sz="quarter" idx="12"/>
-          </p:nvPr>
-        </p:nvSpPr>
-        <p:spPr/>
-        <p:txBody>
-          <a:bodyPr/>
-          <a:lstStyle/>
-          <a:p>
-            <a:fld id="{D875CEC6-8E5A-CE43-9ACC-02DF7099DAAF}" type="slidenum">
-              <a:rPr lang="en-US" smtClean="0"/>
-              <a:t>3</a:t>
-            </a:fld>
-            <a:endParaRPr lang="en-US"/>
-          </a:p>
-        </p:txBody>
-      </p:sp>
-    </p:spTree>
-    <p:extLst>
-      <p:ext uri="{BB962C8B-B14F-4D97-AF65-F5344CB8AC3E}">
-        <p14:creationId xmlns:p14="http://schemas.microsoft.com/office/powerpoint/2010/main" val="1972117763"/>
-      </p:ext>
-    </p:extLst>
-  </p:cSld>
-  <p:clrMapOvr>
-    <a:masterClrMapping/>
-  </p:clrMapOvr>
-</p:sld>
-</file>
-
-<file path=ppt/slides/slide4.xml><?xml version="1.0" encoding="utf-8"?>
-<p:sld xmlns:a="http://schemas.openxmlformats.org/drawingml/2006/main" xmlns:r="http://schemas.openxmlformats.org/officeDocument/2006/relationships" xmlns:p="http://schemas.openxmlformats.org/presentationml/2006/main">
-  <p:cSld>
-    <p:spTree>
-      <p:nvGrpSpPr>
-        <p:cNvPr id="1" name=""/>
-        <p:cNvGrpSpPr/>
-        <p:nvPr/>
-      </p:nvGrpSpPr>
-      <p:grpSpPr>
-        <a:xfrm>
-          <a:off x="0" y="0"/>
-          <a:ext cx="0" cy="0"/>
-          <a:chOff x="0" y="0"/>
-          <a:chExt cx="0" cy="0"/>
-        </a:xfrm>
-      </p:grpSpPr>
-      <p:sp>
-        <p:nvSpPr>
-          <p:cNvPr id="2" name="Title 1"/>
-          <p:cNvSpPr>
-            <a:spLocks noGrp="1"/>
-          </p:cNvSpPr>
-          <p:nvPr>
-            <p:ph type="title"/>
-          </p:nvPr>
-        </p:nvSpPr>
-        <p:spPr/>
-        <p:txBody>
-          <a:bodyPr/>
-          <a:lstStyle/>
-          <a:p>
-            <a:r>
-              <a:rPr lang="en-US" dirty="0" smtClean="0"/>
-              <a:t>DATA </a:t>
+              <a:t>APPENDIX </a:t>
             </a:r>
             <a:r>
               <a:rPr lang="mr-IN" dirty="0" smtClean="0"/>
@@ -6153,7 +5978,7 @@
             </a:r>
             <a:r>
               <a:rPr lang="en-US" dirty="0" smtClean="0"/>
-              <a:t> What is Page Views ?</a:t>
+              <a:t> II ; Graphical Representation of the data</a:t>
             </a:r>
             <a:endParaRPr lang="en-US" dirty="0"/>
           </a:p>
@@ -6176,858 +6001,7 @@
           <a:p>
             <a:fld id="{D875CEC6-8E5A-CE43-9ACC-02DF7099DAAF}" type="slidenum">
               <a:rPr lang="en-US" smtClean="0"/>
-              <a:t>4</a:t>
-            </a:fld>
-            <a:endParaRPr lang="en-US"/>
-          </a:p>
-        </p:txBody>
-      </p:sp>
-      <p:pic>
-        <p:nvPicPr>
-          <p:cNvPr id="6" name="Content Placeholder 5"/>
-          <p:cNvPicPr>
-            <a:picLocks noGrp="1" noChangeAspect="1"/>
-          </p:cNvPicPr>
-          <p:nvPr>
-            <p:ph idx="1"/>
-          </p:nvPr>
-        </p:nvPicPr>
-        <p:blipFill>
-          <a:blip r:embed="rId2">
-            <a:extLst>
-              <a:ext uri="{28A0092B-C50C-407E-A947-70E740481C1C}">
-                <a14:useLocalDpi xmlns:a14="http://schemas.microsoft.com/office/drawing/2010/main" val="0"/>
-              </a:ext>
-            </a:extLst>
-          </a:blip>
-          <a:stretch>
-            <a:fillRect/>
-          </a:stretch>
-        </p:blipFill>
-        <p:spPr>
-          <a:xfrm>
-            <a:off x="1800657" y="1511380"/>
-            <a:ext cx="7758979" cy="5126529"/>
-          </a:xfrm>
-        </p:spPr>
-      </p:pic>
-    </p:spTree>
-    <p:extLst>
-      <p:ext uri="{BB962C8B-B14F-4D97-AF65-F5344CB8AC3E}">
-        <p14:creationId xmlns:p14="http://schemas.microsoft.com/office/powerpoint/2010/main" val="1508989838"/>
-      </p:ext>
-    </p:extLst>
-  </p:cSld>
-  <p:clrMapOvr>
-    <a:masterClrMapping/>
-  </p:clrMapOvr>
-  <p:timing>
-    <p:tnLst>
-      <p:par>
-        <p:cTn id="1" dur="indefinite" restart="never" nodeType="tmRoot"/>
-      </p:par>
-    </p:tnLst>
-  </p:timing>
-</p:sld>
-</file>
-
-<file path=ppt/slides/slide5.xml><?xml version="1.0" encoding="utf-8"?>
-<p:sld xmlns:a="http://schemas.openxmlformats.org/drawingml/2006/main" xmlns:r="http://schemas.openxmlformats.org/officeDocument/2006/relationships" xmlns:p="http://schemas.openxmlformats.org/presentationml/2006/main">
-  <p:cSld>
-    <p:spTree>
-      <p:nvGrpSpPr>
-        <p:cNvPr id="1" name=""/>
-        <p:cNvGrpSpPr/>
-        <p:nvPr/>
-      </p:nvGrpSpPr>
-      <p:grpSpPr>
-        <a:xfrm>
-          <a:off x="0" y="0"/>
-          <a:ext cx="0" cy="0"/>
-          <a:chOff x="0" y="0"/>
-          <a:chExt cx="0" cy="0"/>
-        </a:xfrm>
-      </p:grpSpPr>
-      <p:sp>
-        <p:nvSpPr>
-          <p:cNvPr id="2" name="Title 1"/>
-          <p:cNvSpPr>
-            <a:spLocks noGrp="1"/>
-          </p:cNvSpPr>
-          <p:nvPr>
-            <p:ph type="title"/>
-          </p:nvPr>
-        </p:nvSpPr>
-        <p:spPr/>
-        <p:txBody>
-          <a:bodyPr/>
-          <a:lstStyle/>
-          <a:p>
-            <a:r>
-              <a:rPr lang="en-US" dirty="0" smtClean="0"/>
-              <a:t>Data </a:t>
-            </a:r>
-            <a:r>
-              <a:rPr lang="mr-IN" dirty="0" smtClean="0"/>
-              <a:t>–</a:t>
-            </a:r>
-            <a:r>
-              <a:rPr lang="en-US" dirty="0" smtClean="0"/>
-              <a:t> </a:t>
-            </a:r>
-            <a:r>
-              <a:rPr lang="en-US" dirty="0" err="1" smtClean="0"/>
-              <a:t>BiG</a:t>
-            </a:r>
-            <a:r>
-              <a:rPr lang="en-US" dirty="0" smtClean="0"/>
-              <a:t> or Small ?</a:t>
-            </a:r>
-            <a:endParaRPr lang="en-US" dirty="0"/>
-          </a:p>
-        </p:txBody>
-      </p:sp>
-      <p:sp>
-        <p:nvSpPr>
-          <p:cNvPr id="3" name="Content Placeholder 2"/>
-          <p:cNvSpPr>
-            <a:spLocks noGrp="1"/>
-          </p:cNvSpPr>
-          <p:nvPr>
-            <p:ph idx="1"/>
-          </p:nvPr>
-        </p:nvSpPr>
-        <p:spPr/>
-        <p:txBody>
-          <a:bodyPr>
-            <a:normAutofit/>
-          </a:bodyPr>
-          <a:lstStyle/>
-          <a:p>
-            <a:r>
-              <a:rPr lang="en-US" dirty="0" smtClean="0"/>
-              <a:t>Collected Data from multiple CSV files</a:t>
-            </a:r>
-          </a:p>
-          <a:p>
-            <a:r>
-              <a:rPr lang="en-US" dirty="0"/>
-              <a:t>Database Size - ~9GB</a:t>
-            </a:r>
-          </a:p>
-          <a:p>
-            <a:r>
-              <a:rPr lang="en-US" dirty="0"/>
-              <a:t>Did not even load the </a:t>
-            </a:r>
-            <a:r>
-              <a:rPr lang="en-US" dirty="0" smtClean="0"/>
-              <a:t>entire PAGE_VIEW log!!</a:t>
-            </a:r>
-            <a:endParaRPr lang="en-US" dirty="0"/>
-          </a:p>
-          <a:p>
-            <a:endParaRPr lang="en-US" dirty="0" smtClean="0"/>
-          </a:p>
-        </p:txBody>
-      </p:sp>
-      <p:sp>
-        <p:nvSpPr>
-          <p:cNvPr id="4" name="Slide Number Placeholder 3"/>
-          <p:cNvSpPr>
-            <a:spLocks noGrp="1"/>
-          </p:cNvSpPr>
-          <p:nvPr>
-            <p:ph type="sldNum" sz="quarter" idx="12"/>
-          </p:nvPr>
-        </p:nvSpPr>
-        <p:spPr/>
-        <p:txBody>
-          <a:bodyPr/>
-          <a:lstStyle/>
-          <a:p>
-            <a:fld id="{D875CEC6-8E5A-CE43-9ACC-02DF7099DAAF}" type="slidenum">
-              <a:rPr lang="en-US" smtClean="0"/>
-              <a:t>5</a:t>
-            </a:fld>
-            <a:endParaRPr lang="en-US"/>
-          </a:p>
-        </p:txBody>
-      </p:sp>
-      <p:sp>
-        <p:nvSpPr>
-          <p:cNvPr id="6" name="Rectangle 5"/>
-          <p:cNvSpPr/>
-          <p:nvPr/>
-        </p:nvSpPr>
-        <p:spPr>
-          <a:xfrm>
-            <a:off x="540328" y="3408358"/>
-            <a:ext cx="13404273" cy="3046988"/>
-          </a:xfrm>
-          <a:prstGeom prst="rect">
-            <a:avLst/>
-          </a:prstGeom>
-        </p:spPr>
-        <p:txBody>
-          <a:bodyPr wrap="square">
-            <a:spAutoFit/>
-          </a:bodyPr>
-          <a:lstStyle/>
-          <a:p>
-            <a:r>
-              <a:rPr lang="is-IS" sz="1600" dirty="0">
-                <a:solidFill>
-                  <a:srgbClr val="000000"/>
-                </a:solidFill>
-                <a:latin typeface="Menlo" charset="0"/>
-              </a:rPr>
-              <a:t> table         </a:t>
-            </a:r>
-            <a:r>
-              <a:rPr lang="is-IS" sz="1600" dirty="0" smtClean="0">
-                <a:solidFill>
-                  <a:srgbClr val="000000"/>
-                </a:solidFill>
-                <a:latin typeface="Menlo" charset="0"/>
-              </a:rPr>
-              <a:t>       | </a:t>
-            </a:r>
-            <a:r>
-              <a:rPr lang="is-IS" sz="1600" dirty="0">
-                <a:solidFill>
-                  <a:srgbClr val="000000"/>
-                </a:solidFill>
-                <a:latin typeface="Menlo" charset="0"/>
-              </a:rPr>
-              <a:t>table_size | related_objects_size | total_table_size | live_rows </a:t>
-            </a:r>
-          </a:p>
-          <a:p>
-            <a:r>
-              <a:rPr lang="is-IS" sz="1600" dirty="0">
-                <a:solidFill>
-                  <a:srgbClr val="000000"/>
-                </a:solidFill>
-                <a:latin typeface="Menlo" charset="0"/>
-              </a:rPr>
-              <a:t>----------------------+------------+----------------------+------------------+-----------</a:t>
-            </a:r>
-          </a:p>
-          <a:p>
-            <a:r>
-              <a:rPr lang="is-IS" sz="1600" dirty="0">
-                <a:solidFill>
-                  <a:srgbClr val="000000"/>
-                </a:solidFill>
-                <a:latin typeface="Menlo" charset="0"/>
-              </a:rPr>
-              <a:t> promoted_content     | 32 MB      | 32 kB                | 32 MB            |    559583</a:t>
-            </a:r>
-          </a:p>
-          <a:p>
-            <a:r>
-              <a:rPr lang="is-IS" sz="1600" dirty="0">
-                <a:solidFill>
-                  <a:srgbClr val="000000"/>
-                </a:solidFill>
-                <a:latin typeface="Menlo" charset="0"/>
-              </a:rPr>
-              <a:t> documents_meta       | 164 MB     | 64 kB                | 164 MB           |   2999334</a:t>
-            </a:r>
-          </a:p>
-          <a:p>
-            <a:r>
-              <a:rPr lang="is-IS" sz="1600" dirty="0">
-                <a:solidFill>
-                  <a:srgbClr val="000000"/>
-                </a:solidFill>
-                <a:latin typeface="Menlo" charset="0"/>
-              </a:rPr>
-              <a:t> documents_categories | 273 MB     | 88 kB                | 273 MB           |   5481471</a:t>
-            </a:r>
-          </a:p>
-          <a:p>
-            <a:r>
-              <a:rPr lang="is-IS" sz="1600" dirty="0">
-                <a:solidFill>
-                  <a:srgbClr val="000000"/>
-                </a:solidFill>
-                <a:latin typeface="Menlo" charset="0"/>
-              </a:rPr>
-              <a:t> documents_entities   | 446 MB     | 136 kB               | 446 MB           |   5537633</a:t>
-            </a:r>
-          </a:p>
-          <a:p>
-            <a:r>
-              <a:rPr lang="is-IS" sz="1600" dirty="0">
-                <a:solidFill>
-                  <a:srgbClr val="000000"/>
-                </a:solidFill>
-                <a:latin typeface="Menlo" charset="0"/>
-              </a:rPr>
-              <a:t> page_views_sample    | 726 MB     | 200 kB               | 726 MB           |  10000008</a:t>
-            </a:r>
-          </a:p>
-          <a:p>
-            <a:r>
-              <a:rPr lang="is-IS" sz="1600" dirty="0">
-                <a:solidFill>
-                  <a:srgbClr val="000000"/>
-                </a:solidFill>
-                <a:latin typeface="Menlo" charset="0"/>
-              </a:rPr>
-              <a:t> documents_topics     | 564 MB     | 160 kB               | 564 MB           |  11325980</a:t>
-            </a:r>
-          </a:p>
-          <a:p>
-            <a:r>
-              <a:rPr lang="is-IS" sz="1600" dirty="0">
-                <a:solidFill>
-                  <a:srgbClr val="000000"/>
-                </a:solidFill>
-                <a:latin typeface="Menlo" charset="0"/>
-              </a:rPr>
-              <a:t> events               | 1822 MB    | 480 kB               | 1822 MB          |  23121858</a:t>
-            </a:r>
-          </a:p>
-          <a:p>
-            <a:r>
-              <a:rPr lang="is-IS" sz="1600" dirty="0">
-                <a:solidFill>
-                  <a:srgbClr val="000000"/>
-                </a:solidFill>
-                <a:latin typeface="Menlo" charset="0"/>
-              </a:rPr>
-              <a:t> clicks_test          | 1361 MB    | 360 kB               | 1361 MB          |  32225335</a:t>
-            </a:r>
-          </a:p>
-          <a:p>
-            <a:r>
-              <a:rPr lang="is-IS" sz="1600" dirty="0">
-                <a:solidFill>
-                  <a:srgbClr val="000000"/>
-                </a:solidFill>
-                <a:latin typeface="Menlo" charset="0"/>
-              </a:rPr>
-              <a:t> clicks_train         | 4336 MB    | 1112 kB              | 4337 MB          |  87141751</a:t>
-            </a:r>
-          </a:p>
-          <a:p>
-            <a:r>
-              <a:rPr lang="is-IS" sz="1600" dirty="0">
-                <a:solidFill>
-                  <a:srgbClr val="000000"/>
-                </a:solidFill>
-                <a:latin typeface="Menlo" charset="0"/>
-              </a:rPr>
-              <a:t> TOTAL                | 9724 MB    | 2632 kB              | 9726 MB          | 178392953</a:t>
-            </a:r>
-            <a:endParaRPr lang="is-IS" sz="1600" dirty="0">
-              <a:solidFill>
-                <a:srgbClr val="000000"/>
-              </a:solidFill>
-              <a:effectLst/>
-              <a:latin typeface="Menlo" charset="0"/>
-            </a:endParaRPr>
-          </a:p>
-        </p:txBody>
-      </p:sp>
-    </p:spTree>
-    <p:extLst>
-      <p:ext uri="{BB962C8B-B14F-4D97-AF65-F5344CB8AC3E}">
-        <p14:creationId xmlns:p14="http://schemas.microsoft.com/office/powerpoint/2010/main" val="1893351295"/>
-      </p:ext>
-    </p:extLst>
-  </p:cSld>
-  <p:clrMapOvr>
-    <a:masterClrMapping/>
-  </p:clrMapOvr>
-</p:sld>
-</file>
-
-<file path=ppt/slides/slide6.xml><?xml version="1.0" encoding="utf-8"?>
-<p:sld xmlns:a="http://schemas.openxmlformats.org/drawingml/2006/main" xmlns:r="http://schemas.openxmlformats.org/officeDocument/2006/relationships" xmlns:p="http://schemas.openxmlformats.org/presentationml/2006/main">
-  <p:cSld>
-    <p:spTree>
-      <p:nvGrpSpPr>
-        <p:cNvPr id="1" name=""/>
-        <p:cNvGrpSpPr/>
-        <p:nvPr/>
-      </p:nvGrpSpPr>
-      <p:grpSpPr>
-        <a:xfrm>
-          <a:off x="0" y="0"/>
-          <a:ext cx="0" cy="0"/>
-          <a:chOff x="0" y="0"/>
-          <a:chExt cx="0" cy="0"/>
-        </a:xfrm>
-      </p:grpSpPr>
-      <p:sp>
-        <p:nvSpPr>
-          <p:cNvPr id="2" name="Title 1"/>
-          <p:cNvSpPr>
-            <a:spLocks noGrp="1"/>
-          </p:cNvSpPr>
-          <p:nvPr>
-            <p:ph type="title"/>
-          </p:nvPr>
-        </p:nvSpPr>
-        <p:spPr/>
-        <p:txBody>
-          <a:bodyPr/>
-          <a:lstStyle/>
-          <a:p>
-            <a:r>
-              <a:rPr lang="en-US" dirty="0" smtClean="0"/>
-              <a:t>Data - Cleaning and Munging</a:t>
-            </a:r>
-            <a:endParaRPr lang="en-US" dirty="0"/>
-          </a:p>
-        </p:txBody>
-      </p:sp>
-      <p:sp>
-        <p:nvSpPr>
-          <p:cNvPr id="3" name="Content Placeholder 2"/>
-          <p:cNvSpPr>
-            <a:spLocks noGrp="1"/>
-          </p:cNvSpPr>
-          <p:nvPr>
-            <p:ph idx="1"/>
-          </p:nvPr>
-        </p:nvSpPr>
-        <p:spPr/>
-        <p:txBody>
-          <a:bodyPr>
-            <a:normAutofit/>
-          </a:bodyPr>
-          <a:lstStyle/>
-          <a:p>
-            <a:r>
-              <a:rPr lang="en-US" dirty="0" smtClean="0"/>
-              <a:t>Current Status</a:t>
-            </a:r>
-          </a:p>
-          <a:p>
-            <a:pPr lvl="1"/>
-            <a:r>
-              <a:rPr lang="en-US" dirty="0" smtClean="0"/>
-              <a:t>Analysis is in progress using following notebook</a:t>
-            </a:r>
-          </a:p>
-          <a:p>
-            <a:pPr lvl="2"/>
-            <a:r>
-              <a:rPr lang="en-US" dirty="0" smtClean="0">
-                <a:hlinkClick r:id="rId2"/>
-              </a:rPr>
-              <a:t>DSClickPrediction/notebooks/</a:t>
-            </a:r>
-            <a:r>
-              <a:rPr lang="en-US" b="1" dirty="0" err="1" smtClean="0">
-                <a:hlinkClick r:id="rId2"/>
-              </a:rPr>
-              <a:t>OutbrainDataAnalysis.ipynb</a:t>
-            </a:r>
-            <a:endParaRPr lang="en-US" b="1" dirty="0" smtClean="0"/>
-          </a:p>
-          <a:p>
-            <a:pPr lvl="1"/>
-            <a:r>
-              <a:rPr lang="en-US" dirty="0" smtClean="0"/>
-              <a:t>Created  a relational database locally for each data set</a:t>
-            </a:r>
-          </a:p>
-          <a:p>
-            <a:r>
-              <a:rPr lang="en-US" dirty="0" smtClean="0"/>
-              <a:t>Next Step</a:t>
-            </a:r>
-          </a:p>
-          <a:p>
-            <a:pPr lvl="1"/>
-            <a:r>
-              <a:rPr lang="en-US" dirty="0" smtClean="0"/>
-              <a:t>Create a de-normalized fact table to get all the features</a:t>
-            </a:r>
-          </a:p>
-          <a:p>
-            <a:pPr lvl="1"/>
-            <a:r>
-              <a:rPr lang="en-US" dirty="0" smtClean="0"/>
-              <a:t>Convert categorical variables into dummy variables</a:t>
-            </a:r>
-          </a:p>
-          <a:p>
-            <a:pPr lvl="1"/>
-            <a:r>
-              <a:rPr lang="en-US" dirty="0" smtClean="0"/>
-              <a:t>Lots of missing values </a:t>
-            </a:r>
-            <a:r>
-              <a:rPr lang="mr-IN" dirty="0" smtClean="0"/>
-              <a:t>–</a:t>
-            </a:r>
-            <a:r>
-              <a:rPr lang="en-US" dirty="0" smtClean="0"/>
-              <a:t> Need to decide how to handle them</a:t>
-            </a:r>
-          </a:p>
-          <a:p>
-            <a:pPr lvl="1"/>
-            <a:r>
-              <a:rPr lang="en-US" dirty="0" smtClean="0"/>
-              <a:t>Create Feature and Response vector</a:t>
-            </a:r>
-          </a:p>
-          <a:p>
-            <a:pPr lvl="1"/>
-            <a:endParaRPr lang="en-US" dirty="0" smtClean="0"/>
-          </a:p>
-          <a:p>
-            <a:pPr lvl="1"/>
-            <a:endParaRPr lang="en-US" dirty="0" smtClean="0"/>
-          </a:p>
-        </p:txBody>
-      </p:sp>
-      <p:sp>
-        <p:nvSpPr>
-          <p:cNvPr id="5" name="Slide Number Placeholder 4"/>
-          <p:cNvSpPr>
-            <a:spLocks noGrp="1"/>
-          </p:cNvSpPr>
-          <p:nvPr>
-            <p:ph type="sldNum" sz="quarter" idx="12"/>
-          </p:nvPr>
-        </p:nvSpPr>
-        <p:spPr/>
-        <p:txBody>
-          <a:bodyPr/>
-          <a:lstStyle/>
-          <a:p>
-            <a:fld id="{D875CEC6-8E5A-CE43-9ACC-02DF7099DAAF}" type="slidenum">
-              <a:rPr lang="en-US" smtClean="0"/>
-              <a:t>6</a:t>
-            </a:fld>
-            <a:endParaRPr lang="en-US"/>
-          </a:p>
-        </p:txBody>
-      </p:sp>
-    </p:spTree>
-    <p:extLst>
-      <p:ext uri="{BB962C8B-B14F-4D97-AF65-F5344CB8AC3E}">
-        <p14:creationId xmlns:p14="http://schemas.microsoft.com/office/powerpoint/2010/main" val="1120634943"/>
-      </p:ext>
-    </p:extLst>
-  </p:cSld>
-  <p:clrMapOvr>
-    <a:masterClrMapping/>
-  </p:clrMapOvr>
-  <p:timing>
-    <p:tnLst>
-      <p:par>
-        <p:cTn id="1" dur="indefinite" restart="never" nodeType="tmRoot"/>
-      </p:par>
-    </p:tnLst>
-  </p:timing>
-</p:sld>
-</file>
-
-<file path=ppt/slides/slide7.xml><?xml version="1.0" encoding="utf-8"?>
-<p:sld xmlns:a="http://schemas.openxmlformats.org/drawingml/2006/main" xmlns:r="http://schemas.openxmlformats.org/officeDocument/2006/relationships" xmlns:p="http://schemas.openxmlformats.org/presentationml/2006/main">
-  <p:cSld>
-    <p:spTree>
-      <p:nvGrpSpPr>
-        <p:cNvPr id="1" name=""/>
-        <p:cNvGrpSpPr/>
-        <p:nvPr/>
-      </p:nvGrpSpPr>
-      <p:grpSpPr>
-        <a:xfrm>
-          <a:off x="0" y="0"/>
-          <a:ext cx="0" cy="0"/>
-          <a:chOff x="0" y="0"/>
-          <a:chExt cx="0" cy="0"/>
-        </a:xfrm>
-      </p:grpSpPr>
-      <p:sp>
-        <p:nvSpPr>
-          <p:cNvPr id="2" name="Title 1"/>
-          <p:cNvSpPr>
-            <a:spLocks noGrp="1"/>
-          </p:cNvSpPr>
-          <p:nvPr>
-            <p:ph type="title"/>
-          </p:nvPr>
-        </p:nvSpPr>
-        <p:spPr/>
-        <p:txBody>
-          <a:bodyPr/>
-          <a:lstStyle/>
-          <a:p>
-            <a:r>
-              <a:rPr lang="en-US" dirty="0"/>
-              <a:t>Project -  </a:t>
-            </a:r>
-            <a:r>
-              <a:rPr lang="en-US" dirty="0" smtClean="0"/>
-              <a:t>Next Steps</a:t>
-            </a:r>
-            <a:endParaRPr lang="en-US" dirty="0"/>
-          </a:p>
-        </p:txBody>
-      </p:sp>
-      <p:sp>
-        <p:nvSpPr>
-          <p:cNvPr id="3" name="Content Placeholder 2"/>
-          <p:cNvSpPr>
-            <a:spLocks noGrp="1"/>
-          </p:cNvSpPr>
-          <p:nvPr>
-            <p:ph idx="1"/>
-          </p:nvPr>
-        </p:nvSpPr>
-        <p:spPr/>
-        <p:txBody>
-          <a:bodyPr/>
-          <a:lstStyle/>
-          <a:p>
-            <a:r>
-              <a:rPr lang="en-US" dirty="0" smtClean="0"/>
-              <a:t>Model Selection</a:t>
-            </a:r>
-          </a:p>
-          <a:p>
-            <a:r>
-              <a:rPr lang="en-US" dirty="0" smtClean="0"/>
-              <a:t>Model training</a:t>
-            </a:r>
-          </a:p>
-          <a:p>
-            <a:r>
-              <a:rPr lang="en-US" dirty="0" smtClean="0"/>
-              <a:t>Prediction </a:t>
-            </a:r>
-          </a:p>
-          <a:p>
-            <a:r>
-              <a:rPr lang="en-US" dirty="0" smtClean="0"/>
-              <a:t>Evaluation</a:t>
-            </a:r>
-          </a:p>
-        </p:txBody>
-      </p:sp>
-      <p:sp>
-        <p:nvSpPr>
-          <p:cNvPr id="4" name="Slide Number Placeholder 3"/>
-          <p:cNvSpPr>
-            <a:spLocks noGrp="1"/>
-          </p:cNvSpPr>
-          <p:nvPr>
-            <p:ph type="sldNum" sz="quarter" idx="12"/>
-          </p:nvPr>
-        </p:nvSpPr>
-        <p:spPr/>
-        <p:txBody>
-          <a:bodyPr/>
-          <a:lstStyle/>
-          <a:p>
-            <a:fld id="{D875CEC6-8E5A-CE43-9ACC-02DF7099DAAF}" type="slidenum">
-              <a:rPr lang="en-US" smtClean="0"/>
-              <a:t>7</a:t>
-            </a:fld>
-            <a:endParaRPr lang="en-US"/>
-          </a:p>
-        </p:txBody>
-      </p:sp>
-    </p:spTree>
-    <p:extLst>
-      <p:ext uri="{BB962C8B-B14F-4D97-AF65-F5344CB8AC3E}">
-        <p14:creationId xmlns:p14="http://schemas.microsoft.com/office/powerpoint/2010/main" val="377641290"/>
-      </p:ext>
-    </p:extLst>
-  </p:cSld>
-  <p:clrMapOvr>
-    <a:masterClrMapping/>
-  </p:clrMapOvr>
-  <p:timing>
-    <p:tnLst>
-      <p:par>
-        <p:cTn id="1" dur="indefinite" restart="never" nodeType="tmRoot"/>
-      </p:par>
-    </p:tnLst>
-  </p:timing>
-</p:sld>
-</file>
-
-<file path=ppt/slides/slide8.xml><?xml version="1.0" encoding="utf-8"?>
-<p:sld xmlns:a="http://schemas.openxmlformats.org/drawingml/2006/main" xmlns:r="http://schemas.openxmlformats.org/officeDocument/2006/relationships" xmlns:p="http://schemas.openxmlformats.org/presentationml/2006/main">
-  <p:cSld>
-    <p:spTree>
-      <p:nvGrpSpPr>
-        <p:cNvPr id="1" name=""/>
-        <p:cNvGrpSpPr/>
-        <p:nvPr/>
-      </p:nvGrpSpPr>
-      <p:grpSpPr>
-        <a:xfrm>
-          <a:off x="0" y="0"/>
-          <a:ext cx="0" cy="0"/>
-          <a:chOff x="0" y="0"/>
-          <a:chExt cx="0" cy="0"/>
-        </a:xfrm>
-      </p:grpSpPr>
-      <p:sp>
-        <p:nvSpPr>
-          <p:cNvPr id="2" name="Title 1"/>
-          <p:cNvSpPr>
-            <a:spLocks noGrp="1"/>
-          </p:cNvSpPr>
-          <p:nvPr>
-            <p:ph type="title"/>
-          </p:nvPr>
-        </p:nvSpPr>
-        <p:spPr/>
-        <p:txBody>
-          <a:bodyPr/>
-          <a:lstStyle/>
-          <a:p>
-            <a:r>
-              <a:rPr lang="en-US" dirty="0" smtClean="0"/>
-              <a:t>Questions ?</a:t>
-            </a:r>
-            <a:endParaRPr lang="en-US" dirty="0"/>
-          </a:p>
-        </p:txBody>
-      </p:sp>
-      <p:sp>
-        <p:nvSpPr>
-          <p:cNvPr id="4" name="Slide Number Placeholder 3"/>
-          <p:cNvSpPr>
-            <a:spLocks noGrp="1"/>
-          </p:cNvSpPr>
-          <p:nvPr>
-            <p:ph type="sldNum" sz="quarter" idx="12"/>
-          </p:nvPr>
-        </p:nvSpPr>
-        <p:spPr/>
-        <p:txBody>
-          <a:bodyPr/>
-          <a:lstStyle/>
-          <a:p>
-            <a:fld id="{D875CEC6-8E5A-CE43-9ACC-02DF7099DAAF}" type="slidenum">
-              <a:rPr lang="en-US" smtClean="0"/>
-              <a:t>8</a:t>
-            </a:fld>
-            <a:endParaRPr lang="en-US"/>
-          </a:p>
-        </p:txBody>
-      </p:sp>
-      <p:sp>
-        <p:nvSpPr>
-          <p:cNvPr id="5" name="Content Placeholder 4"/>
-          <p:cNvSpPr>
-            <a:spLocks noGrp="1"/>
-          </p:cNvSpPr>
-          <p:nvPr>
-            <p:ph idx="1"/>
-          </p:nvPr>
-        </p:nvSpPr>
-        <p:spPr/>
-        <p:txBody>
-          <a:bodyPr/>
-          <a:lstStyle/>
-          <a:p>
-            <a:endParaRPr lang="en-US"/>
-          </a:p>
-        </p:txBody>
-      </p:sp>
-    </p:spTree>
-    <p:extLst>
-      <p:ext uri="{BB962C8B-B14F-4D97-AF65-F5344CB8AC3E}">
-        <p14:creationId xmlns:p14="http://schemas.microsoft.com/office/powerpoint/2010/main" val="841622756"/>
-      </p:ext>
-    </p:extLst>
-  </p:cSld>
-  <p:clrMapOvr>
-    <a:masterClrMapping/>
-  </p:clrMapOvr>
-  <p:timing>
-    <p:tnLst>
-      <p:par>
-        <p:cTn id="1" dur="indefinite" restart="never" nodeType="tmRoot"/>
-      </p:par>
-    </p:tnLst>
-  </p:timing>
-</p:sld>
-</file>
-
-<file path=ppt/slides/slide9.xml><?xml version="1.0" encoding="utf-8"?>
-<p:sld xmlns:a="http://schemas.openxmlformats.org/drawingml/2006/main" xmlns:r="http://schemas.openxmlformats.org/officeDocument/2006/relationships" xmlns:p="http://schemas.openxmlformats.org/presentationml/2006/main">
-  <p:cSld>
-    <p:spTree>
-      <p:nvGrpSpPr>
-        <p:cNvPr id="1" name=""/>
-        <p:cNvGrpSpPr/>
-        <p:nvPr/>
-      </p:nvGrpSpPr>
-      <p:grpSpPr>
-        <a:xfrm>
-          <a:off x="0" y="0"/>
-          <a:ext cx="0" cy="0"/>
-          <a:chOff x="0" y="0"/>
-          <a:chExt cx="0" cy="0"/>
-        </a:xfrm>
-      </p:grpSpPr>
-      <p:sp>
-        <p:nvSpPr>
-          <p:cNvPr id="2" name="Title 1"/>
-          <p:cNvSpPr>
-            <a:spLocks noGrp="1"/>
-          </p:cNvSpPr>
-          <p:nvPr>
-            <p:ph type="title"/>
-          </p:nvPr>
-        </p:nvSpPr>
-        <p:spPr/>
-        <p:txBody>
-          <a:bodyPr/>
-          <a:lstStyle/>
-          <a:p>
-            <a:r>
-              <a:rPr lang="en-US" dirty="0" smtClean="0"/>
-              <a:t>APPENDIX </a:t>
-            </a:r>
-            <a:r>
-              <a:rPr lang="mr-IN" dirty="0" smtClean="0"/>
-              <a:t>–</a:t>
-            </a:r>
-            <a:r>
-              <a:rPr lang="en-US" dirty="0" smtClean="0"/>
-              <a:t> II ; Graphical Representation of the data</a:t>
-            </a:r>
-            <a:endParaRPr lang="en-US" dirty="0"/>
-          </a:p>
-        </p:txBody>
-      </p:sp>
-      <p:sp>
-        <p:nvSpPr>
-          <p:cNvPr id="4" name="Slide Number Placeholder 3"/>
-          <p:cNvSpPr>
-            <a:spLocks noGrp="1"/>
-          </p:cNvSpPr>
-          <p:nvPr>
-            <p:ph type="sldNum" sz="quarter" idx="12"/>
-          </p:nvPr>
-        </p:nvSpPr>
-        <p:spPr/>
-        <p:txBody>
-          <a:bodyPr/>
-          <a:lstStyle/>
-          <a:p>
-            <a:fld id="{D875CEC6-8E5A-CE43-9ACC-02DF7099DAAF}" type="slidenum">
-              <a:rPr lang="en-US" smtClean="0"/>
-              <a:t>9</a:t>
+              <a:t>10</a:t>
             </a:fld>
             <a:endParaRPr lang="en-US"/>
           </a:p>
@@ -7700,6 +6674,1258 @@
     <p:extLst>
       <p:ext uri="{BB962C8B-B14F-4D97-AF65-F5344CB8AC3E}">
         <p14:creationId xmlns:p14="http://schemas.microsoft.com/office/powerpoint/2010/main" val="659111951"/>
+      </p:ext>
+    </p:extLst>
+  </p:cSld>
+  <p:clrMapOvr>
+    <a:masterClrMapping/>
+  </p:clrMapOvr>
+  <p:timing>
+    <p:tnLst>
+      <p:par>
+        <p:cTn id="1" dur="indefinite" restart="never" nodeType="tmRoot"/>
+      </p:par>
+    </p:tnLst>
+  </p:timing>
+</p:sld>
+</file>
+
+<file path=ppt/slides/slide2.xml><?xml version="1.0" encoding="utf-8"?>
+<p:sld xmlns:a="http://schemas.openxmlformats.org/drawingml/2006/main" xmlns:r="http://schemas.openxmlformats.org/officeDocument/2006/relationships" xmlns:p="http://schemas.openxmlformats.org/presentationml/2006/main">
+  <p:cSld>
+    <p:spTree>
+      <p:nvGrpSpPr>
+        <p:cNvPr id="1" name=""/>
+        <p:cNvGrpSpPr/>
+        <p:nvPr/>
+      </p:nvGrpSpPr>
+      <p:grpSpPr>
+        <a:xfrm>
+          <a:off x="0" y="0"/>
+          <a:ext cx="0" cy="0"/>
+          <a:chOff x="0" y="0"/>
+          <a:chExt cx="0" cy="0"/>
+        </a:xfrm>
+      </p:grpSpPr>
+      <p:sp>
+        <p:nvSpPr>
+          <p:cNvPr id="2" name="Title 1"/>
+          <p:cNvSpPr>
+            <a:spLocks noGrp="1"/>
+          </p:cNvSpPr>
+          <p:nvPr>
+            <p:ph type="title"/>
+          </p:nvPr>
+        </p:nvSpPr>
+        <p:spPr/>
+        <p:txBody>
+          <a:bodyPr/>
+          <a:lstStyle/>
+          <a:p>
+            <a:r>
+              <a:rPr lang="en-US" dirty="0" smtClean="0"/>
+              <a:t>What is the challenge?</a:t>
+            </a:r>
+            <a:endParaRPr lang="en-US" dirty="0"/>
+          </a:p>
+        </p:txBody>
+      </p:sp>
+      <p:sp>
+        <p:nvSpPr>
+          <p:cNvPr id="3" name="Content Placeholder 2"/>
+          <p:cNvSpPr>
+            <a:spLocks noGrp="1"/>
+          </p:cNvSpPr>
+          <p:nvPr>
+            <p:ph idx="1"/>
+          </p:nvPr>
+        </p:nvSpPr>
+        <p:spPr/>
+        <p:txBody>
+          <a:bodyPr/>
+          <a:lstStyle/>
+          <a:p>
+            <a:r>
+              <a:rPr lang="en-US" dirty="0" smtClean="0"/>
+              <a:t>Can we predict which recommended  content each user will click?</a:t>
+            </a:r>
+          </a:p>
+          <a:p>
+            <a:endParaRPr lang="en-US" dirty="0" smtClean="0"/>
+          </a:p>
+          <a:p>
+            <a:r>
+              <a:rPr lang="en-US" dirty="0" smtClean="0"/>
+              <a:t>What are the significant features that drive the likely hood of user clicking the recommended content indicating association? </a:t>
+            </a:r>
+          </a:p>
+          <a:p>
+            <a:endParaRPr lang="en-US" dirty="0" smtClean="0"/>
+          </a:p>
+          <a:p>
+            <a:r>
+              <a:rPr lang="en-US" dirty="0" smtClean="0"/>
+              <a:t>Improving </a:t>
+            </a:r>
+            <a:r>
+              <a:rPr lang="en-US" dirty="0" err="1" smtClean="0"/>
+              <a:t>Outbrain’s</a:t>
+            </a:r>
+            <a:r>
+              <a:rPr lang="en-US" dirty="0" smtClean="0"/>
+              <a:t> recommendation algorithm will mean more users uncover stories that satisfy their individual tastes.</a:t>
+            </a:r>
+            <a:endParaRPr lang="en-US" dirty="0"/>
+          </a:p>
+        </p:txBody>
+      </p:sp>
+      <p:sp>
+        <p:nvSpPr>
+          <p:cNvPr id="4" name="Slide Number Placeholder 3"/>
+          <p:cNvSpPr>
+            <a:spLocks noGrp="1"/>
+          </p:cNvSpPr>
+          <p:nvPr>
+            <p:ph type="sldNum" sz="quarter" idx="12"/>
+          </p:nvPr>
+        </p:nvSpPr>
+        <p:spPr/>
+        <p:txBody>
+          <a:bodyPr/>
+          <a:lstStyle/>
+          <a:p>
+            <a:fld id="{D875CEC6-8E5A-CE43-9ACC-02DF7099DAAF}" type="slidenum">
+              <a:rPr lang="en-US" smtClean="0"/>
+              <a:t>2</a:t>
+            </a:fld>
+            <a:endParaRPr lang="en-US"/>
+          </a:p>
+        </p:txBody>
+      </p:sp>
+    </p:spTree>
+    <p:extLst>
+      <p:ext uri="{BB962C8B-B14F-4D97-AF65-F5344CB8AC3E}">
+        <p14:creationId xmlns:p14="http://schemas.microsoft.com/office/powerpoint/2010/main" val="881873108"/>
+      </p:ext>
+    </p:extLst>
+  </p:cSld>
+  <p:clrMapOvr>
+    <a:masterClrMapping/>
+  </p:clrMapOvr>
+  <p:timing>
+    <p:tnLst>
+      <p:par>
+        <p:cTn id="1" dur="indefinite" restart="never" nodeType="tmRoot"/>
+      </p:par>
+    </p:tnLst>
+  </p:timing>
+</p:sld>
+</file>
+
+<file path=ppt/slides/slide3.xml><?xml version="1.0" encoding="utf-8"?>
+<p:sld xmlns:a="http://schemas.openxmlformats.org/drawingml/2006/main" xmlns:r="http://schemas.openxmlformats.org/officeDocument/2006/relationships" xmlns:p="http://schemas.openxmlformats.org/presentationml/2006/main">
+  <p:cSld>
+    <p:spTree>
+      <p:nvGrpSpPr>
+        <p:cNvPr id="1" name=""/>
+        <p:cNvGrpSpPr/>
+        <p:nvPr/>
+      </p:nvGrpSpPr>
+      <p:grpSpPr>
+        <a:xfrm>
+          <a:off x="0" y="0"/>
+          <a:ext cx="0" cy="0"/>
+          <a:chOff x="0" y="0"/>
+          <a:chExt cx="0" cy="0"/>
+        </a:xfrm>
+      </p:grpSpPr>
+      <p:sp>
+        <p:nvSpPr>
+          <p:cNvPr id="2" name="Title 1"/>
+          <p:cNvSpPr>
+            <a:spLocks noGrp="1"/>
+          </p:cNvSpPr>
+          <p:nvPr>
+            <p:ph type="title"/>
+          </p:nvPr>
+        </p:nvSpPr>
+        <p:spPr/>
+        <p:txBody>
+          <a:bodyPr/>
+          <a:lstStyle/>
+          <a:p>
+            <a:r>
+              <a:rPr lang="en-US" dirty="0" smtClean="0"/>
+              <a:t>DATA </a:t>
+            </a:r>
+            <a:r>
+              <a:rPr lang="mr-IN" dirty="0" smtClean="0"/>
+              <a:t>–</a:t>
+            </a:r>
+            <a:r>
+              <a:rPr lang="en-US" dirty="0" smtClean="0"/>
+              <a:t> </a:t>
+            </a:r>
+            <a:r>
+              <a:rPr lang="en-US" dirty="0" smtClean="0"/>
+              <a:t>Sample Page</a:t>
+            </a:r>
+            <a:r>
+              <a:rPr lang="en-US" dirty="0" smtClean="0"/>
+              <a:t>?</a:t>
+            </a:r>
+            <a:endParaRPr lang="en-US" dirty="0"/>
+          </a:p>
+        </p:txBody>
+      </p:sp>
+      <p:sp>
+        <p:nvSpPr>
+          <p:cNvPr id="4" name="Slide Number Placeholder 3"/>
+          <p:cNvSpPr>
+            <a:spLocks noGrp="1"/>
+          </p:cNvSpPr>
+          <p:nvPr>
+            <p:ph type="sldNum" sz="quarter" idx="12"/>
+          </p:nvPr>
+        </p:nvSpPr>
+        <p:spPr/>
+        <p:txBody>
+          <a:bodyPr/>
+          <a:lstStyle/>
+          <a:p>
+            <a:fld id="{D875CEC6-8E5A-CE43-9ACC-02DF7099DAAF}" type="slidenum">
+              <a:rPr lang="en-US" smtClean="0"/>
+              <a:t>3</a:t>
+            </a:fld>
+            <a:endParaRPr lang="en-US"/>
+          </a:p>
+        </p:txBody>
+      </p:sp>
+      <p:pic>
+        <p:nvPicPr>
+          <p:cNvPr id="6" name="Content Placeholder 5"/>
+          <p:cNvPicPr>
+            <a:picLocks noGrp="1" noChangeAspect="1"/>
+          </p:cNvPicPr>
+          <p:nvPr>
+            <p:ph idx="1"/>
+          </p:nvPr>
+        </p:nvPicPr>
+        <p:blipFill>
+          <a:blip r:embed="rId2">
+            <a:extLst>
+              <a:ext uri="{28A0092B-C50C-407E-A947-70E740481C1C}">
+                <a14:useLocalDpi xmlns:a14="http://schemas.microsoft.com/office/drawing/2010/main" val="0"/>
+              </a:ext>
+            </a:extLst>
+          </a:blip>
+          <a:stretch>
+            <a:fillRect/>
+          </a:stretch>
+        </p:blipFill>
+        <p:spPr>
+          <a:xfrm>
+            <a:off x="1800657" y="1511380"/>
+            <a:ext cx="7758979" cy="5126529"/>
+          </a:xfrm>
+        </p:spPr>
+      </p:pic>
+    </p:spTree>
+    <p:extLst>
+      <p:ext uri="{BB962C8B-B14F-4D97-AF65-F5344CB8AC3E}">
+        <p14:creationId xmlns:p14="http://schemas.microsoft.com/office/powerpoint/2010/main" val="1508989838"/>
+      </p:ext>
+    </p:extLst>
+  </p:cSld>
+  <p:clrMapOvr>
+    <a:masterClrMapping/>
+  </p:clrMapOvr>
+  <p:timing>
+    <p:tnLst>
+      <p:par>
+        <p:cTn id="1" dur="indefinite" restart="never" nodeType="tmRoot"/>
+      </p:par>
+    </p:tnLst>
+  </p:timing>
+</p:sld>
+</file>
+
+<file path=ppt/slides/slide4.xml><?xml version="1.0" encoding="utf-8"?>
+<p:sld xmlns:a="http://schemas.openxmlformats.org/drawingml/2006/main" xmlns:r="http://schemas.openxmlformats.org/officeDocument/2006/relationships" xmlns:p="http://schemas.openxmlformats.org/presentationml/2006/main">
+  <p:cSld>
+    <p:spTree>
+      <p:nvGrpSpPr>
+        <p:cNvPr id="1" name=""/>
+        <p:cNvGrpSpPr/>
+        <p:nvPr/>
+      </p:nvGrpSpPr>
+      <p:grpSpPr>
+        <a:xfrm>
+          <a:off x="0" y="0"/>
+          <a:ext cx="0" cy="0"/>
+          <a:chOff x="0" y="0"/>
+          <a:chExt cx="0" cy="0"/>
+        </a:xfrm>
+      </p:grpSpPr>
+      <p:sp>
+        <p:nvSpPr>
+          <p:cNvPr id="2" name="Title 1"/>
+          <p:cNvSpPr>
+            <a:spLocks noGrp="1"/>
+          </p:cNvSpPr>
+          <p:nvPr>
+            <p:ph type="title"/>
+          </p:nvPr>
+        </p:nvSpPr>
+        <p:spPr/>
+        <p:txBody>
+          <a:bodyPr/>
+          <a:lstStyle/>
+          <a:p>
+            <a:r>
+              <a:rPr lang="en-US" dirty="0" smtClean="0"/>
+              <a:t>What data would be used ?</a:t>
+            </a:r>
+            <a:endParaRPr lang="en-US" dirty="0"/>
+          </a:p>
+        </p:txBody>
+      </p:sp>
+      <p:sp>
+        <p:nvSpPr>
+          <p:cNvPr id="3" name="Content Placeholder 2"/>
+          <p:cNvSpPr>
+            <a:spLocks noGrp="1"/>
+          </p:cNvSpPr>
+          <p:nvPr>
+            <p:ph idx="1"/>
+          </p:nvPr>
+        </p:nvSpPr>
+        <p:spPr/>
+        <p:txBody>
+          <a:bodyPr>
+            <a:normAutofit/>
+          </a:bodyPr>
+          <a:lstStyle/>
+          <a:p>
+            <a:r>
+              <a:rPr lang="en-US" dirty="0" err="1" smtClean="0"/>
+              <a:t>Outbrain's</a:t>
+            </a:r>
+            <a:r>
+              <a:rPr lang="en-US" dirty="0" smtClean="0"/>
+              <a:t> two weeks of data from 14-Jun-2016 and 28-jun-2016 provided on </a:t>
+            </a:r>
+            <a:r>
+              <a:rPr lang="en-US" dirty="0" err="1" smtClean="0"/>
+              <a:t>kaggle</a:t>
+            </a:r>
+            <a:r>
+              <a:rPr lang="en-US" dirty="0" smtClean="0"/>
+              <a:t>. </a:t>
+            </a:r>
+          </a:p>
+          <a:p>
+            <a:r>
+              <a:rPr lang="en-US" dirty="0" smtClean="0"/>
+              <a:t>This is a very large relational set where one of the log file is ( 2B rows and 100GB uncompressed).</a:t>
+            </a:r>
+          </a:p>
+          <a:p>
+            <a:r>
+              <a:rPr lang="en-US" dirty="0"/>
+              <a:t>2 Billion page views and 16,900,000 clicks of 700 Million unique users, across 560 sites.</a:t>
+            </a:r>
+            <a:endParaRPr lang="en-US" dirty="0" smtClean="0"/>
+          </a:p>
+          <a:p>
+            <a:r>
+              <a:rPr lang="en-US" dirty="0" smtClean="0"/>
+              <a:t>Link to acquire the data: </a:t>
+            </a:r>
+            <a:r>
+              <a:rPr lang="en-US" dirty="0" smtClean="0">
+                <a:hlinkClick r:id="rId3"/>
+              </a:rPr>
+              <a:t>https://www.kaggle.com/c/outbrain-click-prediction/data</a:t>
+            </a:r>
+            <a:r>
+              <a:rPr lang="en-US" dirty="0" smtClean="0"/>
+              <a:t>.</a:t>
+            </a:r>
+            <a:endParaRPr lang="en-US" dirty="0"/>
+          </a:p>
+        </p:txBody>
+      </p:sp>
+      <p:sp>
+        <p:nvSpPr>
+          <p:cNvPr id="4" name="Slide Number Placeholder 3"/>
+          <p:cNvSpPr>
+            <a:spLocks noGrp="1"/>
+          </p:cNvSpPr>
+          <p:nvPr>
+            <p:ph type="sldNum" sz="quarter" idx="12"/>
+          </p:nvPr>
+        </p:nvSpPr>
+        <p:spPr/>
+        <p:txBody>
+          <a:bodyPr/>
+          <a:lstStyle/>
+          <a:p>
+            <a:fld id="{D875CEC6-8E5A-CE43-9ACC-02DF7099DAAF}" type="slidenum">
+              <a:rPr lang="en-US" smtClean="0"/>
+              <a:t>4</a:t>
+            </a:fld>
+            <a:endParaRPr lang="en-US"/>
+          </a:p>
+        </p:txBody>
+      </p:sp>
+    </p:spTree>
+    <p:extLst>
+      <p:ext uri="{BB962C8B-B14F-4D97-AF65-F5344CB8AC3E}">
+        <p14:creationId xmlns:p14="http://schemas.microsoft.com/office/powerpoint/2010/main" val="1972117763"/>
+      </p:ext>
+    </p:extLst>
+  </p:cSld>
+  <p:clrMapOvr>
+    <a:masterClrMapping/>
+  </p:clrMapOvr>
+  <p:timing>
+    <p:tnLst>
+      <p:par>
+        <p:cTn id="1" dur="indefinite" restart="never" nodeType="tmRoot"/>
+      </p:par>
+    </p:tnLst>
+  </p:timing>
+</p:sld>
+</file>
+
+<file path=ppt/slides/slide5.xml><?xml version="1.0" encoding="utf-8"?>
+<p:sld xmlns:a="http://schemas.openxmlformats.org/drawingml/2006/main" xmlns:r="http://schemas.openxmlformats.org/officeDocument/2006/relationships" xmlns:p="http://schemas.openxmlformats.org/presentationml/2006/main">
+  <p:cSld>
+    <p:spTree>
+      <p:nvGrpSpPr>
+        <p:cNvPr id="1" name=""/>
+        <p:cNvGrpSpPr/>
+        <p:nvPr/>
+      </p:nvGrpSpPr>
+      <p:grpSpPr>
+        <a:xfrm>
+          <a:off x="0" y="0"/>
+          <a:ext cx="0" cy="0"/>
+          <a:chOff x="0" y="0"/>
+          <a:chExt cx="0" cy="0"/>
+        </a:xfrm>
+      </p:grpSpPr>
+      <p:sp>
+        <p:nvSpPr>
+          <p:cNvPr id="2" name="Title 1"/>
+          <p:cNvSpPr>
+            <a:spLocks noGrp="1"/>
+          </p:cNvSpPr>
+          <p:nvPr>
+            <p:ph type="title"/>
+          </p:nvPr>
+        </p:nvSpPr>
+        <p:spPr/>
+        <p:txBody>
+          <a:bodyPr/>
+          <a:lstStyle/>
+          <a:p>
+            <a:r>
+              <a:rPr lang="en-US" dirty="0" smtClean="0"/>
+              <a:t>Data </a:t>
+            </a:r>
+            <a:r>
+              <a:rPr lang="mr-IN" dirty="0" smtClean="0"/>
+              <a:t>–</a:t>
+            </a:r>
+            <a:r>
+              <a:rPr lang="en-US" dirty="0" smtClean="0"/>
+              <a:t> </a:t>
+            </a:r>
+            <a:r>
+              <a:rPr lang="en-US" dirty="0" err="1" smtClean="0"/>
+              <a:t>BiG</a:t>
+            </a:r>
+            <a:r>
+              <a:rPr lang="en-US" dirty="0" smtClean="0"/>
+              <a:t> or Small ?</a:t>
+            </a:r>
+            <a:endParaRPr lang="en-US" dirty="0"/>
+          </a:p>
+        </p:txBody>
+      </p:sp>
+      <p:sp>
+        <p:nvSpPr>
+          <p:cNvPr id="3" name="Content Placeholder 2"/>
+          <p:cNvSpPr>
+            <a:spLocks noGrp="1"/>
+          </p:cNvSpPr>
+          <p:nvPr>
+            <p:ph idx="1"/>
+          </p:nvPr>
+        </p:nvSpPr>
+        <p:spPr/>
+        <p:txBody>
+          <a:bodyPr>
+            <a:normAutofit/>
+          </a:bodyPr>
+          <a:lstStyle/>
+          <a:p>
+            <a:r>
+              <a:rPr lang="en-US" dirty="0" smtClean="0"/>
+              <a:t>Collected Data from multiple CSV files</a:t>
+            </a:r>
+          </a:p>
+          <a:p>
+            <a:r>
+              <a:rPr lang="en-US" dirty="0"/>
+              <a:t>Database Size - ~</a:t>
+            </a:r>
+            <a:r>
+              <a:rPr lang="en-US" dirty="0" smtClean="0"/>
+              <a:t>9.7GB</a:t>
+            </a:r>
+            <a:endParaRPr lang="en-US" dirty="0"/>
+          </a:p>
+          <a:p>
+            <a:r>
+              <a:rPr lang="en-US" dirty="0"/>
+              <a:t>Did not even load the </a:t>
+            </a:r>
+            <a:r>
+              <a:rPr lang="en-US" dirty="0" smtClean="0"/>
+              <a:t>entire PAGE_VIEW log!!</a:t>
+            </a:r>
+            <a:endParaRPr lang="en-US" dirty="0"/>
+          </a:p>
+          <a:p>
+            <a:endParaRPr lang="en-US" dirty="0" smtClean="0"/>
+          </a:p>
+        </p:txBody>
+      </p:sp>
+      <p:sp>
+        <p:nvSpPr>
+          <p:cNvPr id="4" name="Slide Number Placeholder 3"/>
+          <p:cNvSpPr>
+            <a:spLocks noGrp="1"/>
+          </p:cNvSpPr>
+          <p:nvPr>
+            <p:ph type="sldNum" sz="quarter" idx="12"/>
+          </p:nvPr>
+        </p:nvSpPr>
+        <p:spPr/>
+        <p:txBody>
+          <a:bodyPr/>
+          <a:lstStyle/>
+          <a:p>
+            <a:fld id="{D875CEC6-8E5A-CE43-9ACC-02DF7099DAAF}" type="slidenum">
+              <a:rPr lang="en-US" smtClean="0"/>
+              <a:t>5</a:t>
+            </a:fld>
+            <a:endParaRPr lang="en-US"/>
+          </a:p>
+        </p:txBody>
+      </p:sp>
+      <p:sp>
+        <p:nvSpPr>
+          <p:cNvPr id="6" name="Rectangle 5"/>
+          <p:cNvSpPr/>
+          <p:nvPr/>
+        </p:nvSpPr>
+        <p:spPr>
+          <a:xfrm>
+            <a:off x="540328" y="3408358"/>
+            <a:ext cx="13404273" cy="3046988"/>
+          </a:xfrm>
+          <a:prstGeom prst="rect">
+            <a:avLst/>
+          </a:prstGeom>
+        </p:spPr>
+        <p:txBody>
+          <a:bodyPr wrap="square">
+            <a:spAutoFit/>
+          </a:bodyPr>
+          <a:lstStyle/>
+          <a:p>
+            <a:r>
+              <a:rPr lang="is-IS" sz="1600" dirty="0">
+                <a:solidFill>
+                  <a:srgbClr val="000000"/>
+                </a:solidFill>
+                <a:latin typeface="Menlo" charset="0"/>
+              </a:rPr>
+              <a:t> table         </a:t>
+            </a:r>
+            <a:r>
+              <a:rPr lang="is-IS" sz="1600" dirty="0" smtClean="0">
+                <a:solidFill>
+                  <a:srgbClr val="000000"/>
+                </a:solidFill>
+                <a:latin typeface="Menlo" charset="0"/>
+              </a:rPr>
+              <a:t>       | </a:t>
+            </a:r>
+            <a:r>
+              <a:rPr lang="is-IS" sz="1600" dirty="0">
+                <a:solidFill>
+                  <a:srgbClr val="000000"/>
+                </a:solidFill>
+                <a:latin typeface="Menlo" charset="0"/>
+              </a:rPr>
+              <a:t>table_size | related_objects_size | total_table_size | live_rows </a:t>
+            </a:r>
+          </a:p>
+          <a:p>
+            <a:r>
+              <a:rPr lang="is-IS" sz="1600" dirty="0">
+                <a:solidFill>
+                  <a:srgbClr val="000000"/>
+                </a:solidFill>
+                <a:latin typeface="Menlo" charset="0"/>
+              </a:rPr>
+              <a:t>----------------------+------------+----------------------+------------------+-----------</a:t>
+            </a:r>
+          </a:p>
+          <a:p>
+            <a:r>
+              <a:rPr lang="is-IS" sz="1600" dirty="0">
+                <a:solidFill>
+                  <a:srgbClr val="000000"/>
+                </a:solidFill>
+                <a:latin typeface="Menlo" charset="0"/>
+              </a:rPr>
+              <a:t> promoted_content     | 32 MB      | 32 kB                | 32 MB            |    559583</a:t>
+            </a:r>
+          </a:p>
+          <a:p>
+            <a:r>
+              <a:rPr lang="is-IS" sz="1600" dirty="0">
+                <a:solidFill>
+                  <a:srgbClr val="000000"/>
+                </a:solidFill>
+                <a:latin typeface="Menlo" charset="0"/>
+              </a:rPr>
+              <a:t> documents_meta       | 164 MB     | 64 kB                | 164 MB           |   2999334</a:t>
+            </a:r>
+          </a:p>
+          <a:p>
+            <a:r>
+              <a:rPr lang="is-IS" sz="1600" dirty="0">
+                <a:solidFill>
+                  <a:srgbClr val="000000"/>
+                </a:solidFill>
+                <a:latin typeface="Menlo" charset="0"/>
+              </a:rPr>
+              <a:t> documents_categories | 273 MB     | 88 kB                | 273 MB           |   5481471</a:t>
+            </a:r>
+          </a:p>
+          <a:p>
+            <a:r>
+              <a:rPr lang="is-IS" sz="1600" dirty="0">
+                <a:solidFill>
+                  <a:srgbClr val="000000"/>
+                </a:solidFill>
+                <a:latin typeface="Menlo" charset="0"/>
+              </a:rPr>
+              <a:t> documents_entities   | 446 MB     | 136 kB               | 446 MB           |   5537633</a:t>
+            </a:r>
+          </a:p>
+          <a:p>
+            <a:r>
+              <a:rPr lang="is-IS" sz="1600" dirty="0">
+                <a:solidFill>
+                  <a:srgbClr val="000000"/>
+                </a:solidFill>
+                <a:latin typeface="Menlo" charset="0"/>
+              </a:rPr>
+              <a:t> page_views_sample    | 726 MB     | 200 kB               | 726 MB           |  10000008</a:t>
+            </a:r>
+          </a:p>
+          <a:p>
+            <a:r>
+              <a:rPr lang="is-IS" sz="1600" dirty="0">
+                <a:solidFill>
+                  <a:srgbClr val="000000"/>
+                </a:solidFill>
+                <a:latin typeface="Menlo" charset="0"/>
+              </a:rPr>
+              <a:t> documents_topics     | 564 MB     | 160 kB               | 564 MB           |  11325980</a:t>
+            </a:r>
+          </a:p>
+          <a:p>
+            <a:r>
+              <a:rPr lang="is-IS" sz="1600" dirty="0">
+                <a:solidFill>
+                  <a:srgbClr val="000000"/>
+                </a:solidFill>
+                <a:latin typeface="Menlo" charset="0"/>
+              </a:rPr>
+              <a:t> events               | 1822 MB    | 480 kB               | 1822 MB          |  23121858</a:t>
+            </a:r>
+          </a:p>
+          <a:p>
+            <a:r>
+              <a:rPr lang="is-IS" sz="1600" dirty="0">
+                <a:solidFill>
+                  <a:srgbClr val="000000"/>
+                </a:solidFill>
+                <a:latin typeface="Menlo" charset="0"/>
+              </a:rPr>
+              <a:t> clicks_test          | 1361 MB    | 360 kB               | 1361 MB          |  32225335</a:t>
+            </a:r>
+          </a:p>
+          <a:p>
+            <a:r>
+              <a:rPr lang="is-IS" sz="1600" dirty="0">
+                <a:solidFill>
+                  <a:srgbClr val="000000"/>
+                </a:solidFill>
+                <a:latin typeface="Menlo" charset="0"/>
+              </a:rPr>
+              <a:t> clicks_train         | 4336 MB    | 1112 kB              | 4337 MB          |  87141751</a:t>
+            </a:r>
+          </a:p>
+          <a:p>
+            <a:r>
+              <a:rPr lang="is-IS" sz="1600" dirty="0">
+                <a:solidFill>
+                  <a:srgbClr val="000000"/>
+                </a:solidFill>
+                <a:latin typeface="Menlo" charset="0"/>
+              </a:rPr>
+              <a:t> TOTAL                | 9724 MB    | 2632 kB              | 9726 MB          | 178392953</a:t>
+            </a:r>
+            <a:endParaRPr lang="is-IS" sz="1600" dirty="0">
+              <a:solidFill>
+                <a:srgbClr val="000000"/>
+              </a:solidFill>
+              <a:effectLst/>
+              <a:latin typeface="Menlo" charset="0"/>
+            </a:endParaRPr>
+          </a:p>
+        </p:txBody>
+      </p:sp>
+    </p:spTree>
+    <p:extLst>
+      <p:ext uri="{BB962C8B-B14F-4D97-AF65-F5344CB8AC3E}">
+        <p14:creationId xmlns:p14="http://schemas.microsoft.com/office/powerpoint/2010/main" val="1893351295"/>
+      </p:ext>
+    </p:extLst>
+  </p:cSld>
+  <p:clrMapOvr>
+    <a:masterClrMapping/>
+  </p:clrMapOvr>
+  <p:timing>
+    <p:tnLst>
+      <p:par>
+        <p:cTn id="1" dur="indefinite" restart="never" nodeType="tmRoot"/>
+      </p:par>
+    </p:tnLst>
+  </p:timing>
+</p:sld>
+</file>
+
+<file path=ppt/slides/slide6.xml><?xml version="1.0" encoding="utf-8"?>
+<p:sld xmlns:a="http://schemas.openxmlformats.org/drawingml/2006/main" xmlns:r="http://schemas.openxmlformats.org/officeDocument/2006/relationships" xmlns:p="http://schemas.openxmlformats.org/presentationml/2006/main">
+  <p:cSld>
+    <p:spTree>
+      <p:nvGrpSpPr>
+        <p:cNvPr id="1" name=""/>
+        <p:cNvGrpSpPr/>
+        <p:nvPr/>
+      </p:nvGrpSpPr>
+      <p:grpSpPr>
+        <a:xfrm>
+          <a:off x="0" y="0"/>
+          <a:ext cx="0" cy="0"/>
+          <a:chOff x="0" y="0"/>
+          <a:chExt cx="0" cy="0"/>
+        </a:xfrm>
+      </p:grpSpPr>
+      <p:sp>
+        <p:nvSpPr>
+          <p:cNvPr id="2" name="Title 1"/>
+          <p:cNvSpPr>
+            <a:spLocks noGrp="1"/>
+          </p:cNvSpPr>
+          <p:nvPr>
+            <p:ph type="title"/>
+          </p:nvPr>
+        </p:nvSpPr>
+        <p:spPr/>
+        <p:txBody>
+          <a:bodyPr/>
+          <a:lstStyle/>
+          <a:p>
+            <a:r>
+              <a:rPr lang="en-US" dirty="0" smtClean="0"/>
+              <a:t>Data - Cleaning and Munging</a:t>
+            </a:r>
+            <a:endParaRPr lang="en-US" dirty="0"/>
+          </a:p>
+        </p:txBody>
+      </p:sp>
+      <p:sp>
+        <p:nvSpPr>
+          <p:cNvPr id="3" name="Content Placeholder 2"/>
+          <p:cNvSpPr>
+            <a:spLocks noGrp="1"/>
+          </p:cNvSpPr>
+          <p:nvPr>
+            <p:ph idx="1"/>
+          </p:nvPr>
+        </p:nvSpPr>
+        <p:spPr/>
+        <p:txBody>
+          <a:bodyPr>
+            <a:normAutofit/>
+          </a:bodyPr>
+          <a:lstStyle/>
+          <a:p>
+            <a:r>
+              <a:rPr lang="en-US" dirty="0" smtClean="0"/>
+              <a:t>Current Status</a:t>
+            </a:r>
+          </a:p>
+          <a:p>
+            <a:pPr lvl="1"/>
+            <a:r>
+              <a:rPr lang="en-US" dirty="0" smtClean="0"/>
+              <a:t>Analysis is in progress using following notebook</a:t>
+            </a:r>
+          </a:p>
+          <a:p>
+            <a:pPr lvl="2"/>
+            <a:r>
+              <a:rPr lang="en-US" dirty="0" smtClean="0">
+                <a:hlinkClick r:id="rId2"/>
+              </a:rPr>
+              <a:t>DSClickPrediction/notebooks/</a:t>
+            </a:r>
+            <a:r>
+              <a:rPr lang="en-US" b="1" dirty="0" err="1" smtClean="0">
+                <a:hlinkClick r:id="rId2"/>
+              </a:rPr>
+              <a:t>OutbrainDataAnalysis.ipynb</a:t>
+            </a:r>
+            <a:endParaRPr lang="en-US" b="1" dirty="0" smtClean="0"/>
+          </a:p>
+          <a:p>
+            <a:pPr lvl="1"/>
+            <a:r>
+              <a:rPr lang="en-US" dirty="0" smtClean="0"/>
+              <a:t>Created  a relational database locally for each data set</a:t>
+            </a:r>
+          </a:p>
+          <a:p>
+            <a:r>
+              <a:rPr lang="en-US" dirty="0" smtClean="0"/>
+              <a:t>Next Step</a:t>
+            </a:r>
+          </a:p>
+          <a:p>
+            <a:pPr lvl="1"/>
+            <a:r>
+              <a:rPr lang="en-US" dirty="0" smtClean="0"/>
+              <a:t>Create a de-normalized fact table to get all the features</a:t>
+            </a:r>
+          </a:p>
+          <a:p>
+            <a:pPr lvl="1"/>
+            <a:r>
+              <a:rPr lang="en-US" dirty="0" smtClean="0"/>
+              <a:t>Convert categorical variables into dummy variables</a:t>
+            </a:r>
+          </a:p>
+          <a:p>
+            <a:pPr lvl="1"/>
+            <a:r>
+              <a:rPr lang="en-US" dirty="0" smtClean="0"/>
+              <a:t>Lots of missing values </a:t>
+            </a:r>
+            <a:r>
+              <a:rPr lang="mr-IN" dirty="0" smtClean="0"/>
+              <a:t>–</a:t>
+            </a:r>
+            <a:r>
+              <a:rPr lang="en-US" dirty="0" smtClean="0"/>
+              <a:t> Need to decide how to handle them</a:t>
+            </a:r>
+          </a:p>
+          <a:p>
+            <a:pPr lvl="1"/>
+            <a:r>
+              <a:rPr lang="en-US" dirty="0" smtClean="0"/>
+              <a:t>Create Feature and Response vector</a:t>
+            </a:r>
+          </a:p>
+          <a:p>
+            <a:pPr lvl="1"/>
+            <a:endParaRPr lang="en-US" dirty="0" smtClean="0"/>
+          </a:p>
+          <a:p>
+            <a:pPr lvl="1"/>
+            <a:endParaRPr lang="en-US" dirty="0" smtClean="0"/>
+          </a:p>
+        </p:txBody>
+      </p:sp>
+      <p:sp>
+        <p:nvSpPr>
+          <p:cNvPr id="5" name="Slide Number Placeholder 4"/>
+          <p:cNvSpPr>
+            <a:spLocks noGrp="1"/>
+          </p:cNvSpPr>
+          <p:nvPr>
+            <p:ph type="sldNum" sz="quarter" idx="12"/>
+          </p:nvPr>
+        </p:nvSpPr>
+        <p:spPr/>
+        <p:txBody>
+          <a:bodyPr/>
+          <a:lstStyle/>
+          <a:p>
+            <a:fld id="{D875CEC6-8E5A-CE43-9ACC-02DF7099DAAF}" type="slidenum">
+              <a:rPr lang="en-US" smtClean="0"/>
+              <a:t>6</a:t>
+            </a:fld>
+            <a:endParaRPr lang="en-US"/>
+          </a:p>
+        </p:txBody>
+      </p:sp>
+    </p:spTree>
+    <p:extLst>
+      <p:ext uri="{BB962C8B-B14F-4D97-AF65-F5344CB8AC3E}">
+        <p14:creationId xmlns:p14="http://schemas.microsoft.com/office/powerpoint/2010/main" val="1120634943"/>
+      </p:ext>
+    </p:extLst>
+  </p:cSld>
+  <p:clrMapOvr>
+    <a:masterClrMapping/>
+  </p:clrMapOvr>
+  <p:timing>
+    <p:tnLst>
+      <p:par>
+        <p:cTn id="1" dur="indefinite" restart="never" nodeType="tmRoot"/>
+      </p:par>
+    </p:tnLst>
+  </p:timing>
+</p:sld>
+</file>
+
+<file path=ppt/slides/slide7.xml><?xml version="1.0" encoding="utf-8"?>
+<p:sld xmlns:a="http://schemas.openxmlformats.org/drawingml/2006/main" xmlns:r="http://schemas.openxmlformats.org/officeDocument/2006/relationships" xmlns:p="http://schemas.openxmlformats.org/presentationml/2006/main">
+  <p:cSld>
+    <p:spTree>
+      <p:nvGrpSpPr>
+        <p:cNvPr id="1" name=""/>
+        <p:cNvGrpSpPr/>
+        <p:nvPr/>
+      </p:nvGrpSpPr>
+      <p:grpSpPr>
+        <a:xfrm>
+          <a:off x="0" y="0"/>
+          <a:ext cx="0" cy="0"/>
+          <a:chOff x="0" y="0"/>
+          <a:chExt cx="0" cy="0"/>
+        </a:xfrm>
+      </p:grpSpPr>
+      <p:sp>
+        <p:nvSpPr>
+          <p:cNvPr id="2" name="Title 1"/>
+          <p:cNvSpPr>
+            <a:spLocks noGrp="1"/>
+          </p:cNvSpPr>
+          <p:nvPr>
+            <p:ph type="title"/>
+          </p:nvPr>
+        </p:nvSpPr>
+        <p:spPr/>
+        <p:txBody>
+          <a:bodyPr/>
+          <a:lstStyle/>
+          <a:p>
+            <a:r>
+              <a:rPr lang="en-US" dirty="0"/>
+              <a:t>Project -  </a:t>
+            </a:r>
+            <a:r>
+              <a:rPr lang="en-US" dirty="0" smtClean="0"/>
+              <a:t>Next Steps</a:t>
+            </a:r>
+            <a:endParaRPr lang="en-US" dirty="0"/>
+          </a:p>
+        </p:txBody>
+      </p:sp>
+      <p:sp>
+        <p:nvSpPr>
+          <p:cNvPr id="3" name="Content Placeholder 2"/>
+          <p:cNvSpPr>
+            <a:spLocks noGrp="1"/>
+          </p:cNvSpPr>
+          <p:nvPr>
+            <p:ph idx="1"/>
+          </p:nvPr>
+        </p:nvSpPr>
+        <p:spPr/>
+        <p:txBody>
+          <a:bodyPr/>
+          <a:lstStyle/>
+          <a:p>
+            <a:r>
+              <a:rPr lang="en-US" dirty="0" smtClean="0"/>
+              <a:t>Model Selection</a:t>
+            </a:r>
+          </a:p>
+          <a:p>
+            <a:r>
+              <a:rPr lang="en-US" dirty="0" smtClean="0"/>
+              <a:t>Model training</a:t>
+            </a:r>
+          </a:p>
+          <a:p>
+            <a:r>
+              <a:rPr lang="en-US" dirty="0" smtClean="0"/>
+              <a:t>Model Prediction </a:t>
+            </a:r>
+            <a:endParaRPr lang="en-US" dirty="0" smtClean="0"/>
+          </a:p>
+          <a:p>
+            <a:r>
+              <a:rPr lang="en-US" dirty="0" smtClean="0"/>
+              <a:t>Model Evaluation</a:t>
+            </a:r>
+            <a:endParaRPr lang="en-US" dirty="0" smtClean="0"/>
+          </a:p>
+        </p:txBody>
+      </p:sp>
+      <p:sp>
+        <p:nvSpPr>
+          <p:cNvPr id="4" name="Slide Number Placeholder 3"/>
+          <p:cNvSpPr>
+            <a:spLocks noGrp="1"/>
+          </p:cNvSpPr>
+          <p:nvPr>
+            <p:ph type="sldNum" sz="quarter" idx="12"/>
+          </p:nvPr>
+        </p:nvSpPr>
+        <p:spPr/>
+        <p:txBody>
+          <a:bodyPr/>
+          <a:lstStyle/>
+          <a:p>
+            <a:fld id="{D875CEC6-8E5A-CE43-9ACC-02DF7099DAAF}" type="slidenum">
+              <a:rPr lang="en-US" smtClean="0"/>
+              <a:t>7</a:t>
+            </a:fld>
+            <a:endParaRPr lang="en-US"/>
+          </a:p>
+        </p:txBody>
+      </p:sp>
+    </p:spTree>
+    <p:extLst>
+      <p:ext uri="{BB962C8B-B14F-4D97-AF65-F5344CB8AC3E}">
+        <p14:creationId xmlns:p14="http://schemas.microsoft.com/office/powerpoint/2010/main" val="377641290"/>
+      </p:ext>
+    </p:extLst>
+  </p:cSld>
+  <p:clrMapOvr>
+    <a:masterClrMapping/>
+  </p:clrMapOvr>
+  <p:timing>
+    <p:tnLst>
+      <p:par>
+        <p:cTn id="1" dur="indefinite" restart="never" nodeType="tmRoot"/>
+      </p:par>
+    </p:tnLst>
+  </p:timing>
+</p:sld>
+</file>
+
+<file path=ppt/slides/slide8.xml><?xml version="1.0" encoding="utf-8"?>
+<p:sld xmlns:a="http://schemas.openxmlformats.org/drawingml/2006/main" xmlns:r="http://schemas.openxmlformats.org/officeDocument/2006/relationships" xmlns:p="http://schemas.openxmlformats.org/presentationml/2006/main">
+  <p:cSld>
+    <p:spTree>
+      <p:nvGrpSpPr>
+        <p:cNvPr id="1" name=""/>
+        <p:cNvGrpSpPr/>
+        <p:nvPr/>
+      </p:nvGrpSpPr>
+      <p:grpSpPr>
+        <a:xfrm>
+          <a:off x="0" y="0"/>
+          <a:ext cx="0" cy="0"/>
+          <a:chOff x="0" y="0"/>
+          <a:chExt cx="0" cy="0"/>
+        </a:xfrm>
+      </p:grpSpPr>
+      <p:sp>
+        <p:nvSpPr>
+          <p:cNvPr id="2" name="Title 1"/>
+          <p:cNvSpPr>
+            <a:spLocks noGrp="1"/>
+          </p:cNvSpPr>
+          <p:nvPr>
+            <p:ph type="title"/>
+          </p:nvPr>
+        </p:nvSpPr>
+        <p:spPr/>
+        <p:txBody>
+          <a:bodyPr/>
+          <a:lstStyle/>
+          <a:p>
+            <a:r>
+              <a:rPr lang="en-US" dirty="0" smtClean="0"/>
+              <a:t>Questions ?</a:t>
+            </a:r>
+            <a:endParaRPr lang="en-US" dirty="0"/>
+          </a:p>
+        </p:txBody>
+      </p:sp>
+      <p:sp>
+        <p:nvSpPr>
+          <p:cNvPr id="4" name="Slide Number Placeholder 3"/>
+          <p:cNvSpPr>
+            <a:spLocks noGrp="1"/>
+          </p:cNvSpPr>
+          <p:nvPr>
+            <p:ph type="sldNum" sz="quarter" idx="12"/>
+          </p:nvPr>
+        </p:nvSpPr>
+        <p:spPr/>
+        <p:txBody>
+          <a:bodyPr/>
+          <a:lstStyle/>
+          <a:p>
+            <a:fld id="{D875CEC6-8E5A-CE43-9ACC-02DF7099DAAF}" type="slidenum">
+              <a:rPr lang="en-US" smtClean="0"/>
+              <a:t>8</a:t>
+            </a:fld>
+            <a:endParaRPr lang="en-US"/>
+          </a:p>
+        </p:txBody>
+      </p:sp>
+      <p:sp>
+        <p:nvSpPr>
+          <p:cNvPr id="5" name="Content Placeholder 4"/>
+          <p:cNvSpPr>
+            <a:spLocks noGrp="1"/>
+          </p:cNvSpPr>
+          <p:nvPr>
+            <p:ph idx="1"/>
+          </p:nvPr>
+        </p:nvSpPr>
+        <p:spPr/>
+        <p:txBody>
+          <a:bodyPr/>
+          <a:lstStyle/>
+          <a:p>
+            <a:endParaRPr lang="en-US"/>
+          </a:p>
+        </p:txBody>
+      </p:sp>
+    </p:spTree>
+    <p:extLst>
+      <p:ext uri="{BB962C8B-B14F-4D97-AF65-F5344CB8AC3E}">
+        <p14:creationId xmlns:p14="http://schemas.microsoft.com/office/powerpoint/2010/main" val="841622756"/>
+      </p:ext>
+    </p:extLst>
+  </p:cSld>
+  <p:clrMapOvr>
+    <a:masterClrMapping/>
+  </p:clrMapOvr>
+  <p:timing>
+    <p:tnLst>
+      <p:par>
+        <p:cTn id="1" dur="indefinite" restart="never" nodeType="tmRoot"/>
+      </p:par>
+    </p:tnLst>
+  </p:timing>
+</p:sld>
+</file>
+
+<file path=ppt/slides/slide9.xml><?xml version="1.0" encoding="utf-8"?>
+<p:sld xmlns:a="http://schemas.openxmlformats.org/drawingml/2006/main" xmlns:r="http://schemas.openxmlformats.org/officeDocument/2006/relationships" xmlns:p="http://schemas.openxmlformats.org/presentationml/2006/main">
+  <p:cSld>
+    <p:spTree>
+      <p:nvGrpSpPr>
+        <p:cNvPr id="1" name=""/>
+        <p:cNvGrpSpPr/>
+        <p:nvPr/>
+      </p:nvGrpSpPr>
+      <p:grpSpPr>
+        <a:xfrm>
+          <a:off x="0" y="0"/>
+          <a:ext cx="0" cy="0"/>
+          <a:chOff x="0" y="0"/>
+          <a:chExt cx="0" cy="0"/>
+        </a:xfrm>
+      </p:grpSpPr>
+      <p:sp>
+        <p:nvSpPr>
+          <p:cNvPr id="2" name="Title 1"/>
+          <p:cNvSpPr>
+            <a:spLocks noGrp="1"/>
+          </p:cNvSpPr>
+          <p:nvPr>
+            <p:ph type="title"/>
+          </p:nvPr>
+        </p:nvSpPr>
+        <p:spPr/>
+        <p:txBody>
+          <a:bodyPr/>
+          <a:lstStyle/>
+          <a:p>
+            <a:endParaRPr lang="en-US"/>
+          </a:p>
+        </p:txBody>
+      </p:sp>
+      <p:sp>
+        <p:nvSpPr>
+          <p:cNvPr id="3" name="Content Placeholder 2"/>
+          <p:cNvSpPr>
+            <a:spLocks noGrp="1"/>
+          </p:cNvSpPr>
+          <p:nvPr>
+            <p:ph idx="1"/>
+          </p:nvPr>
+        </p:nvSpPr>
+        <p:spPr/>
+        <p:txBody>
+          <a:bodyPr/>
+          <a:lstStyle/>
+          <a:p>
+            <a:endParaRPr lang="en-US"/>
+          </a:p>
+        </p:txBody>
+      </p:sp>
+      <p:sp>
+        <p:nvSpPr>
+          <p:cNvPr id="4" name="Slide Number Placeholder 3"/>
+          <p:cNvSpPr>
+            <a:spLocks noGrp="1"/>
+          </p:cNvSpPr>
+          <p:nvPr>
+            <p:ph type="sldNum" sz="quarter" idx="12"/>
+          </p:nvPr>
+        </p:nvSpPr>
+        <p:spPr/>
+        <p:txBody>
+          <a:bodyPr/>
+          <a:lstStyle/>
+          <a:p>
+            <a:fld id="{D875CEC6-8E5A-CE43-9ACC-02DF7099DAAF}" type="slidenum">
+              <a:rPr lang="en-US" smtClean="0"/>
+              <a:t>9</a:t>
+            </a:fld>
+            <a:endParaRPr lang="en-US"/>
+          </a:p>
+        </p:txBody>
+      </p:sp>
+    </p:spTree>
+    <p:extLst>
+      <p:ext uri="{BB962C8B-B14F-4D97-AF65-F5344CB8AC3E}">
+        <p14:creationId xmlns:p14="http://schemas.microsoft.com/office/powerpoint/2010/main" val="255313000"/>
       </p:ext>
     </p:extLst>
   </p:cSld>

</xml_diff>